<commit_message>
Alterações documentação e PPT Final
</commit_message>
<xml_diff>
--- a/Documentação/MockupDeTelas/Mockup.pptx
+++ b/Documentação/MockupDeTelas/Mockup.pptx
@@ -659,7 +659,7 @@
           <a:p>
             <a:fld id="{5596CF88-55CB-4A83-A62D-3C3F4E3B0DA9}" type="datetimeFigureOut">
               <a:rPr lang="pt-BR" smtClean="0"/>
-              <a:t>09/10/2019</a:t>
+              <a:t>02/12/2019</a:t>
             </a:fld>
             <a:endParaRPr lang="pt-BR"/>
           </a:p>
@@ -857,7 +857,7 @@
           <a:p>
             <a:fld id="{5596CF88-55CB-4A83-A62D-3C3F4E3B0DA9}" type="datetimeFigureOut">
               <a:rPr lang="pt-BR" smtClean="0"/>
-              <a:t>09/10/2019</a:t>
+              <a:t>02/12/2019</a:t>
             </a:fld>
             <a:endParaRPr lang="pt-BR"/>
           </a:p>
@@ -1065,7 +1065,7 @@
           <a:p>
             <a:fld id="{5596CF88-55CB-4A83-A62D-3C3F4E3B0DA9}" type="datetimeFigureOut">
               <a:rPr lang="pt-BR" smtClean="0"/>
-              <a:t>09/10/2019</a:t>
+              <a:t>02/12/2019</a:t>
             </a:fld>
             <a:endParaRPr lang="pt-BR"/>
           </a:p>
@@ -1263,7 +1263,7 @@
           <a:p>
             <a:fld id="{5596CF88-55CB-4A83-A62D-3C3F4E3B0DA9}" type="datetimeFigureOut">
               <a:rPr lang="pt-BR" smtClean="0"/>
-              <a:t>09/10/2019</a:t>
+              <a:t>02/12/2019</a:t>
             </a:fld>
             <a:endParaRPr lang="pt-BR"/>
           </a:p>
@@ -1538,7 +1538,7 @@
           <a:p>
             <a:fld id="{5596CF88-55CB-4A83-A62D-3C3F4E3B0DA9}" type="datetimeFigureOut">
               <a:rPr lang="pt-BR" smtClean="0"/>
-              <a:t>09/10/2019</a:t>
+              <a:t>02/12/2019</a:t>
             </a:fld>
             <a:endParaRPr lang="pt-BR"/>
           </a:p>
@@ -1803,7 +1803,7 @@
           <a:p>
             <a:fld id="{5596CF88-55CB-4A83-A62D-3C3F4E3B0DA9}" type="datetimeFigureOut">
               <a:rPr lang="pt-BR" smtClean="0"/>
-              <a:t>09/10/2019</a:t>
+              <a:t>02/12/2019</a:t>
             </a:fld>
             <a:endParaRPr lang="pt-BR"/>
           </a:p>
@@ -2215,7 +2215,7 @@
           <a:p>
             <a:fld id="{5596CF88-55CB-4A83-A62D-3C3F4E3B0DA9}" type="datetimeFigureOut">
               <a:rPr lang="pt-BR" smtClean="0"/>
-              <a:t>09/10/2019</a:t>
+              <a:t>02/12/2019</a:t>
             </a:fld>
             <a:endParaRPr lang="pt-BR"/>
           </a:p>
@@ -2356,7 +2356,7 @@
           <a:p>
             <a:fld id="{5596CF88-55CB-4A83-A62D-3C3F4E3B0DA9}" type="datetimeFigureOut">
               <a:rPr lang="pt-BR" smtClean="0"/>
-              <a:t>09/10/2019</a:t>
+              <a:t>02/12/2019</a:t>
             </a:fld>
             <a:endParaRPr lang="pt-BR"/>
           </a:p>
@@ -2469,7 +2469,7 @@
           <a:p>
             <a:fld id="{5596CF88-55CB-4A83-A62D-3C3F4E3B0DA9}" type="datetimeFigureOut">
               <a:rPr lang="pt-BR" smtClean="0"/>
-              <a:t>09/10/2019</a:t>
+              <a:t>02/12/2019</a:t>
             </a:fld>
             <a:endParaRPr lang="pt-BR"/>
           </a:p>
@@ -2780,7 +2780,7 @@
           <a:p>
             <a:fld id="{5596CF88-55CB-4A83-A62D-3C3F4E3B0DA9}" type="datetimeFigureOut">
               <a:rPr lang="pt-BR" smtClean="0"/>
-              <a:t>09/10/2019</a:t>
+              <a:t>02/12/2019</a:t>
             </a:fld>
             <a:endParaRPr lang="pt-BR"/>
           </a:p>
@@ -3068,7 +3068,7 @@
           <a:p>
             <a:fld id="{5596CF88-55CB-4A83-A62D-3C3F4E3B0DA9}" type="datetimeFigureOut">
               <a:rPr lang="pt-BR" smtClean="0"/>
-              <a:t>09/10/2019</a:t>
+              <a:t>02/12/2019</a:t>
             </a:fld>
             <a:endParaRPr lang="pt-BR"/>
           </a:p>
@@ -3309,7 +3309,7 @@
           <a:p>
             <a:fld id="{5596CF88-55CB-4A83-A62D-3C3F4E3B0DA9}" type="datetimeFigureOut">
               <a:rPr lang="pt-BR" smtClean="0"/>
-              <a:t>09/10/2019</a:t>
+              <a:t>02/12/2019</a:t>
             </a:fld>
             <a:endParaRPr lang="pt-BR"/>
           </a:p>
@@ -5153,27 +5153,7 @@
                 <a:ea typeface="+mn-ea"/>
                 <a:cs typeface="+mn-cs"/>
               </a:rPr>
-              <a:t>     Edit      Login      </a:t>
-            </a:r>
-            <a:r>
-              <a:rPr kumimoji="0" lang="en-US" sz="1200" b="0" i="0" u="none" strike="noStrike" kern="0" cap="none" spc="0" normalizeH="0" noProof="0" dirty="0" err="1">
-                <a:ln>
-                  <a:noFill/>
-                </a:ln>
-                <a:solidFill>
-                  <a:srgbClr val="000000">
-                    <a:lumMod val="75000"/>
-                    <a:lumOff val="25000"/>
-                  </a:srgbClr>
-                </a:solidFill>
-                <a:effectLst/>
-                <a:uLnTx/>
-                <a:uFillTx/>
-                <a:latin typeface="Segoe UI"/>
-                <a:ea typeface="+mn-ea"/>
-                <a:cs typeface="+mn-cs"/>
-              </a:rPr>
-              <a:t>Cadastro</a:t>
+              <a:t>     Edit      Login      Cadastro</a:t>
             </a:r>
             <a:endParaRPr kumimoji="0" lang="en-US" sz="1200" b="0" i="0" u="none" strike="noStrike" kern="0" cap="none" spc="0" normalizeH="0" baseline="0" noProof="0" dirty="0">
               <a:ln>
@@ -5460,36 +5440,12 @@
             <a:lstStyle/>
             <a:p>
               <a:r>
-                <a:rPr lang="en-US" sz="1200" dirty="0" err="1">
-                  <a:latin typeface="Segoe UI" pitchFamily="34" charset="0"/>
-                  <a:ea typeface="Segoe UI" pitchFamily="34" charset="0"/>
-                  <a:cs typeface="Segoe UI" pitchFamily="34" charset="0"/>
-                </a:rPr>
-                <a:t>Monitore</a:t>
-              </a:r>
-              <a:r>
                 <a:rPr lang="en-US" sz="1200" dirty="0">
                   <a:latin typeface="Segoe UI" pitchFamily="34" charset="0"/>
                   <a:ea typeface="Segoe UI" pitchFamily="34" charset="0"/>
                   <a:cs typeface="Segoe UI" pitchFamily="34" charset="0"/>
                 </a:rPr>
-                <a:t> </a:t>
-              </a:r>
-              <a:r>
-                <a:rPr lang="en-US" sz="1200" dirty="0" err="1">
-                  <a:latin typeface="Segoe UI" pitchFamily="34" charset="0"/>
-                  <a:ea typeface="Segoe UI" pitchFamily="34" charset="0"/>
-                  <a:cs typeface="Segoe UI" pitchFamily="34" charset="0"/>
-                </a:rPr>
-                <a:t>seu</a:t>
-              </a:r>
-              <a:r>
-                <a:rPr lang="en-US" sz="1200" dirty="0">
-                  <a:latin typeface="Segoe UI" pitchFamily="34" charset="0"/>
-                  <a:ea typeface="Segoe UI" pitchFamily="34" charset="0"/>
-                  <a:cs typeface="Segoe UI" pitchFamily="34" charset="0"/>
-                </a:rPr>
-                <a:t> Hardware</a:t>
+                <a:t>Monitore seu Hardware</a:t>
               </a:r>
               <a:endParaRPr lang="en-US" sz="1050" dirty="0">
                 <a:latin typeface="Segoe UI" pitchFamily="34" charset="0"/>
@@ -5568,19 +5524,7 @@
               <a:pPr algn="ctr"/>
               <a:r>
                 <a:rPr lang="pt-BR" sz="1200" dirty="0"/>
-                <a:t>Você receberá </a:t>
-              </a:r>
-              <a:r>
-                <a:rPr lang="pt-BR" sz="1200" dirty="0" err="1"/>
-                <a:t>relatorios</a:t>
-              </a:r>
-              <a:r>
-                <a:rPr lang="pt-BR" sz="1200" dirty="0"/>
-                <a:t> semanais/mensais sobre o desempenho do seu computador, com algumas dicas para otimizar sua </a:t>
-              </a:r>
-              <a:r>
-                <a:rPr lang="pt-BR" sz="1200" dirty="0" err="1"/>
-                <a:t>performace</a:t>
+                <a:t>Você receberá relatorios semanais/mensais sobre o desempenho do seu computador, com algumas dicas para otimizar sua performace</a:t>
               </a:r>
               <a:endParaRPr kumimoji="0" lang="en-US" sz="500" b="0" i="0" u="none" strike="noStrike" kern="0" cap="none" spc="0" normalizeH="0" baseline="0" noProof="0" dirty="0">
                 <a:ln>
@@ -5630,28 +5574,12 @@
             <a:lstStyle/>
             <a:p>
               <a:r>
-                <a:rPr lang="en-US" sz="1200" dirty="0" err="1">
-                  <a:latin typeface="Segoe UI" pitchFamily="34" charset="0"/>
-                  <a:ea typeface="Segoe UI" pitchFamily="34" charset="0"/>
-                  <a:cs typeface="Segoe UI" pitchFamily="34" charset="0"/>
-                </a:rPr>
-                <a:t>Receba</a:t>
-              </a:r>
-              <a:r>
                 <a:rPr lang="en-US" sz="1200" dirty="0">
                   <a:latin typeface="Segoe UI" pitchFamily="34" charset="0"/>
                   <a:ea typeface="Segoe UI" pitchFamily="34" charset="0"/>
                   <a:cs typeface="Segoe UI" pitchFamily="34" charset="0"/>
                 </a:rPr>
-                <a:t> </a:t>
-              </a:r>
-              <a:r>
-                <a:rPr lang="en-US" sz="1200" dirty="0" err="1">
-                  <a:latin typeface="Segoe UI" pitchFamily="34" charset="0"/>
-                  <a:ea typeface="Segoe UI" pitchFamily="34" charset="0"/>
-                  <a:cs typeface="Segoe UI" pitchFamily="34" charset="0"/>
-                </a:rPr>
-                <a:t>Relatórios</a:t>
+                <a:t>Receba Relatórios</a:t>
               </a:r>
               <a:endParaRPr lang="en-US" sz="1050" dirty="0">
                 <a:latin typeface="Segoe UI" pitchFamily="34" charset="0"/>
@@ -5730,23 +5658,7 @@
               <a:pPr algn="ctr"/>
               <a:r>
                 <a:rPr lang="pt-BR" sz="1400" dirty="0"/>
-                <a:t>Você </a:t>
-              </a:r>
-              <a:r>
-                <a:rPr lang="pt-BR" sz="1400" dirty="0" err="1"/>
-                <a:t>tera</a:t>
-              </a:r>
-              <a:r>
-                <a:rPr lang="pt-BR" sz="1400" dirty="0"/>
-                <a:t> mais segurança e </a:t>
-              </a:r>
-              <a:r>
-                <a:rPr lang="pt-BR" sz="1400" dirty="0" err="1"/>
-                <a:t>flexibilodade</a:t>
-              </a:r>
-              <a:r>
-                <a:rPr lang="pt-BR" sz="1400" dirty="0"/>
-                <a:t> conseguindo monitorar seu processo via WTS</a:t>
+                <a:t>Você terá mais segurança e flexibilidade conseguindo monitorar seu processo via WTS</a:t>
               </a:r>
               <a:endParaRPr kumimoji="0" lang="en-US" sz="600" b="0" i="0" u="none" strike="noStrike" kern="0" cap="none" spc="0" normalizeH="0" baseline="0" noProof="0" dirty="0">
                 <a:ln>
@@ -5801,15 +5713,7 @@
                   <a:ea typeface="Segoe UI" pitchFamily="34" charset="0"/>
                   <a:cs typeface="Segoe UI" pitchFamily="34" charset="0"/>
                 </a:rPr>
-                <a:t>Fique </a:t>
-              </a:r>
-              <a:r>
-                <a:rPr lang="en-US" sz="1200" dirty="0" err="1">
-                  <a:latin typeface="Segoe UI" pitchFamily="34" charset="0"/>
-                  <a:ea typeface="Segoe UI" pitchFamily="34" charset="0"/>
-                  <a:cs typeface="Segoe UI" pitchFamily="34" charset="0"/>
-                </a:rPr>
-                <a:t>Tranquilo</a:t>
+                <a:t>Fique Tranquilo</a:t>
               </a:r>
               <a:endParaRPr lang="en-US" sz="1050" dirty="0">
                 <a:latin typeface="Segoe UI" pitchFamily="34" charset="0"/>
@@ -7193,27 +7097,7 @@
                 <a:ea typeface="+mn-ea"/>
                 <a:cs typeface="+mn-cs"/>
               </a:rPr>
-              <a:t>     Edit      Login      </a:t>
-            </a:r>
-            <a:r>
-              <a:rPr kumimoji="0" lang="en-US" sz="1200" b="0" i="0" u="none" strike="noStrike" kern="0" cap="none" spc="0" normalizeH="0" noProof="0" dirty="0" err="1">
-                <a:ln>
-                  <a:noFill/>
-                </a:ln>
-                <a:solidFill>
-                  <a:srgbClr val="000000">
-                    <a:lumMod val="75000"/>
-                    <a:lumOff val="25000"/>
-                  </a:srgbClr>
-                </a:solidFill>
-                <a:effectLst/>
-                <a:uLnTx/>
-                <a:uFillTx/>
-                <a:latin typeface="Segoe UI"/>
-                <a:ea typeface="+mn-ea"/>
-                <a:cs typeface="+mn-cs"/>
-              </a:rPr>
-              <a:t>Cadastro</a:t>
+              <a:t>     Edit      Login      Cadastro</a:t>
             </a:r>
             <a:endParaRPr kumimoji="0" lang="en-US" sz="1200" b="0" i="0" u="none" strike="noStrike" kern="0" cap="none" spc="0" normalizeH="0" baseline="0" noProof="0" dirty="0">
               <a:ln>
@@ -8436,7 +8320,7 @@
         </p:nvGrpSpPr>
         <p:grpSpPr>
           <a:xfrm>
-            <a:off x="-6840" y="-457200"/>
+            <a:off x="-6240" y="-457200"/>
             <a:ext cx="12198240" cy="6994800"/>
             <a:chOff x="-6840" y="-137160"/>
             <a:chExt cx="12198240" cy="6994800"/>
@@ -9610,17 +9494,6 @@
               <a:lstStyle/>
               <a:p>
                 <a:r>
-                  <a:rPr lang="en-US" sz="1400" b="1" dirty="0" err="1">
-                    <a:solidFill>
-                      <a:schemeClr val="bg1"/>
-                    </a:solidFill>
-                    <a:latin typeface="Segoe UI" pitchFamily="34" charset="0"/>
-                    <a:ea typeface="Segoe UI" pitchFamily="34" charset="0"/>
-                    <a:cs typeface="Segoe UI" pitchFamily="34" charset="0"/>
-                  </a:rPr>
-                  <a:t>Bem</a:t>
-                </a:r>
-                <a:r>
                   <a:rPr lang="en-US" sz="1400" b="1" dirty="0">
                     <a:solidFill>
                       <a:schemeClr val="bg1"/>
@@ -9629,29 +9502,7 @@
                     <a:ea typeface="Segoe UI" pitchFamily="34" charset="0"/>
                     <a:cs typeface="Segoe UI" pitchFamily="34" charset="0"/>
                   </a:rPr>
-                  <a:t> </a:t>
-                </a:r>
-                <a:r>
-                  <a:rPr lang="en-US" sz="1400" b="1" dirty="0" err="1">
-                    <a:solidFill>
-                      <a:schemeClr val="bg1"/>
-                    </a:solidFill>
-                    <a:latin typeface="Segoe UI" pitchFamily="34" charset="0"/>
-                    <a:ea typeface="Segoe UI" pitchFamily="34" charset="0"/>
-                    <a:cs typeface="Segoe UI" pitchFamily="34" charset="0"/>
-                  </a:rPr>
-                  <a:t>vindo</a:t>
-                </a:r>
-                <a:r>
-                  <a:rPr lang="en-US" sz="1400" b="1" dirty="0">
-                    <a:solidFill>
-                      <a:schemeClr val="bg1"/>
-                    </a:solidFill>
-                    <a:latin typeface="Segoe UI" pitchFamily="34" charset="0"/>
-                    <a:ea typeface="Segoe UI" pitchFamily="34" charset="0"/>
-                    <a:cs typeface="Segoe UI" pitchFamily="34" charset="0"/>
-                  </a:rPr>
-                  <a:t>, Fernando </a:t>
+                  <a:t>Bem vindo, Fernando </a:t>
                 </a:r>
               </a:p>
             </p:txBody>
@@ -9696,16 +9547,10 @@
               <a:p>
                 <a:pPr algn="ctr"/>
                 <a:r>
-                  <a:rPr lang="en-US" sz="1200" kern="0" dirty="0" err="1">
-                    <a:latin typeface="Segoe UI"/>
-                  </a:rPr>
-                  <a:t>Perfil</a:t>
-                </a:r>
-                <a:r>
                   <a:rPr lang="en-US" sz="1200" kern="0" dirty="0">
                     <a:latin typeface="Segoe UI"/>
                   </a:rPr>
-                  <a:t> </a:t>
+                  <a:t>Perfil </a:t>
                 </a:r>
               </a:p>
             </p:txBody>
@@ -9894,16 +9739,10 @@
               <a:p>
                 <a:pPr algn="ctr"/>
                 <a:r>
-                  <a:rPr lang="en-US" sz="1200" kern="0" dirty="0" err="1">
-                    <a:latin typeface="Segoe UI"/>
-                  </a:rPr>
-                  <a:t>Chamados</a:t>
-                </a:r>
-                <a:r>
                   <a:rPr lang="en-US" sz="1200" kern="0" dirty="0">
                     <a:latin typeface="Segoe UI"/>
                   </a:rPr>
-                  <a:t> </a:t>
+                  <a:t>Chamados </a:t>
                 </a:r>
               </a:p>
             </p:txBody>
@@ -10047,7 +9886,25 @@
                   </a:solidFill>
                   <a:latin typeface="Segoe UI"/>
                 </a:rPr>
-                <a:t>Sua memória está sendo utilizada acima do adequado  </a:t>
+                <a:t>Sua </a:t>
+              </a:r>
+              <a:r>
+                <a:rPr lang="en-US" sz="1600" kern="0" dirty="0" err="1">
+                  <a:solidFill>
+                    <a:schemeClr val="bg1"/>
+                  </a:solidFill>
+                  <a:latin typeface="Segoe UI"/>
+                </a:rPr>
+                <a:t>memória</a:t>
+              </a:r>
+              <a:r>
+                <a:rPr lang="en-US" sz="1600" kern="0" dirty="0">
+                  <a:solidFill>
+                    <a:schemeClr val="bg1"/>
+                  </a:solidFill>
+                  <a:latin typeface="Segoe UI"/>
+                </a:rPr>
+                <a:t> está sendo utilizada acima do adequado  </a:t>
               </a:r>
               <a:endParaRPr kumimoji="0" lang="en-US" sz="1600" b="0" i="0" u="none" strike="noStrike" kern="0" cap="none" spc="0" normalizeH="0" baseline="0" noProof="0" dirty="0">
                 <a:ln>
@@ -10562,7 +10419,7 @@
           <a:lstStyle/>
           <a:p>
             <a:r>
-              <a:rPr lang="en-US" b="1" dirty="0" err="1">
+              <a:rPr lang="en-US" b="1" dirty="0">
                 <a:solidFill>
                   <a:schemeClr val="bg1"/>
                 </a:solidFill>
@@ -10572,14 +10429,6 @@
               </a:rPr>
               <a:t>Sair</a:t>
             </a:r>
-            <a:endParaRPr lang="en-US" b="1" dirty="0">
-              <a:solidFill>
-                <a:schemeClr val="bg1"/>
-              </a:solidFill>
-              <a:latin typeface="Segoe UI" pitchFamily="34" charset="0"/>
-              <a:ea typeface="Segoe UI" pitchFamily="34" charset="0"/>
-              <a:cs typeface="Segoe UI" pitchFamily="34" charset="0"/>
-            </a:endParaRPr>
           </a:p>
         </p:txBody>
       </p:sp>
@@ -11801,17 +11650,6 @@
               <a:lstStyle/>
               <a:p>
                 <a:r>
-                  <a:rPr lang="en-US" sz="1400" b="1" dirty="0" err="1">
-                    <a:solidFill>
-                      <a:schemeClr val="bg1"/>
-                    </a:solidFill>
-                    <a:latin typeface="Segoe UI" pitchFamily="34" charset="0"/>
-                    <a:ea typeface="Segoe UI" pitchFamily="34" charset="0"/>
-                    <a:cs typeface="Segoe UI" pitchFamily="34" charset="0"/>
-                  </a:rPr>
-                  <a:t>Bem</a:t>
-                </a:r>
-                <a:r>
                   <a:rPr lang="en-US" sz="1400" b="1" dirty="0">
                     <a:solidFill>
                       <a:schemeClr val="bg1"/>
@@ -11820,29 +11658,7 @@
                     <a:ea typeface="Segoe UI" pitchFamily="34" charset="0"/>
                     <a:cs typeface="Segoe UI" pitchFamily="34" charset="0"/>
                   </a:rPr>
-                  <a:t> </a:t>
-                </a:r>
-                <a:r>
-                  <a:rPr lang="en-US" sz="1400" b="1" dirty="0" err="1">
-                    <a:solidFill>
-                      <a:schemeClr val="bg1"/>
-                    </a:solidFill>
-                    <a:latin typeface="Segoe UI" pitchFamily="34" charset="0"/>
-                    <a:ea typeface="Segoe UI" pitchFamily="34" charset="0"/>
-                    <a:cs typeface="Segoe UI" pitchFamily="34" charset="0"/>
-                  </a:rPr>
-                  <a:t>vindo</a:t>
-                </a:r>
-                <a:r>
-                  <a:rPr lang="en-US" sz="1400" b="1" dirty="0">
-                    <a:solidFill>
-                      <a:schemeClr val="bg1"/>
-                    </a:solidFill>
-                    <a:latin typeface="Segoe UI" pitchFamily="34" charset="0"/>
-                    <a:ea typeface="Segoe UI" pitchFamily="34" charset="0"/>
-                    <a:cs typeface="Segoe UI" pitchFamily="34" charset="0"/>
-                  </a:rPr>
-                  <a:t>, Fernando </a:t>
+                  <a:t>Bem vindo, Fernando </a:t>
                 </a:r>
               </a:p>
             </p:txBody>
@@ -11887,16 +11703,10 @@
               <a:p>
                 <a:pPr algn="ctr"/>
                 <a:r>
-                  <a:rPr lang="en-US" sz="1200" kern="0" dirty="0" err="1">
-                    <a:latin typeface="Segoe UI"/>
-                  </a:rPr>
-                  <a:t>Perfil</a:t>
-                </a:r>
-                <a:r>
                   <a:rPr lang="en-US" sz="1200" kern="0" dirty="0">
                     <a:latin typeface="Segoe UI"/>
                   </a:rPr>
-                  <a:t> </a:t>
+                  <a:t>Perfil </a:t>
                 </a:r>
               </a:p>
             </p:txBody>
@@ -12085,16 +11895,10 @@
               <a:p>
                 <a:pPr algn="ctr"/>
                 <a:r>
-                  <a:rPr lang="en-US" sz="1200" kern="0" dirty="0" err="1">
-                    <a:latin typeface="Segoe UI"/>
-                  </a:rPr>
-                  <a:t>Chamados</a:t>
-                </a:r>
-                <a:r>
                   <a:rPr lang="en-US" sz="1200" kern="0" dirty="0">
                     <a:latin typeface="Segoe UI"/>
                   </a:rPr>
-                  <a:t> </a:t>
+                  <a:t>Chamados </a:t>
                 </a:r>
               </a:p>
             </p:txBody>
@@ -12238,7 +12042,25 @@
                   </a:solidFill>
                   <a:latin typeface="Segoe UI"/>
                 </a:rPr>
-                <a:t>Sua memória está sendo utilizada acima do adequado  </a:t>
+                <a:t>Sua </a:t>
+              </a:r>
+              <a:r>
+                <a:rPr lang="en-US" sz="1600" kern="0" dirty="0" err="1">
+                  <a:solidFill>
+                    <a:schemeClr val="bg1"/>
+                  </a:solidFill>
+                  <a:latin typeface="Segoe UI"/>
+                </a:rPr>
+                <a:t>memória</a:t>
+              </a:r>
+              <a:r>
+                <a:rPr lang="en-US" sz="1600" kern="0" dirty="0">
+                  <a:solidFill>
+                    <a:schemeClr val="bg1"/>
+                  </a:solidFill>
+                  <a:latin typeface="Segoe UI"/>
+                </a:rPr>
+                <a:t> está sendo utilizada acima do adequado  </a:t>
               </a:r>
               <a:endParaRPr kumimoji="0" lang="en-US" sz="1600" b="0" i="0" u="none" strike="noStrike" kern="0" cap="none" spc="0" normalizeH="0" baseline="0" noProof="0" dirty="0">
                 <a:ln>
@@ -12753,7 +12575,7 @@
           <a:lstStyle/>
           <a:p>
             <a:r>
-              <a:rPr lang="en-US" b="1" dirty="0" err="1">
+              <a:rPr lang="en-US" b="1" dirty="0">
                 <a:solidFill>
                   <a:schemeClr val="bg1"/>
                 </a:solidFill>
@@ -12763,14 +12585,6 @@
               </a:rPr>
               <a:t>Sair</a:t>
             </a:r>
-            <a:endParaRPr lang="en-US" b="1" dirty="0">
-              <a:solidFill>
-                <a:schemeClr val="bg1"/>
-              </a:solidFill>
-              <a:latin typeface="Segoe UI" pitchFamily="34" charset="0"/>
-              <a:ea typeface="Segoe UI" pitchFamily="34" charset="0"/>
-              <a:cs typeface="Segoe UI" pitchFamily="34" charset="0"/>
-            </a:endParaRPr>
           </a:p>
         </p:txBody>
       </p:sp>
@@ -12953,7 +12767,7 @@
               </a:lstStyle>
               <a:p>
                 <a:r>
-                  <a:rPr lang="en-US" sz="1200" kern="0" dirty="0" err="1">
+                  <a:rPr lang="en-US" sz="1200" kern="0" dirty="0">
                     <a:solidFill>
                       <a:srgbClr val="FFFFFF"/>
                     </a:solidFill>
@@ -12961,12 +12775,6 @@
                   </a:rPr>
                   <a:t>Perfil</a:t>
                 </a:r>
-                <a:endParaRPr lang="en-US" sz="1200" kern="0" dirty="0">
-                  <a:solidFill>
-                    <a:srgbClr val="FFFFFF"/>
-                  </a:solidFill>
-                  <a:latin typeface="Segoe UI"/>
-                </a:endParaRPr>
               </a:p>
               <a:p>
                 <a:endParaRPr lang="en-US" sz="1200" kern="0" dirty="0">
@@ -13870,21 +13678,8 @@
                   <a:ea typeface="Segoe UI" pitchFamily="34" charset="0"/>
                   <a:cs typeface="Segoe UI" pitchFamily="34" charset="0"/>
                 </a:rPr>
-                <a:t>Login: </a:t>
+                <a:t>Login: Fulanes</a:t>
               </a:r>
-              <a:r>
-                <a:rPr lang="en-US" sz="1200" dirty="0" err="1">
-                  <a:latin typeface="Segoe UI" pitchFamily="34" charset="0"/>
-                  <a:ea typeface="Segoe UI" pitchFamily="34" charset="0"/>
-                  <a:cs typeface="Segoe UI" pitchFamily="34" charset="0"/>
-                </a:rPr>
-                <a:t>Fulanes</a:t>
-              </a:r>
-              <a:endParaRPr lang="en-US" sz="1200" dirty="0">
-                <a:latin typeface="Segoe UI" pitchFamily="34" charset="0"/>
-                <a:ea typeface="Segoe UI" pitchFamily="34" charset="0"/>
-                <a:cs typeface="Segoe UI" pitchFamily="34" charset="0"/>
-              </a:endParaRPr>
             </a:p>
             <a:p>
               <a:pPr marL="171450" indent="-171450">
@@ -13903,20 +13698,12 @@
                 <a:buChar char="•"/>
               </a:pPr>
               <a:r>
-                <a:rPr lang="en-US" sz="1200" dirty="0" err="1">
-                  <a:latin typeface="Segoe UI" pitchFamily="34" charset="0"/>
-                  <a:ea typeface="Segoe UI" pitchFamily="34" charset="0"/>
-                  <a:cs typeface="Segoe UI" pitchFamily="34" charset="0"/>
-                </a:rPr>
-                <a:t>Senha</a:t>
-              </a:r>
-              <a:r>
                 <a:rPr lang="en-US" sz="1200" dirty="0">
                   <a:latin typeface="Segoe UI" pitchFamily="34" charset="0"/>
                   <a:ea typeface="Segoe UI" pitchFamily="34" charset="0"/>
                   <a:cs typeface="Segoe UI" pitchFamily="34" charset="0"/>
                 </a:rPr>
-                <a:t>: ******** </a:t>
+                <a:t>Senha: ******** </a:t>
               </a:r>
             </a:p>
             <a:p>
@@ -14169,44 +13956,8 @@
         </p:blipFill>
         <p:spPr>
           <a:xfrm>
-            <a:off x="3802509" y="1996757"/>
-            <a:ext cx="3934966" cy="400732"/>
-          </a:xfrm>
-          <a:prstGeom prst="rect">
-            <a:avLst/>
-          </a:prstGeom>
-        </p:spPr>
-      </p:pic>
-      <p:pic>
-        <p:nvPicPr>
-          <p:cNvPr id="78" name="Picture 1">
-            <a:extLst>
-              <a:ext uri="{FF2B5EF4-FFF2-40B4-BE49-F238E27FC236}">
-                <a16:creationId xmlns:a16="http://schemas.microsoft.com/office/drawing/2014/main" id="{949E97DC-48DC-46D1-9F7C-D35208003CCB}"/>
-              </a:ext>
-            </a:extLst>
-          </p:cNvPr>
-          <p:cNvPicPr preferRelativeResize="0">
-            <a:picLocks/>
-          </p:cNvPicPr>
-          <p:nvPr/>
-        </p:nvPicPr>
-        <p:blipFill>
-          <a:blip r:embed="rId33">
-            <a:extLst>
-              <a:ext uri="{28A0092B-C50C-407E-A947-70E740481C1C}">
-                <a14:useLocalDpi xmlns:a14="http://schemas.microsoft.com/office/drawing/2010/main" val="0"/>
-              </a:ext>
-            </a:extLst>
-          </a:blip>
-          <a:stretch>
-            <a:fillRect/>
-          </a:stretch>
-        </p:blipFill>
-        <p:spPr>
-          <a:xfrm>
-            <a:off x="3809574" y="2331476"/>
-            <a:ext cx="3934966" cy="400732"/>
+            <a:off x="3765886" y="2675739"/>
+            <a:ext cx="3934966" cy="423871"/>
           </a:xfrm>
           <a:prstGeom prst="rect">
             <a:avLst/>
@@ -14241,7 +13992,7 @@
         </p:blipFill>
         <p:spPr>
           <a:xfrm>
-            <a:off x="3826718" y="2730941"/>
+            <a:off x="3825459" y="1941911"/>
             <a:ext cx="3934966" cy="400732"/>
           </a:xfrm>
           <a:prstGeom prst="rect">
@@ -14387,6 +14138,42 @@
           <a:xfrm>
             <a:off x="7404255" y="1269315"/>
             <a:ext cx="427514" cy="399459"/>
+          </a:xfrm>
+          <a:prstGeom prst="rect">
+            <a:avLst/>
+          </a:prstGeom>
+        </p:spPr>
+      </p:pic>
+      <p:pic>
+        <p:nvPicPr>
+          <p:cNvPr id="99" name="Picture 1">
+            <a:extLst>
+              <a:ext uri="{FF2B5EF4-FFF2-40B4-BE49-F238E27FC236}">
+                <a16:creationId xmlns:a16="http://schemas.microsoft.com/office/drawing/2014/main" id="{78DF5C93-1E28-48F2-8981-D7B8C193DD8C}"/>
+              </a:ext>
+            </a:extLst>
+          </p:cNvPr>
+          <p:cNvPicPr preferRelativeResize="0">
+            <a:picLocks/>
+          </p:cNvPicPr>
+          <p:nvPr/>
+        </p:nvPicPr>
+        <p:blipFill>
+          <a:blip r:embed="rId33">
+            <a:extLst>
+              <a:ext uri="{28A0092B-C50C-407E-A947-70E740481C1C}">
+                <a14:useLocalDpi xmlns:a14="http://schemas.microsoft.com/office/drawing/2010/main" val="0"/>
+              </a:ext>
+            </a:extLst>
+          </a:blip>
+          <a:stretch>
+            <a:fillRect/>
+          </a:stretch>
+        </p:blipFill>
+        <p:spPr>
+          <a:xfrm>
+            <a:off x="3750233" y="2307690"/>
+            <a:ext cx="3934966" cy="423871"/>
           </a:xfrm>
           <a:prstGeom prst="rect">
             <a:avLst/>
@@ -17161,7 +16948,7 @@
                   <a:spcPct val="100000"/>
                 </a:lnSpc>
               </a:pPr>
-              <a:endParaRPr lang="pt-BR" sz="1800" b="0" strike="noStrike" spc="-1">
+              <a:endParaRPr lang="pt-BR" sz="1800" b="0" strike="noStrike" spc="-1" dirty="0">
                 <a:latin typeface="Arial"/>
               </a:endParaRPr>
             </a:p>
@@ -17172,7 +16959,7 @@
                 </a:lnSpc>
               </a:pPr>
               <a:r>
-                <a:rPr lang="pt-BR" sz="1100" b="0" strike="noStrike" spc="-1">
+                <a:rPr lang="pt-BR" sz="1100" b="0" strike="noStrike" spc="-1" dirty="0">
                   <a:solidFill>
                     <a:srgbClr val="000000"/>
                   </a:solidFill>
@@ -17181,7 +16968,7 @@
                 <a:t>              </a:t>
               </a:r>
               <a:r>
-                <a:rPr lang="pt-BR" sz="1800" b="0" strike="noStrike" spc="-1">
+                <a:rPr lang="pt-BR" sz="1800" b="0" strike="noStrike" spc="-1" dirty="0">
                   <a:solidFill>
                     <a:srgbClr val="000000"/>
                   </a:solidFill>
@@ -17189,7 +16976,7 @@
                 </a:rPr>
                 <a:t>Relatorios</a:t>
               </a:r>
-              <a:endParaRPr lang="pt-BR" sz="1800" b="0" strike="noStrike" spc="-1">
+              <a:endParaRPr lang="pt-BR" sz="1800" b="0" strike="noStrike" spc="-1" dirty="0">
                 <a:latin typeface="Arial"/>
               </a:endParaRPr>
             </a:p>
@@ -18544,7 +18331,7 @@
                   <a:spcPct val="100000"/>
                 </a:lnSpc>
               </a:pPr>
-              <a:endParaRPr lang="pt-BR" sz="1800" b="0" strike="noStrike" spc="-1">
+              <a:endParaRPr lang="pt-BR" sz="1800" b="0" strike="noStrike" spc="-1" dirty="0">
                 <a:latin typeface="Arial"/>
               </a:endParaRPr>
             </a:p>
@@ -18555,7 +18342,7 @@
                 </a:lnSpc>
               </a:pPr>
               <a:r>
-                <a:rPr lang="pt-BR" sz="1100" b="0" strike="noStrike" spc="-1">
+                <a:rPr lang="pt-BR" sz="1100" b="0" strike="noStrike" spc="-1" dirty="0">
                   <a:solidFill>
                     <a:srgbClr val="000000"/>
                   </a:solidFill>
@@ -18564,7 +18351,7 @@
                 <a:t>              </a:t>
               </a:r>
               <a:r>
-                <a:rPr lang="pt-BR" sz="1800" b="0" strike="noStrike" spc="-1">
+                <a:rPr lang="pt-BR" sz="1800" b="0" strike="noStrike" spc="-1" dirty="0">
                   <a:solidFill>
                     <a:srgbClr val="000000"/>
                   </a:solidFill>
@@ -18572,7 +18359,7 @@
                 </a:rPr>
                 <a:t>Relatorios</a:t>
               </a:r>
-              <a:endParaRPr lang="pt-BR" sz="1800" b="0" strike="noStrike" spc="-1">
+              <a:endParaRPr lang="pt-BR" sz="1800" b="0" strike="noStrike" spc="-1" dirty="0">
                 <a:latin typeface="Arial"/>
               </a:endParaRPr>
             </a:p>
@@ -18782,13 +18569,13 @@
               <a:t>             </a:t>
             </a:r>
             <a:r>
-              <a:rPr lang="pt-BR" sz="1800" b="0" strike="noStrike" spc="-1" dirty="0">
+              <a:rPr lang="pt-BR" spc="-1" dirty="0">
                 <a:solidFill>
                   <a:srgbClr val="000000"/>
                 </a:solidFill>
                 <a:latin typeface="Segoe UI Semibold"/>
               </a:rPr>
-              <a:t>Gráficos</a:t>
+              <a:t>Tempo Real</a:t>
             </a:r>
             <a:endParaRPr lang="pt-BR" sz="1800" b="0" strike="noStrike" spc="-1" dirty="0">
               <a:latin typeface="Arial"/>
@@ -20785,20 +20572,23 @@
               <a:t>Gerar </a:t>
             </a:r>
             <a:r>
-              <a:rPr lang="pt-BR" sz="1200" b="0" strike="noStrike" spc="-1" dirty="0" err="1">
+              <a:rPr lang="pt-BR" sz="1200" spc="-1" dirty="0">
                 <a:solidFill>
                   <a:srgbClr val="000000"/>
                 </a:solidFill>
                 <a:latin typeface="Segoe UI"/>
               </a:rPr>
-              <a:t>excel</a:t>
+              <a:t>E</a:t>
             </a:r>
-            <a:endParaRPr lang="pt-BR" sz="1200" b="0" strike="noStrike" spc="-1" dirty="0">
-              <a:solidFill>
-                <a:srgbClr val="000000"/>
-              </a:solidFill>
-              <a:latin typeface="Segoe UI"/>
-            </a:endParaRPr>
+            <a:r>
+              <a:rPr lang="pt-BR" sz="1200" b="0" strike="noStrike" spc="-1" dirty="0">
+                <a:solidFill>
+                  <a:srgbClr val="000000"/>
+                </a:solidFill>
+                <a:latin typeface="Segoe UI"/>
+              </a:rPr>
+              <a:t>xcel</a:t>
+            </a:r>
           </a:p>
         </p:txBody>
       </p:sp>
@@ -22433,8 +22223,8 @@
         </p:nvGrpSpPr>
         <p:grpSpPr>
           <a:xfrm>
-            <a:off x="-6840" y="-137160"/>
-            <a:ext cx="12198240" cy="6994800"/>
+            <a:off x="-16015" y="0"/>
+            <a:ext cx="12192000" cy="6941066"/>
             <a:chOff x="-6840" y="-137160"/>
             <a:chExt cx="12198240" cy="6994800"/>
           </a:xfrm>
@@ -22517,7 +22307,7 @@
                 </a:lnSpc>
               </a:pPr>
               <a:r>
-                <a:rPr lang="pt-BR" sz="1200" b="0" strike="noStrike" spc="-1">
+                <a:rPr lang="pt-BR" sz="1200" b="0" strike="noStrike" spc="-1" dirty="0">
                   <a:solidFill>
                     <a:srgbClr val="FFFFFF"/>
                   </a:solidFill>
@@ -22526,7 +22316,7 @@
                 </a:rPr>
                 <a:t>Provë  3D</a:t>
               </a:r>
-              <a:endParaRPr lang="pt-BR" sz="1200" b="0" strike="noStrike" spc="-1">
+              <a:endParaRPr lang="pt-BR" sz="1200" b="0" strike="noStrike" spc="-1" dirty="0">
                 <a:latin typeface="Arial"/>
               </a:endParaRPr>
             </a:p>
@@ -23330,7 +23120,7 @@
                 <a:spcPct val="100000"/>
               </a:lnSpc>
             </a:pPr>
-            <a:endParaRPr lang="pt-BR" sz="1800" b="0" strike="noStrike" spc="-1">
+            <a:endParaRPr lang="pt-BR" sz="1800" b="0" strike="noStrike" spc="-1" dirty="0">
               <a:latin typeface="Arial"/>
             </a:endParaRPr>
           </a:p>
@@ -23341,7 +23131,7 @@
               </a:lnSpc>
             </a:pPr>
             <a:r>
-              <a:rPr lang="pt-BR" sz="1100" b="0" strike="noStrike" spc="-1">
+              <a:rPr lang="pt-BR" sz="1100" b="0" strike="noStrike" spc="-1" dirty="0">
                 <a:solidFill>
                   <a:srgbClr val="000000"/>
                 </a:solidFill>
@@ -23350,7 +23140,7 @@
               <a:t>              </a:t>
             </a:r>
             <a:r>
-              <a:rPr lang="pt-BR" sz="1800" b="0" strike="noStrike" spc="-1">
+              <a:rPr lang="pt-BR" sz="1800" b="0" strike="noStrike" spc="-1" dirty="0">
                 <a:solidFill>
                   <a:srgbClr val="000000"/>
                 </a:solidFill>
@@ -23358,7 +23148,7 @@
               </a:rPr>
               <a:t>Desempenho         </a:t>
             </a:r>
-            <a:endParaRPr lang="pt-BR" sz="1800" b="0" strike="noStrike" spc="-1">
+            <a:endParaRPr lang="pt-BR" sz="1800" b="0" strike="noStrike" spc="-1" dirty="0">
               <a:latin typeface="Arial"/>
             </a:endParaRPr>
           </a:p>
@@ -23445,7 +23235,7 @@
                   <a:spcPct val="100000"/>
                 </a:lnSpc>
               </a:pPr>
-              <a:endParaRPr lang="pt-BR" sz="1800" b="0" strike="noStrike" spc="-1">
+              <a:endParaRPr lang="pt-BR" sz="1800" b="0" strike="noStrike" spc="-1" dirty="0">
                 <a:latin typeface="Arial"/>
               </a:endParaRPr>
             </a:p>
@@ -23456,7 +23246,7 @@
                 </a:lnSpc>
               </a:pPr>
               <a:r>
-                <a:rPr lang="pt-BR" sz="1100" b="0" strike="noStrike" spc="-1">
+                <a:rPr lang="pt-BR" sz="1100" b="0" strike="noStrike" spc="-1" dirty="0">
                   <a:solidFill>
                     <a:srgbClr val="000000"/>
                   </a:solidFill>
@@ -23465,15 +23255,15 @@
                 <a:t>              </a:t>
               </a:r>
               <a:r>
-                <a:rPr lang="pt-BR" sz="1800" b="0" strike="noStrike" spc="-1">
+                <a:rPr lang="pt-BR" sz="1800" b="0" strike="noStrike" spc="-1" dirty="0">
                   <a:solidFill>
                     <a:srgbClr val="000000"/>
                   </a:solidFill>
                   <a:latin typeface="Segoe UI Semibold"/>
                 </a:rPr>
-                <a:t>Relatorios</a:t>
+                <a:t>Relatórios</a:t>
               </a:r>
-              <a:endParaRPr lang="pt-BR" sz="1800" b="0" strike="noStrike" spc="-1">
+              <a:endParaRPr lang="pt-BR" sz="1800" b="0" strike="noStrike" spc="-1" dirty="0">
                 <a:latin typeface="Arial"/>
               </a:endParaRPr>
             </a:p>
@@ -23561,7 +23351,7 @@
                   <a:spcPct val="100000"/>
                 </a:lnSpc>
               </a:pPr>
-              <a:endParaRPr lang="pt-BR" sz="1800" b="0" strike="noStrike" spc="-1">
+              <a:endParaRPr lang="pt-BR" sz="1800" b="0" strike="noStrike" spc="-1" dirty="0">
                 <a:latin typeface="Arial"/>
               </a:endParaRPr>
             </a:p>
@@ -23572,7 +23362,7 @@
                 </a:lnSpc>
               </a:pPr>
               <a:r>
-                <a:rPr lang="pt-BR" sz="1100" b="0" strike="noStrike" spc="-1">
+                <a:rPr lang="pt-BR" sz="1100" b="0" strike="noStrike" spc="-1" dirty="0">
                   <a:solidFill>
                     <a:srgbClr val="000000"/>
                   </a:solidFill>
@@ -23581,7 +23371,7 @@
                 <a:t>              </a:t>
               </a:r>
               <a:r>
-                <a:rPr lang="pt-BR" sz="1800" b="0" strike="noStrike" spc="-1">
+                <a:rPr lang="pt-BR" sz="1800" b="0" strike="noStrike" spc="-1" dirty="0">
                   <a:solidFill>
                     <a:srgbClr val="000000"/>
                   </a:solidFill>
@@ -23589,7 +23379,7 @@
                 </a:rPr>
                 <a:t>Perfil</a:t>
               </a:r>
-              <a:endParaRPr lang="pt-BR" sz="1800" b="0" strike="noStrike" spc="-1">
+              <a:endParaRPr lang="pt-BR" sz="1800" b="0" strike="noStrike" spc="-1" dirty="0">
                 <a:latin typeface="Arial"/>
               </a:endParaRPr>
             </a:p>
@@ -23627,7 +23417,7 @@
         </p:nvSpPr>
         <p:spPr>
           <a:xfrm>
-            <a:off x="135361" y="4120560"/>
+            <a:off x="135360" y="4120560"/>
             <a:ext cx="2162520" cy="1045440"/>
           </a:xfrm>
           <a:prstGeom prst="rect">
@@ -23683,13 +23473,13 @@
               <a:t>             </a:t>
             </a:r>
             <a:r>
-              <a:rPr lang="pt-BR" sz="1800" b="0" strike="noStrike" spc="-1" dirty="0">
+              <a:rPr lang="pt-BR" spc="-1" dirty="0">
                 <a:solidFill>
                   <a:srgbClr val="000000"/>
                 </a:solidFill>
                 <a:latin typeface="Segoe UI Semibold"/>
               </a:rPr>
-              <a:t>Gráficos</a:t>
+              <a:t>Tempo Real</a:t>
             </a:r>
             <a:endParaRPr lang="pt-BR" sz="1800" b="0" strike="noStrike" spc="-1" dirty="0">
               <a:latin typeface="Arial"/>
@@ -23764,8 +23554,8 @@
         </p:nvGrpSpPr>
         <p:grpSpPr>
           <a:xfrm>
-            <a:off x="0" y="6463080"/>
-            <a:ext cx="12187080" cy="391320"/>
+            <a:off x="112680" y="6420612"/>
+            <a:ext cx="12068160" cy="404503"/>
             <a:chOff x="0" y="6463080"/>
             <a:chExt cx="12187080" cy="391320"/>
           </a:xfrm>
@@ -24969,7 +24759,7 @@
                 </a:lnSpc>
               </a:pPr>
               <a:r>
-                <a:rPr lang="pt-BR" sz="900" b="0" strike="noStrike" spc="-1">
+                <a:rPr lang="pt-BR" sz="900" b="0" strike="noStrike" spc="-1" dirty="0">
                   <a:solidFill>
                     <a:srgbClr val="FFFFFF"/>
                   </a:solidFill>
@@ -24977,7 +24767,7 @@
                 </a:rPr>
                 <a:t>3:00PM</a:t>
               </a:r>
-              <a:endParaRPr lang="pt-BR" sz="900" b="0" strike="noStrike" spc="-1">
+              <a:endParaRPr lang="pt-BR" sz="900" b="0" strike="noStrike" spc="-1" dirty="0">
                 <a:latin typeface="Arial"/>
               </a:endParaRPr>
             </a:p>
@@ -24988,15 +24778,15 @@
                 </a:lnSpc>
               </a:pPr>
               <a:r>
-                <a:rPr lang="pt-BR" sz="900" b="0" strike="noStrike" spc="-1">
+                <a:rPr lang="pt-BR" sz="900" spc="-1" dirty="0">
                   <a:solidFill>
                     <a:srgbClr val="FFFFFF"/>
                   </a:solidFill>
                   <a:latin typeface="Segoe UI"/>
                 </a:rPr>
-                <a:t>3/14/2011</a:t>
+                <a:t>18/09/2019</a:t>
               </a:r>
-              <a:endParaRPr lang="pt-BR" sz="900" b="0" strike="noStrike" spc="-1">
+              <a:endParaRPr lang="pt-BR" sz="900" b="0" strike="noStrike" spc="-1" dirty="0">
                 <a:latin typeface="Arial"/>
               </a:endParaRPr>
             </a:p>
@@ -26062,7 +25852,7 @@
               </a:lnSpc>
             </a:pPr>
             <a:r>
-              <a:rPr lang="pt-BR" sz="1400" b="0" strike="noStrike" spc="-1">
+              <a:rPr lang="pt-BR" sz="1400" b="0" strike="noStrike" spc="-1" dirty="0">
                 <a:solidFill>
                   <a:srgbClr val="000000"/>
                 </a:solidFill>
@@ -26072,7 +25862,7 @@
               <a:t>CPU</a:t>
             </a:r>
             <a:r>
-              <a:rPr lang="pt-BR" sz="1200" b="0" strike="noStrike" spc="-1">
+              <a:rPr lang="pt-BR" sz="1200" b="0" strike="noStrike" spc="-1" dirty="0">
                 <a:solidFill>
                   <a:srgbClr val="000000"/>
                 </a:solidFill>
@@ -26081,7 +25871,7 @@
               </a:rPr>
               <a:t>:</a:t>
             </a:r>
-            <a:endParaRPr lang="pt-BR" sz="1200" b="0" strike="noStrike" spc="-1">
+            <a:endParaRPr lang="pt-BR" sz="1200" b="0" strike="noStrike" spc="-1" dirty="0">
               <a:latin typeface="Arial"/>
             </a:endParaRPr>
           </a:p>
@@ -32100,7 +31890,7 @@
           <a:p>
             <a:pPr algn="ctr"/>
             <a:r>
-              <a:rPr lang="en-US" dirty="0" err="1">
+              <a:rPr lang="en-US" dirty="0">
                 <a:solidFill>
                   <a:schemeClr val="bg1"/>
                 </a:solidFill>
@@ -32109,13 +31899,6 @@
               </a:rPr>
               <a:t>Processos</a:t>
             </a:r>
-            <a:endParaRPr lang="en-US" dirty="0">
-              <a:solidFill>
-                <a:schemeClr val="bg1"/>
-              </a:solidFill>
-              <a:latin typeface="Segoe UI" panose="020B0502040204020203" pitchFamily="34" charset="0"/>
-              <a:cs typeface="Segoe UI" panose="020B0502040204020203" pitchFamily="34" charset="0"/>
-            </a:endParaRPr>
           </a:p>
         </p:txBody>
       </p:sp>
@@ -37563,15 +37346,7 @@
           <a:p>
             <a:r>
               <a:rPr lang="pt-BR" sz="1400" dirty="0"/>
-              <a:t>05/10/2019 14:30 GPU integrada </a:t>
-            </a:r>
-            <a:r>
-              <a:rPr lang="pt-BR" sz="1400" dirty="0" err="1"/>
-              <a:t>None</a:t>
-            </a:r>
-            <a:r>
-              <a:rPr lang="pt-BR" sz="1400" dirty="0"/>
-              <a:t>.</a:t>
+              <a:t>05/10/2019 14:30 GPU integrada None.</a:t>
             </a:r>
             <a:endParaRPr lang="pt-BR" sz="1400" u="sng" dirty="0"/>
           </a:p>
@@ -37789,27 +37564,8 @@
                     <a:ea typeface="Segoe UI" pitchFamily="34" charset="0"/>
                     <a:cs typeface="Segoe UI" pitchFamily="34" charset="0"/>
                   </a:rPr>
-                  <a:t>Prove 3D - </a:t>
+                  <a:t>Prove 3D - Estatísticas</a:t>
                 </a:r>
-                <a:r>
-                  <a:rPr lang="en-US" sz="1200" dirty="0" err="1">
-                    <a:solidFill>
-                      <a:prstClr val="white"/>
-                    </a:solidFill>
-                    <a:latin typeface="Segoe UI" pitchFamily="34" charset="0"/>
-                    <a:ea typeface="Segoe UI" pitchFamily="34" charset="0"/>
-                    <a:cs typeface="Segoe UI" pitchFamily="34" charset="0"/>
-                  </a:rPr>
-                  <a:t>Estatísticas</a:t>
-                </a:r>
-                <a:endParaRPr lang="en-US" sz="1200" dirty="0">
-                  <a:solidFill>
-                    <a:prstClr val="white"/>
-                  </a:solidFill>
-                  <a:latin typeface="Segoe UI" pitchFamily="34" charset="0"/>
-                  <a:ea typeface="Segoe UI" pitchFamily="34" charset="0"/>
-                  <a:cs typeface="Segoe UI" pitchFamily="34" charset="0"/>
-                </a:endParaRPr>
               </a:p>
             </p:txBody>
           </p:sp>
@@ -40706,18 +40462,13 @@
             <a:p>
               <a:pPr algn="ctr"/>
               <a:r>
-                <a:rPr lang="en-US" sz="1200" dirty="0" err="1">
+                <a:rPr lang="en-US" sz="1200" dirty="0">
                   <a:latin typeface="Segoe UI" pitchFamily="34" charset="0"/>
                   <a:ea typeface="Segoe UI" pitchFamily="34" charset="0"/>
                   <a:cs typeface="Segoe UI" pitchFamily="34" charset="0"/>
                 </a:rPr>
                 <a:t>Memória</a:t>
               </a:r>
-              <a:endParaRPr lang="en-US" sz="1200" dirty="0">
-                <a:latin typeface="Segoe UI" pitchFamily="34" charset="0"/>
-                <a:ea typeface="Segoe UI" pitchFamily="34" charset="0"/>
-                <a:cs typeface="Segoe UI" pitchFamily="34" charset="0"/>
-              </a:endParaRPr>
             </a:p>
           </p:txBody>
         </p:sp>
@@ -40776,12 +40527,8 @@
           <a:lstStyle/>
           <a:p>
             <a:r>
-              <a:rPr lang="en-US" dirty="0" err="1"/>
-              <a:t>Processador</a:t>
-            </a:r>
-            <a:r>
               <a:rPr lang="en-US" dirty="0"/>
-              <a:t>: Intel Core(R) Core(TM) i5-7200U</a:t>
+              <a:t>Processador: Intel Core(R) Core(TM) i5-7200U</a:t>
             </a:r>
           </a:p>
         </p:txBody>
@@ -41071,7 +40818,7 @@
               <a:lstStyle/>
               <a:p>
                 <a:r>
-                  <a:rPr lang="en-US" sz="1200" kern="0" dirty="0" err="1">
+                  <a:rPr lang="en-US" sz="1200" kern="0" dirty="0">
                     <a:solidFill>
                       <a:srgbClr val="FFFFFF"/>
                     </a:solidFill>
@@ -41079,12 +40826,6 @@
                   </a:rPr>
                   <a:t>Atenção</a:t>
                 </a:r>
-                <a:endParaRPr lang="en-US" sz="1200" kern="0" dirty="0">
-                  <a:solidFill>
-                    <a:srgbClr val="FFFFFF"/>
-                  </a:solidFill>
-                  <a:latin typeface="Segoe UI"/>
-                </a:endParaRPr>
               </a:p>
             </p:txBody>
           </p:sp>
@@ -41305,55 +41046,7 @@
                   <a:ea typeface="Segoe UI" pitchFamily="34" charset="0"/>
                   <a:cs typeface="Segoe UI" pitchFamily="34" charset="0"/>
                 </a:rPr>
-                <a:t>A temperature da CPU </a:t>
-              </a:r>
-              <a:r>
-                <a:rPr lang="en-US" sz="1200" dirty="0" err="1">
-                  <a:latin typeface="Segoe UI" pitchFamily="34" charset="0"/>
-                  <a:ea typeface="Segoe UI" pitchFamily="34" charset="0"/>
-                  <a:cs typeface="Segoe UI" pitchFamily="34" charset="0"/>
-                </a:rPr>
-                <a:t>está</a:t>
-              </a:r>
-              <a:r>
-                <a:rPr lang="en-US" sz="1200" dirty="0">
-                  <a:latin typeface="Segoe UI" pitchFamily="34" charset="0"/>
-                  <a:ea typeface="Segoe UI" pitchFamily="34" charset="0"/>
-                  <a:cs typeface="Segoe UI" pitchFamily="34" charset="0"/>
-                </a:rPr>
-                <a:t> </a:t>
-              </a:r>
-              <a:r>
-                <a:rPr lang="en-US" sz="1200" dirty="0" err="1">
-                  <a:latin typeface="Segoe UI" pitchFamily="34" charset="0"/>
-                  <a:ea typeface="Segoe UI" pitchFamily="34" charset="0"/>
-                  <a:cs typeface="Segoe UI" pitchFamily="34" charset="0"/>
-                </a:rPr>
-                <a:t>muito</a:t>
-              </a:r>
-              <a:r>
-                <a:rPr lang="en-US" sz="1200" dirty="0">
-                  <a:latin typeface="Segoe UI" pitchFamily="34" charset="0"/>
-                  <a:ea typeface="Segoe UI" pitchFamily="34" charset="0"/>
-                  <a:cs typeface="Segoe UI" pitchFamily="34" charset="0"/>
-                </a:rPr>
-                <a:t> </a:t>
-              </a:r>
-              <a:r>
-                <a:rPr lang="en-US" sz="1200" dirty="0" err="1">
-                  <a:latin typeface="Segoe UI" pitchFamily="34" charset="0"/>
-                  <a:ea typeface="Segoe UI" pitchFamily="34" charset="0"/>
-                  <a:cs typeface="Segoe UI" pitchFamily="34" charset="0"/>
-                </a:rPr>
-                <a:t>elevada</a:t>
-              </a:r>
-              <a:r>
-                <a:rPr lang="en-US" sz="1200" dirty="0">
-                  <a:latin typeface="Segoe UI" pitchFamily="34" charset="0"/>
-                  <a:ea typeface="Segoe UI" pitchFamily="34" charset="0"/>
-                  <a:cs typeface="Segoe UI" pitchFamily="34" charset="0"/>
-                </a:rPr>
-                <a:t>!</a:t>
+                <a:t>A temperature da CPU está muito elevada!</a:t>
               </a:r>
             </a:p>
           </p:txBody>
@@ -41788,27 +41481,8 @@
                     <a:ea typeface="Segoe UI" pitchFamily="34" charset="0"/>
                     <a:cs typeface="Segoe UI" pitchFamily="34" charset="0"/>
                   </a:rPr>
-                  <a:t>Prove 3D - </a:t>
+                  <a:t>Prove 3D - Estatísticas</a:t>
                 </a:r>
-                <a:r>
-                  <a:rPr lang="en-US" sz="1200" dirty="0" err="1">
-                    <a:solidFill>
-                      <a:prstClr val="white"/>
-                    </a:solidFill>
-                    <a:latin typeface="Segoe UI" pitchFamily="34" charset="0"/>
-                    <a:ea typeface="Segoe UI" pitchFamily="34" charset="0"/>
-                    <a:cs typeface="Segoe UI" pitchFamily="34" charset="0"/>
-                  </a:rPr>
-                  <a:t>Estatísticas</a:t>
-                </a:r>
-                <a:endParaRPr lang="en-US" sz="1200" dirty="0">
-                  <a:solidFill>
-                    <a:prstClr val="white"/>
-                  </a:solidFill>
-                  <a:latin typeface="Segoe UI" pitchFamily="34" charset="0"/>
-                  <a:ea typeface="Segoe UI" pitchFamily="34" charset="0"/>
-                  <a:cs typeface="Segoe UI" pitchFamily="34" charset="0"/>
-                </a:endParaRPr>
               </a:p>
             </p:txBody>
           </p:sp>
@@ -44705,18 +44379,13 @@
             <a:p>
               <a:pPr algn="ctr"/>
               <a:r>
-                <a:rPr lang="en-US" sz="1200" dirty="0" err="1">
+                <a:rPr lang="en-US" sz="1200" dirty="0">
                   <a:latin typeface="Segoe UI" pitchFamily="34" charset="0"/>
                   <a:ea typeface="Segoe UI" pitchFamily="34" charset="0"/>
                   <a:cs typeface="Segoe UI" pitchFamily="34" charset="0"/>
                 </a:rPr>
                 <a:t>Memória</a:t>
               </a:r>
-              <a:endParaRPr lang="en-US" sz="1200" dirty="0">
-                <a:latin typeface="Segoe UI" pitchFamily="34" charset="0"/>
-                <a:ea typeface="Segoe UI" pitchFamily="34" charset="0"/>
-                <a:cs typeface="Segoe UI" pitchFamily="34" charset="0"/>
-              </a:endParaRPr>
             </a:p>
           </p:txBody>
         </p:sp>
@@ -44974,15 +44643,7 @@
           <a:p>
             <a:r>
               <a:rPr lang="pt-BR" dirty="0"/>
-              <a:t>          41,2 KB/s			                                             0,8 </a:t>
-            </a:r>
-            <a:r>
-              <a:rPr lang="pt-BR" dirty="0" err="1"/>
-              <a:t>ms</a:t>
-            </a:r>
-            <a:r>
-              <a:rPr lang="pt-BR" dirty="0"/>
-              <a:t>   			</a:t>
+              <a:t>          41,2 KB/s			                                             0,8 ms   			</a:t>
             </a:r>
           </a:p>
         </p:txBody>
@@ -45296,27 +44957,8 @@
                     <a:ea typeface="Segoe UI" pitchFamily="34" charset="0"/>
                     <a:cs typeface="Segoe UI" pitchFamily="34" charset="0"/>
                   </a:rPr>
-                  <a:t>Prove 3D - </a:t>
+                  <a:t>Prove 3D - Estatísticas</a:t>
                 </a:r>
-                <a:r>
-                  <a:rPr lang="en-US" sz="1200" dirty="0" err="1">
-                    <a:solidFill>
-                      <a:prstClr val="white"/>
-                    </a:solidFill>
-                    <a:latin typeface="Segoe UI" pitchFamily="34" charset="0"/>
-                    <a:ea typeface="Segoe UI" pitchFamily="34" charset="0"/>
-                    <a:cs typeface="Segoe UI" pitchFamily="34" charset="0"/>
-                  </a:rPr>
-                  <a:t>Estatísticas</a:t>
-                </a:r>
-                <a:endParaRPr lang="en-US" sz="1200" dirty="0">
-                  <a:solidFill>
-                    <a:prstClr val="white"/>
-                  </a:solidFill>
-                  <a:latin typeface="Segoe UI" pitchFamily="34" charset="0"/>
-                  <a:ea typeface="Segoe UI" pitchFamily="34" charset="0"/>
-                  <a:cs typeface="Segoe UI" pitchFamily="34" charset="0"/>
-                </a:endParaRPr>
               </a:p>
             </p:txBody>
           </p:sp>
@@ -48213,18 +47855,13 @@
             <a:p>
               <a:pPr algn="ctr"/>
               <a:r>
-                <a:rPr lang="en-US" sz="1200" dirty="0" err="1">
+                <a:rPr lang="en-US" sz="1200" dirty="0">
                   <a:latin typeface="Segoe UI" pitchFamily="34" charset="0"/>
                   <a:ea typeface="Segoe UI" pitchFamily="34" charset="0"/>
                   <a:cs typeface="Segoe UI" pitchFamily="34" charset="0"/>
                 </a:rPr>
                 <a:t>Memória</a:t>
               </a:r>
-              <a:endParaRPr lang="en-US" sz="1200" dirty="0">
-                <a:latin typeface="Segoe UI" pitchFamily="34" charset="0"/>
-                <a:ea typeface="Segoe UI" pitchFamily="34" charset="0"/>
-                <a:cs typeface="Segoe UI" pitchFamily="34" charset="0"/>
-              </a:endParaRPr>
             </a:p>
           </p:txBody>
         </p:sp>
@@ -48284,15 +47921,7 @@
           <a:p>
             <a:r>
               <a:rPr lang="en-US" dirty="0"/>
-              <a:t>GPU </a:t>
-            </a:r>
-            <a:r>
-              <a:rPr lang="en-US" dirty="0" err="1"/>
-              <a:t>Integrada</a:t>
-            </a:r>
-            <a:r>
-              <a:rPr lang="en-US" dirty="0"/>
-              <a:t>: Intel(R) HD Graphics 620</a:t>
+              <a:t>GPU Integrada: Intel(R) HD Graphics 620</a:t>
             </a:r>
           </a:p>
         </p:txBody>
@@ -48653,15 +48282,7 @@
           <a:p>
             <a:r>
               <a:rPr lang="en-US" dirty="0"/>
-              <a:t>GPU </a:t>
-            </a:r>
-            <a:r>
-              <a:rPr lang="en-US" dirty="0" err="1"/>
-              <a:t>Compartilhada</a:t>
-            </a:r>
-            <a:r>
-              <a:rPr lang="en-US" dirty="0"/>
-              <a:t>: NVIDIA GeForce MX110</a:t>
+              <a:t>GPU Compartilhada: NVIDIA GeForce MX110</a:t>
             </a:r>
           </a:p>
         </p:txBody>
@@ -49015,27 +48636,8 @@
                     <a:ea typeface="Segoe UI" pitchFamily="34" charset="0"/>
                     <a:cs typeface="Segoe UI" pitchFamily="34" charset="0"/>
                   </a:rPr>
-                  <a:t>Prove 3D - </a:t>
+                  <a:t>Prove 3D - Estatísticas</a:t>
                 </a:r>
-                <a:r>
-                  <a:rPr lang="en-US" sz="1200" dirty="0" err="1">
-                    <a:solidFill>
-                      <a:prstClr val="white"/>
-                    </a:solidFill>
-                    <a:latin typeface="Segoe UI" pitchFamily="34" charset="0"/>
-                    <a:ea typeface="Segoe UI" pitchFamily="34" charset="0"/>
-                    <a:cs typeface="Segoe UI" pitchFamily="34" charset="0"/>
-                  </a:rPr>
-                  <a:t>Estatísticas</a:t>
-                </a:r>
-                <a:endParaRPr lang="en-US" sz="1200" dirty="0">
-                  <a:solidFill>
-                    <a:prstClr val="white"/>
-                  </a:solidFill>
-                  <a:latin typeface="Segoe UI" pitchFamily="34" charset="0"/>
-                  <a:ea typeface="Segoe UI" pitchFamily="34" charset="0"/>
-                  <a:cs typeface="Segoe UI" pitchFamily="34" charset="0"/>
-                </a:endParaRPr>
               </a:p>
             </p:txBody>
           </p:sp>
@@ -51932,18 +51534,13 @@
             <a:p>
               <a:pPr algn="ctr"/>
               <a:r>
-                <a:rPr lang="en-US" sz="1200" dirty="0" err="1">
+                <a:rPr lang="en-US" sz="1200" dirty="0">
                   <a:latin typeface="Segoe UI" pitchFamily="34" charset="0"/>
                   <a:ea typeface="Segoe UI" pitchFamily="34" charset="0"/>
                   <a:cs typeface="Segoe UI" pitchFamily="34" charset="0"/>
                 </a:rPr>
                 <a:t>Memória</a:t>
               </a:r>
-              <a:endParaRPr lang="en-US" sz="1200" dirty="0">
-                <a:latin typeface="Segoe UI" pitchFamily="34" charset="0"/>
-                <a:ea typeface="Segoe UI" pitchFamily="34" charset="0"/>
-                <a:cs typeface="Segoe UI" pitchFamily="34" charset="0"/>
-              </a:endParaRPr>
             </a:p>
           </p:txBody>
         </p:sp>
@@ -52163,23 +51760,7 @@
           <a:p>
             <a:r>
               <a:rPr lang="pt-BR" dirty="0"/>
-              <a:t>Cache:		                  </a:t>
-            </a:r>
-            <a:r>
-              <a:rPr lang="pt-BR" dirty="0" err="1"/>
-              <a:t>Páginavel</a:t>
-            </a:r>
-            <a:r>
-              <a:rPr lang="pt-BR" dirty="0"/>
-              <a:t>:			Não </a:t>
-            </a:r>
-            <a:r>
-              <a:rPr lang="pt-BR" dirty="0" err="1"/>
-              <a:t>Páginavel</a:t>
-            </a:r>
-            <a:r>
-              <a:rPr lang="pt-BR" dirty="0"/>
-              <a:t>:</a:t>
+              <a:t>Cache:		                  Paginável:			Não Paginável:</a:t>
             </a:r>
           </a:p>
         </p:txBody>
@@ -52258,18 +51839,13 @@
           <a:p>
             <a:pPr algn="ctr"/>
             <a:r>
-              <a:rPr lang="en-US" sz="1200" dirty="0" err="1">
+              <a:rPr lang="en-US" sz="1200" dirty="0">
                 <a:latin typeface="Segoe UI" pitchFamily="34" charset="0"/>
                 <a:ea typeface="Segoe UI" pitchFamily="34" charset="0"/>
                 <a:cs typeface="Segoe UI" pitchFamily="34" charset="0"/>
               </a:rPr>
               <a:t>Memória</a:t>
             </a:r>
-            <a:endParaRPr lang="en-US" sz="1200" dirty="0">
-              <a:latin typeface="Segoe UI" pitchFamily="34" charset="0"/>
-              <a:ea typeface="Segoe UI" pitchFamily="34" charset="0"/>
-              <a:cs typeface="Segoe UI" pitchFamily="34" charset="0"/>
-            </a:endParaRPr>
           </a:p>
         </p:txBody>
       </p:sp>
@@ -52603,27 +52179,8 @@
                     <a:ea typeface="Segoe UI" pitchFamily="34" charset="0"/>
                     <a:cs typeface="Segoe UI" pitchFamily="34" charset="0"/>
                   </a:rPr>
-                  <a:t>Provë 3D - </a:t>
+                  <a:t>Provë 3D - Processos</a:t>
                 </a:r>
-                <a:r>
-                  <a:rPr lang="en-US" sz="1050" dirty="0" err="1">
-                    <a:solidFill>
-                      <a:prstClr val="white"/>
-                    </a:solidFill>
-                    <a:latin typeface="Segoe UI" pitchFamily="34" charset="0"/>
-                    <a:ea typeface="Segoe UI" pitchFamily="34" charset="0"/>
-                    <a:cs typeface="Segoe UI" pitchFamily="34" charset="0"/>
-                  </a:rPr>
-                  <a:t>Processos</a:t>
-                </a:r>
-                <a:endParaRPr lang="en-US" sz="1050" dirty="0">
-                  <a:solidFill>
-                    <a:prstClr val="white"/>
-                  </a:solidFill>
-                  <a:latin typeface="Segoe UI" pitchFamily="34" charset="0"/>
-                  <a:ea typeface="Segoe UI" pitchFamily="34" charset="0"/>
-                  <a:cs typeface="Segoe UI" pitchFamily="34" charset="0"/>
-                </a:endParaRPr>
               </a:p>
             </p:txBody>
           </p:sp>
@@ -53457,7 +53014,7 @@
           <a:p>
             <a:pPr algn="ctr"/>
             <a:r>
-              <a:rPr lang="en-US" sz="3600" b="1" dirty="0" err="1">
+              <a:rPr lang="en-US" sz="3600" b="1" dirty="0">
                 <a:solidFill>
                   <a:srgbClr val="000000"/>
                 </a:solidFill>
@@ -53465,12 +53022,6 @@
               </a:rPr>
               <a:t>Prioridade</a:t>
             </a:r>
-            <a:endParaRPr lang="en-US" sz="3600" b="1" dirty="0">
-              <a:solidFill>
-                <a:srgbClr val="000000"/>
-              </a:solidFill>
-              <a:cs typeface="Segoe UI" pitchFamily="34" charset="0"/>
-            </a:endParaRPr>
           </a:p>
         </p:txBody>
       </p:sp>
@@ -53676,13 +53227,7 @@
               <a:rPr lang="en-US" sz="3600" b="1" dirty="0">
                 <a:cs typeface="Segoe UI" pitchFamily="34" charset="0"/>
               </a:rPr>
-              <a:t>Tempo de </a:t>
-            </a:r>
-            <a:r>
-              <a:rPr lang="en-US" sz="3600" b="1" dirty="0" err="1">
-                <a:cs typeface="Segoe UI" pitchFamily="34" charset="0"/>
-              </a:rPr>
-              <a:t>Atividade</a:t>
+              <a:t>Tempo de Atividade</a:t>
             </a:r>
             <a:endParaRPr lang="en-US" sz="3600" b="1" dirty="0">
               <a:solidFill>
@@ -53896,25 +53441,11 @@
           <a:lstStyle/>
           <a:p>
             <a:r>
-              <a:rPr lang="en-US" sz="2000" b="1" dirty="0" err="1">
-                <a:latin typeface="Segoe UI" pitchFamily="34" charset="0"/>
-                <a:cs typeface="Segoe UI" pitchFamily="34" charset="0"/>
-              </a:rPr>
-              <a:t>Processos</a:t>
-            </a:r>
-            <a:r>
               <a:rPr lang="en-US" sz="2000" b="1" dirty="0">
                 <a:latin typeface="Segoe UI" pitchFamily="34" charset="0"/>
                 <a:cs typeface="Segoe UI" pitchFamily="34" charset="0"/>
               </a:rPr>
-              <a:t> do </a:t>
-            </a:r>
-            <a:r>
-              <a:rPr lang="en-US" sz="2000" b="1" dirty="0" err="1">
-                <a:latin typeface="Segoe UI" pitchFamily="34" charset="0"/>
-                <a:cs typeface="Segoe UI" pitchFamily="34" charset="0"/>
-              </a:rPr>
-              <a:t>Computador</a:t>
+              <a:t>Processos do Computador</a:t>
             </a:r>
             <a:endParaRPr lang="en-US" sz="2000" b="1" dirty="0">
               <a:solidFill>
@@ -56444,67 +55975,67 @@
 
 <file path=customXml/item1.xml><?xml version="1.0" encoding="utf-8"?>
 <Control xmlns="http://schemas.microsoft.com/VisualStudio/2011/storyboarding/control">
-  <Id Name="System.Storyboarding.Common.Button" Revision="1" Stencil="System.Storyboarding.Common" StencilVersion="0.1"/>
+  <Id Name="System.Storyboarding.WindowsDesktop.MenuBar" Revision="1" Stencil="System.Storyboarding.WindowsDesktop" StencilVersion="0.1"/>
 </Control>
 </file>
 
 <file path=customXml/item10.xml><?xml version="1.0" encoding="utf-8"?>
 <Control xmlns="http://schemas.microsoft.com/VisualStudio/2011/storyboarding/control">
-  <Id Name="System.Storyboarding.Backgrounds.Window" Revision="1" Stencil="System.Storyboarding.Backgrounds" StencilVersion="0.1"/>
+  <Id Name="System.Storyboarding.WindowsApps.WindowsAppsMediumWideTile" Revision="1" Stencil="System.Storyboarding.WindowsApps" StencilVersion="0.1"/>
 </Control>
 </file>
 
 <file path=customXml/item100.xml><?xml version="1.0" encoding="utf-8"?>
 <Control xmlns="http://schemas.microsoft.com/VisualStudio/2011/storyboarding/control">
-  <Id Name="System.Storyboarding.WindowsPhone.Tile" Revision="1" Stencil="System.Storyboarding.WindowsPhone" StencilVersion="0.1"/>
+  <Id Name="System.Storyboarding.Common.TextArea" Revision="1" Stencil="System.Storyboarding.Common" StencilVersion="0.1"/>
 </Control>
 </file>
 
 <file path=customXml/item101.xml><?xml version="1.0" encoding="utf-8"?>
 <Control xmlns="http://schemas.microsoft.com/VisualStudio/2011/storyboarding/control">
-  <Id Name="System.Storyboarding.Common.Text" Revision="1" Stencil="System.Storyboarding.Common" StencilVersion="0.1"/>
+  <Id Name="System.Storyboarding.WindowsDesktop.MenuBar" Revision="1" Stencil="System.Storyboarding.WindowsDesktop" StencilVersion="0.1"/>
 </Control>
 </file>
 
 <file path=customXml/item102.xml><?xml version="1.0" encoding="utf-8"?>
 <Control xmlns="http://schemas.microsoft.com/VisualStudio/2011/storyboarding/control">
-  <Id Name="System.Storyboarding.Backgrounds.Window" Revision="1" Stencil="System.Storyboarding.Backgrounds" StencilVersion="0.1"/>
+  <Id Name="System.Storyboarding.WindowsApps.WindowsAppsTileMedium" Revision="1" Stencil="System.Storyboarding.WindowsApps" StencilVersion="0.1"/>
 </Control>
 </file>
 
 <file path=customXml/item11.xml><?xml version="1.0" encoding="utf-8"?>
 <Control xmlns="http://schemas.microsoft.com/VisualStudio/2011/storyboarding/control">
-  <Id Name="System.Storyboarding.WindowsApps.WindowsAppsContextMenu" Revision="1" Stencil="System.Storyboarding.WindowsApps" StencilVersion="0.1"/>
+  <Id Name="System.Storyboarding.Icons.User" Revision="1" Stencil="System.Storyboarding.Icons" StencilVersion="0.1"/>
 </Control>
 </file>
 
 <file path=customXml/item12.xml><?xml version="1.0" encoding="utf-8"?>
 <Control xmlns="http://schemas.microsoft.com/VisualStudio/2011/storyboarding/control">
-  <Id Name="System.Storyboarding.Common.Button" Revision="1" Stencil="System.Storyboarding.Common" StencilVersion="0.1"/>
+  <Id Name="System.Storyboarding.WindowsDesktop.Group" Revision="1" Stencil="System.Storyboarding.WindowsDesktop" StencilVersion="0.1"/>
 </Control>
 </file>
 
 <file path=customXml/item13.xml><?xml version="1.0" encoding="utf-8"?>
 <Control xmlns="http://schemas.microsoft.com/VisualStudio/2011/storyboarding/control">
-  <Id Name="System.Storyboarding.Backgrounds.WebBrowser" Revision="1" Stencil="System.Storyboarding.Backgrounds" StencilVersion="0.1"/>
+  <Id Name="System.Storyboarding.WindowsDesktop.Group" Revision="1" Stencil="System.Storyboarding.WindowsDesktop" StencilVersion="0.1"/>
 </Control>
 </file>
 
 <file path=customXml/item14.xml><?xml version="1.0" encoding="utf-8"?>
 <Control xmlns="http://schemas.microsoft.com/VisualStudio/2011/storyboarding/control">
-  <Id Name="System.Storyboarding.Backgrounds.Window" Revision="1" Stencil="System.Storyboarding.Backgrounds" StencilVersion="0.1"/>
+  <Id Name="System.Storyboarding.WindowsPhone.Tile" Revision="1" Stencil="System.Storyboarding.WindowsPhone" StencilVersion="0.1"/>
 </Control>
 </file>
 
 <file path=customXml/item15.xml><?xml version="1.0" encoding="utf-8"?>
 <Control xmlns="http://schemas.microsoft.com/VisualStudio/2011/storyboarding/control">
-  <Id Name="System.Storyboarding.WindowsDesktop.AlertDialog" Revision="1" Stencil="System.Storyboarding.WindowsDesktop" StencilVersion="0.1"/>
+  <Id Name="System.Storyboarding.WindowsPhone.Tile" Revision="1" Stencil="System.Storyboarding.WindowsPhone" StencilVersion="0.1"/>
 </Control>
 </file>
 
 <file path=customXml/item16.xml><?xml version="1.0" encoding="utf-8"?>
 <Control xmlns="http://schemas.microsoft.com/VisualStudio/2011/storyboarding/control">
-  <Id Name="System.Storyboarding.Common.TextInput" Revision="1" Stencil="System.Storyboarding.Common" StencilVersion="0.1"/>
+  <Id Name="System.Storyboarding.Backgrounds.Window" Revision="1" Stencil="System.Storyboarding.Backgrounds" StencilVersion="0.1"/>
 </Control>
 </file>
 
@@ -56516,79 +56047,79 @@
 
 <file path=customXml/item18.xml><?xml version="1.0" encoding="utf-8"?>
 <Control xmlns="http://schemas.microsoft.com/VisualStudio/2011/storyboarding/control">
-  <Id Name="System.Storyboarding.WindowsDesktop.Group" Revision="1" Stencil="System.Storyboarding.WindowsDesktop" StencilVersion="0.1"/>
+  <Id Name="System.Storyboarding.Common.TextArea" Revision="1" Stencil="System.Storyboarding.Common" StencilVersion="0.1"/>
 </Control>
 </file>
 
 <file path=customXml/item19.xml><?xml version="1.0" encoding="utf-8"?>
 <Control xmlns="http://schemas.microsoft.com/VisualStudio/2011/storyboarding/control">
-  <Id Name="System.Storyboarding.WindowsDesktop.MenuBar" Revision="1" Stencil="System.Storyboarding.WindowsDesktop" StencilVersion="0.1"/>
+  <Id Name="System.Storyboarding.Common.Text" Revision="1" Stencil="System.Storyboarding.Common" StencilVersion="0.1"/>
 </Control>
 </file>
 
 <file path=customXml/item2.xml><?xml version="1.0" encoding="utf-8"?>
 <Control xmlns="http://schemas.microsoft.com/VisualStudio/2011/storyboarding/control">
-  <Id Name="System.Storyboarding.Backgrounds.Window" Revision="1" Stencil="System.Storyboarding.Backgrounds" StencilVersion="0.1"/>
+  <Id Name="System.Storyboarding.WindowsDesktop.Group" Revision="1" Stencil="System.Storyboarding.WindowsDesktop" StencilVersion="0.1"/>
 </Control>
 </file>
 
 <file path=customXml/item20.xml><?xml version="1.0" encoding="utf-8"?>
 <Control xmlns="http://schemas.microsoft.com/VisualStudio/2011/storyboarding/control">
-  <Id Name="System.Storyboarding.Common.TextArea" Revision="1" Stencil="System.Storyboarding.Common" StencilVersion="0.1"/>
+  <Id Name="System.Storyboarding.Backgrounds.StartScreen" Revision="1" Stencil="System.Storyboarding.Backgrounds" StencilVersion="0.1"/>
 </Control>
 </file>
 
 <file path=customXml/item21.xml><?xml version="1.0" encoding="utf-8"?>
 <Control xmlns="http://schemas.microsoft.com/VisualStudio/2011/storyboarding/control">
-  <Id Name="System.Storyboarding.WindowsDesktop.MenuBar" Revision="1" Stencil="System.Storyboarding.WindowsDesktop" StencilVersion="0.1"/>
+  <Id Name="System.Storyboarding.WindowsPhone.Tile" Revision="1" Stencil="System.Storyboarding.WindowsPhone" StencilVersion="0.1"/>
 </Control>
 </file>
 
 <file path=customXml/item22.xml><?xml version="1.0" encoding="utf-8"?>
 <Control xmlns="http://schemas.microsoft.com/VisualStudio/2011/storyboarding/control">
-  <Id Name="System.Storyboarding.Common.TabGroup" Revision="1" Stencil="System.Storyboarding.Common" StencilVersion="0.1"/>
+  <Id Name="System.Storyboarding.WindowsDesktop.MenuBar" Revision="1" Stencil="System.Storyboarding.WindowsDesktop" StencilVersion="0.1"/>
 </Control>
 </file>
 
 <file path=customXml/item23.xml><?xml version="1.0" encoding="utf-8"?>
 <Control xmlns="http://schemas.microsoft.com/VisualStudio/2011/storyboarding/control">
-  <Id Name="System.Storyboarding.WindowsDesktop.Group" Revision="1" Stencil="System.Storyboarding.WindowsDesktop" StencilVersion="0.1"/>
+  <Id Name="System.Storyboarding.Backgrounds.Window" Revision="1" Stencil="System.Storyboarding.Backgrounds" StencilVersion="0.1"/>
 </Control>
 </file>
 
 <file path=customXml/item24.xml><?xml version="1.0" encoding="utf-8"?>
 <Control xmlns="http://schemas.microsoft.com/VisualStudio/2011/storyboarding/control">
-  <Id Name="System.Storyboarding.Common.TextArea" Revision="1" Stencil="System.Storyboarding.Common" StencilVersion="0.1"/>
+  <Id Name="System.Storyboarding.Common.TabGroup" Revision="1" Stencil="System.Storyboarding.Common" StencilVersion="0.1"/>
 </Control>
 </file>
 
 <file path=customXml/item25.xml><?xml version="1.0" encoding="utf-8"?>
 <Control xmlns="http://schemas.microsoft.com/VisualStudio/2011/storyboarding/control">
-  <Id Name="System.Storyboarding.WindowsApps.WindowsAppsMediumWideTile" Revision="1" Stencil="System.Storyboarding.WindowsApps" StencilVersion="0.1"/>
+  <Id Name="System.Storyboarding.Backgrounds.DesktopTaskbar" Revision="1" Stencil="System.Storyboarding.Backgrounds" StencilVersion="0.1"/>
 </Control>
 </file>
 
 <file path=customXml/item26.xml><?xml version="1.0" encoding="utf-8"?>
 <Control xmlns="http://schemas.microsoft.com/VisualStudio/2011/storyboarding/control">
-  <Id Name="System.Storyboarding.WindowsApps.WindowsAppsTileMedium" Revision="1" Stencil="System.Storyboarding.WindowsApps" StencilVersion="0.1"/>
+  <Id Name="System.Storyboarding.Common.TextArea" Revision="1" Stencil="System.Storyboarding.Common" StencilVersion="0.1"/>
 </Control>
 </file>
 
 <file path=customXml/item27.xml><?xml version="1.0" encoding="utf-8"?>
 <Control xmlns="http://schemas.microsoft.com/VisualStudio/2011/storyboarding/control">
-  <Id Name="System.Storyboarding.Backgrounds.DesktopTaskbar" Revision="1" Stencil="System.Storyboarding.Backgrounds" StencilVersion="0.1"/>
+  <Id Name="System.Storyboarding.Backgrounds.WebBrowser" Revision="1" Stencil="System.Storyboarding.Backgrounds" StencilVersion="0.1"/>
 </Control>
 </file>
 
 <file path=customXml/item28.xml><?xml version="1.0" encoding="utf-8"?>
 <Control xmlns="http://schemas.microsoft.com/VisualStudio/2011/storyboarding/control">
-  <Id Name="System.Storyboarding.Common.TabGroup" Revision="1" Stencil="System.Storyboarding.Common" StencilVersion="0.1"/>
+  <Id Name="System.Storyboarding.Backgrounds.StartMenu" Revision="1" Stencil="System.Storyboarding.Backgrounds" StencilVersion="0.1"/>
 </Control>
 </file>
 
 <file path=customXml/item29.xml><?xml version="1.0" encoding="utf-8"?>
 <Control xmlns="http://schemas.microsoft.com/VisualStudio/2011/storyboarding/control">
-  <Id Name="System.Storyboarding.WindowsDesktop.DialogBox" Revision="1" Stencil="System.Storyboarding.WindowsDesktop" StencilVersion="0.1"/>
+  <Id Name="System.Storyboarding.WindowsDesktop.MenuBar" Revision="1" Stencil="System.Storyboarding.WindowsDesktop" StencilVersion="0.1"/>
 </Control>
 </file>
 
@@ -56606,73 +56137,73 @@
 
 <file path=customXml/item31.xml><?xml version="1.0" encoding="utf-8"?>
 <Control xmlns="http://schemas.microsoft.com/VisualStudio/2011/storyboarding/control">
-  <Id Name="System.Storyboarding.Backgrounds.WebBrowser" Revision="1" Stencil="System.Storyboarding.Backgrounds" StencilVersion="0.1"/>
+  <Id Name="System.Storyboarding.WindowsDesktop.Group" Revision="1" Stencil="System.Storyboarding.WindowsDesktop" StencilVersion="0.1"/>
 </Control>
 </file>
 
 <file path=customXml/item32.xml><?xml version="1.0" encoding="utf-8"?>
 <Control xmlns="http://schemas.microsoft.com/VisualStudio/2011/storyboarding/control">
-  <Id Name="System.Storyboarding.WindowsApps.WindowsAppsMediumWideTile" Revision="1" Stencil="System.Storyboarding.WindowsApps" StencilVersion="0.1"/>
+  <Id Name="System.Storyboarding.Backgrounds.StartScreen" Revision="1" Stencil="System.Storyboarding.Backgrounds" StencilVersion="0.1"/>
 </Control>
 </file>
 
 <file path=customXml/item33.xml><?xml version="1.0" encoding="utf-8"?>
 <Control xmlns="http://schemas.microsoft.com/VisualStudio/2011/storyboarding/control">
-  <Id Name="System.Storyboarding.WindowsApps.WindowsAppsContextMenu" Revision="1" Stencil="System.Storyboarding.WindowsApps" StencilVersion="0.1"/>
+  <Id Name="System.Storyboarding.Annotation.AnimatedBanner" Revision="1" Stencil="System.Storyboarding.Annotation" StencilVersion="0.1"/>
 </Control>
 </file>
 
 <file path=customXml/item34.xml><?xml version="1.0" encoding="utf-8"?>
 <Control xmlns="http://schemas.microsoft.com/VisualStudio/2011/storyboarding/control">
-  <Id Name="System.Storyboarding.Common.TabGroup" Revision="1" Stencil="System.Storyboarding.Common" StencilVersion="0.1"/>
+  <Id Name="System.Storyboarding.WindowsPhone.Tile" Revision="1" Stencil="System.Storyboarding.WindowsPhone" StencilVersion="0.1"/>
 </Control>
 </file>
 
 <file path=customXml/item35.xml><?xml version="1.0" encoding="utf-8"?>
 <Control xmlns="http://schemas.microsoft.com/VisualStudio/2011/storyboarding/control">
-  <Id Name="System.Storyboarding.Backgrounds.WebBrowser" Revision="1" Stencil="System.Storyboarding.Backgrounds" StencilVersion="0.1"/>
+  <Id Name="System.Storyboarding.WindowsApps.WindowsAppsContextMenu" Revision="1" Stencil="System.Storyboarding.WindowsApps" StencilVersion="0.1"/>
 </Control>
 </file>
 
 <file path=customXml/item36.xml><?xml version="1.0" encoding="utf-8"?>
 <Control xmlns="http://schemas.microsoft.com/VisualStudio/2011/storyboarding/control">
-  <Id Name="System.Storyboarding.Backgrounds.WebBrowser" Revision="1" Stencil="System.Storyboarding.Backgrounds" StencilVersion="0.1"/>
+  <Id Name="System.Storyboarding.WindowsDesktop.MenuBar" Revision="1" Stencil="System.Storyboarding.WindowsDesktop" StencilVersion="0.1"/>
 </Control>
 </file>
 
 <file path=customXml/item37.xml><?xml version="1.0" encoding="utf-8"?>
 <Control xmlns="http://schemas.microsoft.com/VisualStudio/2011/storyboarding/control">
-  <Id Name="System.Storyboarding.Icons.User" Revision="1" Stencil="System.Storyboarding.Icons" StencilVersion="0.1"/>
+  <Id Name="System.Storyboarding.WindowsPhone.Tile" Revision="1" Stencil="System.Storyboarding.WindowsPhone" StencilVersion="0.1"/>
 </Control>
 </file>
 
 <file path=customXml/item38.xml><?xml version="1.0" encoding="utf-8"?>
 <Control xmlns="http://schemas.microsoft.com/VisualStudio/2011/storyboarding/control">
-  <Id Name="System.Storyboarding.WindowsApps.WindowsAppsContextMenu" Revision="1" Stencil="System.Storyboarding.WindowsApps" StencilVersion="0.1"/>
+  <Id Name="System.Storyboarding.WindowsAppIcons.Calendar" Revision="1" Stencil="System.Storyboarding.WindowsAppIcons" StencilVersion="0.1"/>
 </Control>
 </file>
 
 <file path=customXml/item39.xml><?xml version="1.0" encoding="utf-8"?>
 <Control xmlns="http://schemas.microsoft.com/VisualStudio/2011/storyboarding/control">
-  <Id Name="System.Storyboarding.Backgrounds.DesktopTaskbar" Revision="1" Stencil="System.Storyboarding.Backgrounds" StencilVersion="0.1"/>
+  <Id Name="System.Storyboarding.Icons.User" Revision="1" Stencil="System.Storyboarding.Icons" StencilVersion="0.1"/>
 </Control>
 </file>
 
 <file path=customXml/item4.xml><?xml version="1.0" encoding="utf-8"?>
 <Control xmlns="http://schemas.microsoft.com/VisualStudio/2011/storyboarding/control">
-  <Id Name="System.Storyboarding.Common.TextArea" Revision="1" Stencil="System.Storyboarding.Common" StencilVersion="0.1"/>
+  <Id Name="System.Storyboarding.WindowsApps.WindowsAppsTileMedium" Revision="1" Stencil="System.Storyboarding.WindowsApps" StencilVersion="0.1"/>
 </Control>
 </file>
 
 <file path=customXml/item40.xml><?xml version="1.0" encoding="utf-8"?>
 <Control xmlns="http://schemas.microsoft.com/VisualStudio/2011/storyboarding/control">
-  <Id Name="System.Storyboarding.Backgrounds.Window" Revision="1" Stencil="System.Storyboarding.Backgrounds" StencilVersion="0.1"/>
+  <Id Name="System.Storyboarding.WindowsPhone.Tile" Revision="1" Stencil="System.Storyboarding.WindowsPhone" StencilVersion="0.1"/>
 </Control>
 </file>
 
 <file path=customXml/item41.xml><?xml version="1.0" encoding="utf-8"?>
 <Control xmlns="http://schemas.microsoft.com/VisualStudio/2011/storyboarding/control">
-  <Id Name="System.Storyboarding.WindowsApps.WindowsAppsContextMenu" Revision="1" Stencil="System.Storyboarding.WindowsApps" StencilVersion="0.1"/>
+  <Id Name="System.Storyboarding.Annotation.AnimatedBanner" Revision="1" Stencil="System.Storyboarding.Annotation" StencilVersion="0.1"/>
 </Control>
 </file>
 
@@ -56684,7 +56215,7 @@
 
 <file path=customXml/item43.xml><?xml version="1.0" encoding="utf-8"?>
 <Control xmlns="http://schemas.microsoft.com/VisualStudio/2011/storyboarding/control">
-  <Id Name="System.Storyboarding.Backgrounds.StartMenu" Revision="1" Stencil="System.Storyboarding.Backgrounds" StencilVersion="0.1"/>
+  <Id Name="System.Storyboarding.Common.Button" Revision="1" Stencil="System.Storyboarding.Common" StencilVersion="0.1"/>
 </Control>
 </file>
 
@@ -56696,25 +56227,25 @@
 
 <file path=customXml/item45.xml><?xml version="1.0" encoding="utf-8"?>
 <Control xmlns="http://schemas.microsoft.com/VisualStudio/2011/storyboarding/control">
-  <Id Name="System.Storyboarding.Common.TextArea" Revision="1" Stencil="System.Storyboarding.Common" StencilVersion="0.1"/>
+  <Id Name="System.Storyboarding.WindowsApps.WindowsAppsMediumWideTile" Revision="1" Stencil="System.Storyboarding.WindowsApps" StencilVersion="0.1"/>
 </Control>
 </file>
 
 <file path=customXml/item46.xml><?xml version="1.0" encoding="utf-8"?>
 <Control xmlns="http://schemas.microsoft.com/VisualStudio/2011/storyboarding/control">
-  <Id Name="System.Storyboarding.WindowsApps.WindowsAppsMediumWideTile" Revision="1" Stencil="System.Storyboarding.WindowsApps" StencilVersion="0.1"/>
+  <Id Name="System.Storyboarding.WindowsApps.WindowsAppsContextMenu" Revision="1" Stencil="System.Storyboarding.WindowsApps" StencilVersion="0.1"/>
 </Control>
 </file>
 
 <file path=customXml/item47.xml><?xml version="1.0" encoding="utf-8"?>
 <Control xmlns="http://schemas.microsoft.com/VisualStudio/2011/storyboarding/control">
-  <Id Name="System.Storyboarding.WindowsDesktop.Group" Revision="1" Stencil="System.Storyboarding.WindowsDesktop" StencilVersion="0.1"/>
+  <Id Name="System.Storyboarding.WindowsApps.WindowsAppsContextMenu" Revision="1" Stencil="System.Storyboarding.WindowsApps" StencilVersion="0.1"/>
 </Control>
 </file>
 
 <file path=customXml/item48.xml><?xml version="1.0" encoding="utf-8"?>
 <Control xmlns="http://schemas.microsoft.com/VisualStudio/2011/storyboarding/control">
-  <Id Name="System.Storyboarding.WindowsDesktop.MenuBar" Revision="1" Stencil="System.Storyboarding.WindowsDesktop" StencilVersion="0.1"/>
+  <Id Name="System.Storyboarding.WindowsApps.WindowsAppsMediumWideTile" Revision="1" Stencil="System.Storyboarding.WindowsApps" StencilVersion="0.1"/>
 </Control>
 </file>
 
@@ -56726,97 +56257,97 @@
 
 <file path=customXml/item5.xml><?xml version="1.0" encoding="utf-8"?>
 <Control xmlns="http://schemas.microsoft.com/VisualStudio/2011/storyboarding/control">
-  <Id Name="System.Storyboarding.WindowsApps.WindowsAppsTileMedium" Revision="1" Stencil="System.Storyboarding.WindowsApps" StencilVersion="0.1"/>
+  <Id Name="System.Storyboarding.Backgrounds.Window" Revision="1" Stencil="System.Storyboarding.Backgrounds" StencilVersion="0.1"/>
 </Control>
 </file>
 
 <file path=customXml/item50.xml><?xml version="1.0" encoding="utf-8"?>
 <Control xmlns="http://schemas.microsoft.com/VisualStudio/2011/storyboarding/control">
-  <Id Name="System.Storyboarding.WindowsDesktop.Group" Revision="1" Stencil="System.Storyboarding.WindowsDesktop" StencilVersion="0.1"/>
+  <Id Name="System.Storyboarding.WindowsDesktop.MenuBar" Revision="1" Stencil="System.Storyboarding.WindowsDesktop" StencilVersion="0.1"/>
 </Control>
 </file>
 
 <file path=customXml/item51.xml><?xml version="1.0" encoding="utf-8"?>
 <Control xmlns="http://schemas.microsoft.com/VisualStudio/2011/storyboarding/control">
-  <Id Name="System.Storyboarding.WindowsDesktop.MenuBar" Revision="1" Stencil="System.Storyboarding.WindowsDesktop" StencilVersion="0.1"/>
+  <Id Name="System.Storyboarding.Common.TextArea" Revision="1" Stencil="System.Storyboarding.Common" StencilVersion="0.1"/>
 </Control>
 </file>
 
 <file path=customXml/item52.xml><?xml version="1.0" encoding="utf-8"?>
 <Control xmlns="http://schemas.microsoft.com/VisualStudio/2011/storyboarding/control">
-  <Id Name="System.Storyboarding.Backgrounds.DesktopTaskbar" Revision="1" Stencil="System.Storyboarding.Backgrounds" StencilVersion="0.1"/>
+  <Id Name="System.Storyboarding.WindowsApps.WindowsAppsContextMenu" Revision="1" Stencil="System.Storyboarding.WindowsApps" StencilVersion="0.1"/>
 </Control>
 </file>
 
 <file path=customXml/item53.xml><?xml version="1.0" encoding="utf-8"?>
 <Control xmlns="http://schemas.microsoft.com/VisualStudio/2011/storyboarding/control">
-  <Id Name="System.Storyboarding.WindowsDesktop.Group" Revision="1" Stencil="System.Storyboarding.WindowsDesktop" StencilVersion="0.1"/>
+  <Id Name="System.Storyboarding.Common.TextArea" Revision="1" Stencil="System.Storyboarding.Common" StencilVersion="0.1"/>
 </Control>
 </file>
 
 <file path=customXml/item54.xml><?xml version="1.0" encoding="utf-8"?>
 <Control xmlns="http://schemas.microsoft.com/VisualStudio/2011/storyboarding/control">
-  <Id Name="System.Storyboarding.Common.TextArea" Revision="1" Stencil="System.Storyboarding.Common" StencilVersion="0.1"/>
+  <Id Name="System.Storyboarding.Backgrounds.DesktopTaskbar" Revision="1" Stencil="System.Storyboarding.Backgrounds" StencilVersion="0.1"/>
 </Control>
 </file>
 
 <file path=customXml/item55.xml><?xml version="1.0" encoding="utf-8"?>
 <Control xmlns="http://schemas.microsoft.com/VisualStudio/2011/storyboarding/control">
-  <Id Name="System.Storyboarding.WindowsApps.WindowsAppsTooltip" Revision="1" Stencil="System.Storyboarding.WindowsApps" StencilVersion="0.1"/>
+  <Id Name="System.Storyboarding.Common.Text" Revision="1" Stencil="System.Storyboarding.Common" StencilVersion="0.1"/>
 </Control>
 </file>
 
 <file path=customXml/item56.xml><?xml version="1.0" encoding="utf-8"?>
 <Control xmlns="http://schemas.microsoft.com/VisualStudio/2011/storyboarding/control">
-  <Id Name="System.Storyboarding.Common.TextArea" Revision="1" Stencil="System.Storyboarding.Common" StencilVersion="0.1"/>
+  <Id Name="System.Storyboarding.WindowsPhone.Tile" Revision="1" Stencil="System.Storyboarding.WindowsPhone" StencilVersion="0.1"/>
 </Control>
 </file>
 
 <file path=customXml/item57.xml><?xml version="1.0" encoding="utf-8"?>
 <Control xmlns="http://schemas.microsoft.com/VisualStudio/2011/storyboarding/control">
-  <Id Name="System.Storyboarding.Backgrounds.Window" Revision="1" Stencil="System.Storyboarding.Backgrounds" StencilVersion="0.1"/>
+  <Id Name="System.Storyboarding.WindowsDesktop.MenuBar" Revision="1" Stencil="System.Storyboarding.WindowsDesktop" StencilVersion="0.1"/>
 </Control>
 </file>
 
 <file path=customXml/item58.xml><?xml version="1.0" encoding="utf-8"?>
 <Control xmlns="http://schemas.microsoft.com/VisualStudio/2011/storyboarding/control">
-  <Id Name="System.Storyboarding.WindowsDesktop.Group" Revision="1" Stencil="System.Storyboarding.WindowsDesktop" StencilVersion="0.1"/>
+  <Id Name="System.Storyboarding.Common.Button" Revision="1" Stencil="System.Storyboarding.Common" StencilVersion="0.1"/>
 </Control>
 </file>
 
 <file path=customXml/item59.xml><?xml version="1.0" encoding="utf-8"?>
 <Control xmlns="http://schemas.microsoft.com/VisualStudio/2011/storyboarding/control">
-  <Id Name="System.Storyboarding.Common.TextArea" Revision="1" Stencil="System.Storyboarding.Common" StencilVersion="0.1"/>
+  <Id Name="System.Storyboarding.Common.Text" Revision="1" Stencil="System.Storyboarding.Common" StencilVersion="0.1"/>
 </Control>
 </file>
 
 <file path=customXml/item6.xml><?xml version="1.0" encoding="utf-8"?>
 <Control xmlns="http://schemas.microsoft.com/VisualStudio/2011/storyboarding/control">
-  <Id Name="System.Storyboarding.WindowsApps.WindowsAppsTooltip" Revision="1" Stencil="System.Storyboarding.WindowsApps" StencilVersion="0.1"/>
+  <Id Name="System.Storyboarding.Backgrounds.StartMenu" Revision="1" Stencil="System.Storyboarding.Backgrounds" StencilVersion="0.1"/>
 </Control>
 </file>
 
 <file path=customXml/item60.xml><?xml version="1.0" encoding="utf-8"?>
 <Control xmlns="http://schemas.microsoft.com/VisualStudio/2011/storyboarding/control">
-  <Id Name="System.Storyboarding.Backgrounds.DesktopTaskbar" Revision="1" Stencil="System.Storyboarding.Backgrounds" StencilVersion="0.1"/>
+  <Id Name="System.Storyboarding.WindowsPhone.Tile" Revision="1" Stencil="System.Storyboarding.WindowsPhone" StencilVersion="0.1"/>
 </Control>
 </file>
 
 <file path=customXml/item61.xml><?xml version="1.0" encoding="utf-8"?>
 <Control xmlns="http://schemas.microsoft.com/VisualStudio/2011/storyboarding/control">
-  <Id Name="System.Storyboarding.Common.TextArea" Revision="1" Stencil="System.Storyboarding.Common" StencilVersion="0.1"/>
+  <Id Name="System.Storyboarding.Common.Button" Revision="1" Stencil="System.Storyboarding.Common" StencilVersion="0.1"/>
 </Control>
 </file>
 
 <file path=customXml/item62.xml><?xml version="1.0" encoding="utf-8"?>
 <Control xmlns="http://schemas.microsoft.com/VisualStudio/2011/storyboarding/control">
-  <Id Name="System.Storyboarding.Backgrounds.DesktopTaskbar" Revision="1" Stencil="System.Storyboarding.Backgrounds" StencilVersion="0.1"/>
+  <Id Name="System.Storyboarding.WindowsApps.WindowsAppsTooltip" Revision="1" Stencil="System.Storyboarding.WindowsApps" StencilVersion="0.1"/>
 </Control>
 </file>
 
 <file path=customXml/item63.xml><?xml version="1.0" encoding="utf-8"?>
 <Control xmlns="http://schemas.microsoft.com/VisualStudio/2011/storyboarding/control">
-  <Id Name="System.Storyboarding.WindowsApps.WindowsAppsTileMedium" Revision="1" Stencil="System.Storyboarding.WindowsApps" StencilVersion="0.1"/>
+  <Id Name="System.Storyboarding.WindowsDesktop.AlertDialog" Revision="1" Stencil="System.Storyboarding.WindowsDesktop" StencilVersion="0.1"/>
 </Control>
 </file>
 
@@ -56834,13 +56365,13 @@
 
 <file path=customXml/item66.xml><?xml version="1.0" encoding="utf-8"?>
 <Control xmlns="http://schemas.microsoft.com/VisualStudio/2011/storyboarding/control">
-  <Id Name="System.Storyboarding.Common.TextArea" Revision="1" Stencil="System.Storyboarding.Common" StencilVersion="0.1"/>
+  <Id Name="System.Storyboarding.Backgrounds.WebBrowser" Revision="1" Stencil="System.Storyboarding.Backgrounds" StencilVersion="0.1"/>
 </Control>
 </file>
 
 <file path=customXml/item67.xml><?xml version="1.0" encoding="utf-8"?>
 <Control xmlns="http://schemas.microsoft.com/VisualStudio/2011/storyboarding/control">
-  <Id Name="System.Storyboarding.WindowsDesktop.MenuBar" Revision="1" Stencil="System.Storyboarding.WindowsDesktop" StencilVersion="0.1"/>
+  <Id Name="System.Storyboarding.Common.TextArea" Revision="1" Stencil="System.Storyboarding.Common" StencilVersion="0.1"/>
 </Control>
 </file>
 
@@ -56852,163 +56383,163 @@
 
 <file path=customXml/item69.xml><?xml version="1.0" encoding="utf-8"?>
 <Control xmlns="http://schemas.microsoft.com/VisualStudio/2011/storyboarding/control">
-  <Id Name="System.Storyboarding.Backgrounds.StartScreen" Revision="1" Stencil="System.Storyboarding.Backgrounds" StencilVersion="0.1"/>
+  <Id Name="System.Storyboarding.Backgrounds.Window" Revision="1" Stencil="System.Storyboarding.Backgrounds" StencilVersion="0.1"/>
 </Control>
 </file>
 
 <file path=customXml/item7.xml><?xml version="1.0" encoding="utf-8"?>
 <Control xmlns="http://schemas.microsoft.com/VisualStudio/2011/storyboarding/control">
-  <Id Name="System.Storyboarding.Common.TextArea" Revision="1" Stencil="System.Storyboarding.Common" StencilVersion="0.1"/>
+  <Id Name="System.Storyboarding.Common.Button" Revision="1" Stencil="System.Storyboarding.Common" StencilVersion="0.1"/>
 </Control>
 </file>
 
 <file path=customXml/item70.xml><?xml version="1.0" encoding="utf-8"?>
 <Control xmlns="http://schemas.microsoft.com/VisualStudio/2011/storyboarding/control">
-  <Id Name="System.Storyboarding.Common.Text" Revision="1" Stencil="System.Storyboarding.Common" StencilVersion="0.1"/>
+  <Id Name="System.Storyboarding.Backgrounds.WebBrowser" Revision="1" Stencil="System.Storyboarding.Backgrounds" StencilVersion="0.1"/>
 </Control>
 </file>
 
 <file path=customXml/item71.xml><?xml version="1.0" encoding="utf-8"?>
 <Control xmlns="http://schemas.microsoft.com/VisualStudio/2011/storyboarding/control">
-  <Id Name="System.Storyboarding.WindowsPhone.Tile" Revision="1" Stencil="System.Storyboarding.WindowsPhone" StencilVersion="0.1"/>
+  <Id Name="System.Storyboarding.WindowsApps.WindowsAppsTileMedium" Revision="1" Stencil="System.Storyboarding.WindowsApps" StencilVersion="0.1"/>
 </Control>
 </file>
 
 <file path=customXml/item72.xml><?xml version="1.0" encoding="utf-8"?>
 <Control xmlns="http://schemas.microsoft.com/VisualStudio/2011/storyboarding/control">
-  <Id Name="System.Storyboarding.WindowsPhone.Tile" Revision="1" Stencil="System.Storyboarding.WindowsPhone" StencilVersion="0.1"/>
+  <Id Name="System.Storyboarding.Backgrounds.DesktopTaskbar" Revision="1" Stencil="System.Storyboarding.Backgrounds" StencilVersion="0.1"/>
 </Control>
 </file>
 
 <file path=customXml/item73.xml><?xml version="1.0" encoding="utf-8"?>
 <Control xmlns="http://schemas.microsoft.com/VisualStudio/2011/storyboarding/control">
-  <Id Name="System.Storyboarding.WindowsPhone.WideTile" Revision="1" Stencil="System.Storyboarding.WindowsPhone" StencilVersion="0.1"/>
+  <Id Name="System.Storyboarding.Backgrounds.DesktopTaskbar" Revision="1" Stencil="System.Storyboarding.Backgrounds" StencilVersion="0.1"/>
 </Control>
 </file>
 
 <file path=customXml/item74.xml><?xml version="1.0" encoding="utf-8"?>
 <Control xmlns="http://schemas.microsoft.com/VisualStudio/2011/storyboarding/control">
-  <Id Name="System.Storyboarding.WindowsPhone.Tile" Revision="1" Stencil="System.Storyboarding.WindowsPhone" StencilVersion="0.1"/>
+  <Id Name="System.Storyboarding.Common.TabGroup" Revision="1" Stencil="System.Storyboarding.Common" StencilVersion="0.1"/>
 </Control>
 </file>
 
 <file path=customXml/item75.xml><?xml version="1.0" encoding="utf-8"?>
 <Control xmlns="http://schemas.microsoft.com/VisualStudio/2011/storyboarding/control">
-  <Id Name="System.Storyboarding.WindowsPhone.Tile" Revision="1" Stencil="System.Storyboarding.WindowsPhone" StencilVersion="0.1"/>
+  <Id Name="System.Storyboarding.WindowsPhone.WideTile" Revision="1" Stencil="System.Storyboarding.WindowsPhone" StencilVersion="0.1"/>
 </Control>
 </file>
 
 <file path=customXml/item76.xml><?xml version="1.0" encoding="utf-8"?>
 <Control xmlns="http://schemas.microsoft.com/VisualStudio/2011/storyboarding/control">
-  <Id Name="System.Storyboarding.WindowsPhone.Tile" Revision="1" Stencil="System.Storyboarding.WindowsPhone" StencilVersion="0.1"/>
+  <Id Name="System.Storyboarding.WindowsPhone.WideTile" Revision="1" Stencil="System.Storyboarding.WindowsPhone" StencilVersion="0.1"/>
 </Control>
 </file>
 
 <file path=customXml/item77.xml><?xml version="1.0" encoding="utf-8"?>
 <Control xmlns="http://schemas.microsoft.com/VisualStudio/2011/storyboarding/control">
-  <Id Name="System.Storyboarding.Annotation.AnimatedBanner" Revision="1" Stencil="System.Storyboarding.Annotation" StencilVersion="0.1"/>
+  <Id Name="System.Storyboarding.WindowsAppIcons.Calendar" Revision="1" Stencil="System.Storyboarding.WindowsAppIcons" StencilVersion="0.1"/>
 </Control>
 </file>
 
 <file path=customXml/item78.xml><?xml version="1.0" encoding="utf-8"?>
 <Control xmlns="http://schemas.microsoft.com/VisualStudio/2011/storyboarding/control">
-  <Id Name="System.Storyboarding.WindowsPhone.WideTile" Revision="1" Stencil="System.Storyboarding.WindowsPhone" StencilVersion="0.1"/>
+  <Id Name="System.Storyboarding.Backgrounds.Window" Revision="1" Stencil="System.Storyboarding.Backgrounds" StencilVersion="0.1"/>
 </Control>
 </file>
 
 <file path=customXml/item79.xml><?xml version="1.0" encoding="utf-8"?>
 <Control xmlns="http://schemas.microsoft.com/VisualStudio/2011/storyboarding/control">
-  <Id Name="System.Storyboarding.WindowsPhone.Tile" Revision="1" Stencil="System.Storyboarding.WindowsPhone" StencilVersion="0.1"/>
+  <Id Name="System.Storyboarding.WindowsPhone.WideTile" Revision="1" Stencil="System.Storyboarding.WindowsPhone" StencilVersion="0.1"/>
 </Control>
 </file>
 
 <file path=customXml/item8.xml><?xml version="1.0" encoding="utf-8"?>
 <Control xmlns="http://schemas.microsoft.com/VisualStudio/2011/storyboarding/control">
-  <Id Name="System.Storyboarding.WindowsApps.WindowsAppsContextMenu" Revision="1" Stencil="System.Storyboarding.WindowsApps" StencilVersion="0.1"/>
+  <Id Name="System.Storyboarding.Common.TextInput" Revision="1" Stencil="System.Storyboarding.Common" StencilVersion="0.1"/>
 </Control>
 </file>
 
 <file path=customXml/item80.xml><?xml version="1.0" encoding="utf-8"?>
 <Control xmlns="http://schemas.microsoft.com/VisualStudio/2011/storyboarding/control">
-  <Id Name="System.Storyboarding.WindowsAppIcons.Calendar" Revision="1" Stencil="System.Storyboarding.WindowsAppIcons" StencilVersion="0.1"/>
+  <Id Name="System.Storyboarding.WindowsPhone.WideTile" Revision="1" Stencil="System.Storyboarding.WindowsPhone" StencilVersion="0.1"/>
 </Control>
 </file>
 
 <file path=customXml/item81.xml><?xml version="1.0" encoding="utf-8"?>
 <Control xmlns="http://schemas.microsoft.com/VisualStudio/2011/storyboarding/control">
-  <Id Name="System.Storyboarding.WindowsAppIcons.Calendar" Revision="1" Stencil="System.Storyboarding.WindowsAppIcons" StencilVersion="0.1"/>
+  <Id Name="System.Storyboarding.Common.Text" Revision="1" Stencil="System.Storyboarding.Common" StencilVersion="0.1"/>
 </Control>
 </file>
 
 <file path=customXml/item82.xml><?xml version="1.0" encoding="utf-8"?>
 <Control xmlns="http://schemas.microsoft.com/VisualStudio/2011/storyboarding/control">
-  <Id Name="System.Storyboarding.Common.Text" Revision="1" Stencil="System.Storyboarding.Common" StencilVersion="0.1"/>
+  <Id Name="System.Storyboarding.Common.TextArea" Revision="1" Stencil="System.Storyboarding.Common" StencilVersion="0.1"/>
 </Control>
 </file>
 
 <file path=customXml/item83.xml><?xml version="1.0" encoding="utf-8"?>
 <Control xmlns="http://schemas.microsoft.com/VisualStudio/2011/storyboarding/control">
-  <Id Name="System.Storyboarding.WindowsDesktop.MenuBar" Revision="1" Stencil="System.Storyboarding.WindowsDesktop" StencilVersion="0.1"/>
+  <Id Name="System.Storyboarding.WindowsApps.WindowsAppsMediumWideTile" Revision="1" Stencil="System.Storyboarding.WindowsApps" StencilVersion="0.1"/>
 </Control>
 </file>
 
 <file path=customXml/item84.xml><?xml version="1.0" encoding="utf-8"?>
 <Control xmlns="http://schemas.microsoft.com/VisualStudio/2011/storyboarding/control">
-  <Id Name="System.Storyboarding.Backgrounds.StartMenu" Revision="1" Stencil="System.Storyboarding.Backgrounds" StencilVersion="0.1"/>
+  <Id Name="System.Storyboarding.Backgrounds.WebBrowser" Revision="1" Stencil="System.Storyboarding.Backgrounds" StencilVersion="0.1"/>
 </Control>
 </file>
 
 <file path=customXml/item85.xml><?xml version="1.0" encoding="utf-8"?>
 <Control xmlns="http://schemas.microsoft.com/VisualStudio/2011/storyboarding/control">
-  <Id Name="System.Storyboarding.Icons.User" Revision="1" Stencil="System.Storyboarding.Icons" StencilVersion="0.1"/>
+  <Id Name="System.Storyboarding.WindowsDesktop.Group" Revision="1" Stencil="System.Storyboarding.WindowsDesktop" StencilVersion="0.1"/>
 </Control>
 </file>
 
 <file path=customXml/item86.xml><?xml version="1.0" encoding="utf-8"?>
 <Control xmlns="http://schemas.microsoft.com/VisualStudio/2011/storyboarding/control">
-  <Id Name="System.Storyboarding.Backgrounds.Window" Revision="1" Stencil="System.Storyboarding.Backgrounds" StencilVersion="0.1"/>
+  <Id Name="System.Storyboarding.Backgrounds.DesktopTaskbar" Revision="1" Stencil="System.Storyboarding.Backgrounds" StencilVersion="0.1"/>
 </Control>
 </file>
 
 <file path=customXml/item87.xml><?xml version="1.0" encoding="utf-8"?>
 <Control xmlns="http://schemas.microsoft.com/VisualStudio/2011/storyboarding/control">
-  <Id Name="System.Storyboarding.WindowsDesktop.MenuBar" Revision="1" Stencil="System.Storyboarding.WindowsDesktop" StencilVersion="0.1"/>
+  <Id Name="System.Storyboarding.Common.TabGroup" Revision="1" Stencil="System.Storyboarding.Common" StencilVersion="0.1"/>
 </Control>
 </file>
 
 <file path=customXml/item88.xml><?xml version="1.0" encoding="utf-8"?>
 <Control xmlns="http://schemas.microsoft.com/VisualStudio/2011/storyboarding/control">
-  <Id Name="System.Storyboarding.Common.Button" Revision="1" Stencil="System.Storyboarding.Common" StencilVersion="0.1"/>
+  <Id Name="System.Storyboarding.WindowsDesktop.Group" Revision="1" Stencil="System.Storyboarding.WindowsDesktop" StencilVersion="0.1"/>
 </Control>
 </file>
 
 <file path=customXml/item89.xml><?xml version="1.0" encoding="utf-8"?>
 <Control xmlns="http://schemas.microsoft.com/VisualStudio/2011/storyboarding/control">
-  <Id Name="System.Storyboarding.Common.Button" Revision="1" Stencil="System.Storyboarding.Common" StencilVersion="0.1"/>
+  <Id Name="System.Storyboarding.WindowsApps.WindowsAppsTooltip" Revision="1" Stencil="System.Storyboarding.WindowsApps" StencilVersion="0.1"/>
 </Control>
 </file>
 
 <file path=customXml/item9.xml><?xml version="1.0" encoding="utf-8"?>
 <Control xmlns="http://schemas.microsoft.com/VisualStudio/2011/storyboarding/control">
-  <Id Name="System.Storyboarding.WindowsApps.WindowsAppsMediumWideTile" Revision="1" Stencil="System.Storyboarding.WindowsApps" StencilVersion="0.1"/>
+  <Id Name="System.Storyboarding.WindowsApps.WindowsAppsContextMenu" Revision="1" Stencil="System.Storyboarding.WindowsApps" StencilVersion="0.1"/>
 </Control>
 </file>
 
 <file path=customXml/item90.xml><?xml version="1.0" encoding="utf-8"?>
 <Control xmlns="http://schemas.microsoft.com/VisualStudio/2011/storyboarding/control">
-  <Id Name="System.Storyboarding.Backgrounds.StartScreen" Revision="1" Stencil="System.Storyboarding.Backgrounds" StencilVersion="0.1"/>
+  <Id Name="System.Storyboarding.WindowsPhone.Tile" Revision="1" Stencil="System.Storyboarding.WindowsPhone" StencilVersion="0.1"/>
 </Control>
 </file>
 
 <file path=customXml/item91.xml><?xml version="1.0" encoding="utf-8"?>
 <Control xmlns="http://schemas.microsoft.com/VisualStudio/2011/storyboarding/control">
-  <Id Name="System.Storyboarding.Common.Text" Revision="1" Stencil="System.Storyboarding.Common" StencilVersion="0.1"/>
+  <Id Name="System.Storyboarding.WindowsPhone.Tile" Revision="1" Stencil="System.Storyboarding.WindowsPhone" StencilVersion="0.1"/>
 </Control>
 </file>
 
 <file path=customXml/item92.xml><?xml version="1.0" encoding="utf-8"?>
 <Control xmlns="http://schemas.microsoft.com/VisualStudio/2011/storyboarding/control">
-  <Id Name="System.Storyboarding.WindowsPhone.Tile" Revision="1" Stencil="System.Storyboarding.WindowsPhone" StencilVersion="0.1"/>
+  <Id Name="System.Storyboarding.Common.TextArea" Revision="1" Stencil="System.Storyboarding.Common" StencilVersion="0.1"/>
 </Control>
 </file>
 
@@ -57020,41 +56551,521 @@
 
 <file path=customXml/item94.xml><?xml version="1.0" encoding="utf-8"?>
 <Control xmlns="http://schemas.microsoft.com/VisualStudio/2011/storyboarding/control">
-  <Id Name="System.Storyboarding.WindowsPhone.WideTile" Revision="1" Stencil="System.Storyboarding.WindowsPhone" StencilVersion="0.1"/>
+  <Id Name="System.Storyboarding.WindowsPhone.Tile" Revision="1" Stencil="System.Storyboarding.WindowsPhone" StencilVersion="0.1"/>
 </Control>
 </file>
 
 <file path=customXml/item95.xml><?xml version="1.0" encoding="utf-8"?>
 <Control xmlns="http://schemas.microsoft.com/VisualStudio/2011/storyboarding/control">
-  <Id Name="System.Storyboarding.WindowsPhone.Tile" Revision="1" Stencil="System.Storyboarding.WindowsPhone" StencilVersion="0.1"/>
+  <Id Name="System.Storyboarding.Backgrounds.Window" Revision="1" Stencil="System.Storyboarding.Backgrounds" StencilVersion="0.1"/>
 </Control>
 </file>
 
 <file path=customXml/item96.xml><?xml version="1.0" encoding="utf-8"?>
 <Control xmlns="http://schemas.microsoft.com/VisualStudio/2011/storyboarding/control">
-  <Id Name="System.Storyboarding.WindowsPhone.Tile" Revision="1" Stencil="System.Storyboarding.WindowsPhone" StencilVersion="0.1"/>
+  <Id Name="System.Storyboarding.WindowsDesktop.DialogBox" Revision="1" Stencil="System.Storyboarding.WindowsDesktop" StencilVersion="0.1"/>
 </Control>
 </file>
 
 <file path=customXml/item97.xml><?xml version="1.0" encoding="utf-8"?>
 <Control xmlns="http://schemas.microsoft.com/VisualStudio/2011/storyboarding/control">
-  <Id Name="System.Storyboarding.WindowsPhone.Tile" Revision="1" Stencil="System.Storyboarding.WindowsPhone" StencilVersion="0.1"/>
+  <Id Name="System.Storyboarding.Common.TextArea" Revision="1" Stencil="System.Storyboarding.Common" StencilVersion="0.1"/>
 </Control>
 </file>
 
 <file path=customXml/item98.xml><?xml version="1.0" encoding="utf-8"?>
 <Control xmlns="http://schemas.microsoft.com/VisualStudio/2011/storyboarding/control">
-  <Id Name="System.Storyboarding.Annotation.AnimatedBanner" Revision="1" Stencil="System.Storyboarding.Annotation" StencilVersion="0.1"/>
+  <Id Name="System.Storyboarding.Backgrounds.Window" Revision="1" Stencil="System.Storyboarding.Backgrounds" StencilVersion="0.1"/>
 </Control>
 </file>
 
 <file path=customXml/item99.xml><?xml version="1.0" encoding="utf-8"?>
 <Control xmlns="http://schemas.microsoft.com/VisualStudio/2011/storyboarding/control">
-  <Id Name="System.Storyboarding.WindowsPhone.WideTile" Revision="1" Stencil="System.Storyboarding.WindowsPhone" StencilVersion="0.1"/>
+  <Id Name="System.Storyboarding.Common.TextArea" Revision="1" Stencil="System.Storyboarding.Common" StencilVersion="0.1"/>
 </Control>
 </file>
 
 <file path=customXml/itemProps1.xml><?xml version="1.0" encoding="utf-8"?>
+<ds:datastoreItem xmlns:ds="http://schemas.openxmlformats.org/officeDocument/2006/customXml" ds:itemID="{9726E98B-49CF-4D47-BB08-34156C99E90C}">
+  <ds:schemaRefs>
+    <ds:schemaRef ds:uri="http://schemas.microsoft.com/VisualStudio/2011/storyboarding/control"/>
+  </ds:schemaRefs>
+</ds:datastoreItem>
+</file>
+
+<file path=customXml/itemProps10.xml><?xml version="1.0" encoding="utf-8"?>
+<ds:datastoreItem xmlns:ds="http://schemas.openxmlformats.org/officeDocument/2006/customXml" ds:itemID="{AA61DB0E-24DB-4781-AD0E-AC6B1C4806A5}">
+  <ds:schemaRefs>
+    <ds:schemaRef ds:uri="http://schemas.microsoft.com/VisualStudio/2011/storyboarding/control"/>
+  </ds:schemaRefs>
+</ds:datastoreItem>
+</file>
+
+<file path=customXml/itemProps100.xml><?xml version="1.0" encoding="utf-8"?>
+<ds:datastoreItem xmlns:ds="http://schemas.openxmlformats.org/officeDocument/2006/customXml" ds:itemID="{066A5DFC-7FA2-4A2D-A24A-F8A9ADC2D44A}">
+  <ds:schemaRefs>
+    <ds:schemaRef ds:uri="http://schemas.microsoft.com/VisualStudio/2011/storyboarding/control"/>
+  </ds:schemaRefs>
+</ds:datastoreItem>
+</file>
+
+<file path=customXml/itemProps101.xml><?xml version="1.0" encoding="utf-8"?>
+<ds:datastoreItem xmlns:ds="http://schemas.openxmlformats.org/officeDocument/2006/customXml" ds:itemID="{3928C134-FE87-4BC6-B476-5EBDC72BBDA5}">
+  <ds:schemaRefs>
+    <ds:schemaRef ds:uri="http://schemas.microsoft.com/VisualStudio/2011/storyboarding/control"/>
+  </ds:schemaRefs>
+</ds:datastoreItem>
+</file>
+
+<file path=customXml/itemProps102.xml><?xml version="1.0" encoding="utf-8"?>
+<ds:datastoreItem xmlns:ds="http://schemas.openxmlformats.org/officeDocument/2006/customXml" ds:itemID="{FBA587A7-EADC-4E1B-B6D8-D3FA6C373069}">
+  <ds:schemaRefs>
+    <ds:schemaRef ds:uri="http://schemas.microsoft.com/VisualStudio/2011/storyboarding/control"/>
+  </ds:schemaRefs>
+</ds:datastoreItem>
+</file>
+
+<file path=customXml/itemProps11.xml><?xml version="1.0" encoding="utf-8"?>
+<ds:datastoreItem xmlns:ds="http://schemas.openxmlformats.org/officeDocument/2006/customXml" ds:itemID="{5A152910-E02F-4F71-9AAE-D37306DB32BF}">
+  <ds:schemaRefs>
+    <ds:schemaRef ds:uri="http://schemas.microsoft.com/VisualStudio/2011/storyboarding/control"/>
+  </ds:schemaRefs>
+</ds:datastoreItem>
+</file>
+
+<file path=customXml/itemProps12.xml><?xml version="1.0" encoding="utf-8"?>
+<ds:datastoreItem xmlns:ds="http://schemas.openxmlformats.org/officeDocument/2006/customXml" ds:itemID="{B1317D35-54BD-4E9C-B6EA-99B047CC9016}">
+  <ds:schemaRefs>
+    <ds:schemaRef ds:uri="http://schemas.microsoft.com/VisualStudio/2011/storyboarding/control"/>
+  </ds:schemaRefs>
+</ds:datastoreItem>
+</file>
+
+<file path=customXml/itemProps13.xml><?xml version="1.0" encoding="utf-8"?>
+<ds:datastoreItem xmlns:ds="http://schemas.openxmlformats.org/officeDocument/2006/customXml" ds:itemID="{4835A781-F87C-4723-AC25-998F0A37D9F1}">
+  <ds:schemaRefs>
+    <ds:schemaRef ds:uri="http://schemas.microsoft.com/VisualStudio/2011/storyboarding/control"/>
+  </ds:schemaRefs>
+</ds:datastoreItem>
+</file>
+
+<file path=customXml/itemProps14.xml><?xml version="1.0" encoding="utf-8"?>
+<ds:datastoreItem xmlns:ds="http://schemas.openxmlformats.org/officeDocument/2006/customXml" ds:itemID="{968A9BB2-E5BA-4DFA-9019-FC925D9A3AF5}">
+  <ds:schemaRefs>
+    <ds:schemaRef ds:uri="http://schemas.microsoft.com/VisualStudio/2011/storyboarding/control"/>
+  </ds:schemaRefs>
+</ds:datastoreItem>
+</file>
+
+<file path=customXml/itemProps15.xml><?xml version="1.0" encoding="utf-8"?>
+<ds:datastoreItem xmlns:ds="http://schemas.openxmlformats.org/officeDocument/2006/customXml" ds:itemID="{4BABCC82-0C23-41ED-AD8D-47049FB15092}">
+  <ds:schemaRefs>
+    <ds:schemaRef ds:uri="http://schemas.microsoft.com/VisualStudio/2011/storyboarding/control"/>
+  </ds:schemaRefs>
+</ds:datastoreItem>
+</file>
+
+<file path=customXml/itemProps16.xml><?xml version="1.0" encoding="utf-8"?>
+<ds:datastoreItem xmlns:ds="http://schemas.openxmlformats.org/officeDocument/2006/customXml" ds:itemID="{58F5313F-606B-4152-996D-D50C7DBBCD74}">
+  <ds:schemaRefs>
+    <ds:schemaRef ds:uri="http://schemas.microsoft.com/VisualStudio/2011/storyboarding/control"/>
+  </ds:schemaRefs>
+</ds:datastoreItem>
+</file>
+
+<file path=customXml/itemProps17.xml><?xml version="1.0" encoding="utf-8"?>
+<ds:datastoreItem xmlns:ds="http://schemas.openxmlformats.org/officeDocument/2006/customXml" ds:itemID="{F3E21E30-D471-4562-BD42-8016DE5AA705}">
+  <ds:schemaRefs>
+    <ds:schemaRef ds:uri="http://schemas.microsoft.com/VisualStudio/2011/storyboarding/control"/>
+  </ds:schemaRefs>
+</ds:datastoreItem>
+</file>
+
+<file path=customXml/itemProps18.xml><?xml version="1.0" encoding="utf-8"?>
+<ds:datastoreItem xmlns:ds="http://schemas.openxmlformats.org/officeDocument/2006/customXml" ds:itemID="{4743D833-2A91-461D-A302-D8184281B831}">
+  <ds:schemaRefs>
+    <ds:schemaRef ds:uri="http://schemas.microsoft.com/VisualStudio/2011/storyboarding/control"/>
+  </ds:schemaRefs>
+</ds:datastoreItem>
+</file>
+
+<file path=customXml/itemProps19.xml><?xml version="1.0" encoding="utf-8"?>
+<ds:datastoreItem xmlns:ds="http://schemas.openxmlformats.org/officeDocument/2006/customXml" ds:itemID="{CC757A85-696F-45D9-9E2E-2C5AD9DABDB9}">
+  <ds:schemaRefs>
+    <ds:schemaRef ds:uri="http://schemas.microsoft.com/VisualStudio/2011/storyboarding/control"/>
+  </ds:schemaRefs>
+</ds:datastoreItem>
+</file>
+
+<file path=customXml/itemProps2.xml><?xml version="1.0" encoding="utf-8"?>
+<ds:datastoreItem xmlns:ds="http://schemas.openxmlformats.org/officeDocument/2006/customXml" ds:itemID="{F799EA92-8666-4EE3-81E2-090E468CA5EA}">
+  <ds:schemaRefs>
+    <ds:schemaRef ds:uri="http://schemas.microsoft.com/VisualStudio/2011/storyboarding/control"/>
+  </ds:schemaRefs>
+</ds:datastoreItem>
+</file>
+
+<file path=customXml/itemProps20.xml><?xml version="1.0" encoding="utf-8"?>
+<ds:datastoreItem xmlns:ds="http://schemas.openxmlformats.org/officeDocument/2006/customXml" ds:itemID="{549308D7-648A-4B21-8B3D-E586290636F3}">
+  <ds:schemaRefs>
+    <ds:schemaRef ds:uri="http://schemas.microsoft.com/VisualStudio/2011/storyboarding/control"/>
+  </ds:schemaRefs>
+</ds:datastoreItem>
+</file>
+
+<file path=customXml/itemProps21.xml><?xml version="1.0" encoding="utf-8"?>
+<ds:datastoreItem xmlns:ds="http://schemas.openxmlformats.org/officeDocument/2006/customXml" ds:itemID="{347DB3C5-617D-4B21-A7C9-013AD66AA9BD}">
+  <ds:schemaRefs>
+    <ds:schemaRef ds:uri="http://schemas.microsoft.com/VisualStudio/2011/storyboarding/control"/>
+  </ds:schemaRefs>
+</ds:datastoreItem>
+</file>
+
+<file path=customXml/itemProps22.xml><?xml version="1.0" encoding="utf-8"?>
+<ds:datastoreItem xmlns:ds="http://schemas.openxmlformats.org/officeDocument/2006/customXml" ds:itemID="{AA35EE34-96D9-4024-A7F7-A787BF5DC8F2}">
+  <ds:schemaRefs>
+    <ds:schemaRef ds:uri="http://schemas.microsoft.com/VisualStudio/2011/storyboarding/control"/>
+  </ds:schemaRefs>
+</ds:datastoreItem>
+</file>
+
+<file path=customXml/itemProps23.xml><?xml version="1.0" encoding="utf-8"?>
+<ds:datastoreItem xmlns:ds="http://schemas.openxmlformats.org/officeDocument/2006/customXml" ds:itemID="{3170B703-293D-46C9-817F-D00CEDB460E0}">
+  <ds:schemaRefs>
+    <ds:schemaRef ds:uri="http://schemas.microsoft.com/VisualStudio/2011/storyboarding/control"/>
+  </ds:schemaRefs>
+</ds:datastoreItem>
+</file>
+
+<file path=customXml/itemProps24.xml><?xml version="1.0" encoding="utf-8"?>
+<ds:datastoreItem xmlns:ds="http://schemas.openxmlformats.org/officeDocument/2006/customXml" ds:itemID="{C1F8B112-F417-4C30-AE93-3501F6EA0636}">
+  <ds:schemaRefs>
+    <ds:schemaRef ds:uri="http://schemas.microsoft.com/VisualStudio/2011/storyboarding/control"/>
+  </ds:schemaRefs>
+</ds:datastoreItem>
+</file>
+
+<file path=customXml/itemProps25.xml><?xml version="1.0" encoding="utf-8"?>
+<ds:datastoreItem xmlns:ds="http://schemas.openxmlformats.org/officeDocument/2006/customXml" ds:itemID="{D4BA7353-13EF-49E0-8823-D22D5865EDFD}">
+  <ds:schemaRefs>
+    <ds:schemaRef ds:uri="http://schemas.microsoft.com/VisualStudio/2011/storyboarding/control"/>
+  </ds:schemaRefs>
+</ds:datastoreItem>
+</file>
+
+<file path=customXml/itemProps26.xml><?xml version="1.0" encoding="utf-8"?>
+<ds:datastoreItem xmlns:ds="http://schemas.openxmlformats.org/officeDocument/2006/customXml" ds:itemID="{BCE90BB7-F130-4FC8-97FD-0FF88C888C7C}">
+  <ds:schemaRefs>
+    <ds:schemaRef ds:uri="http://schemas.microsoft.com/VisualStudio/2011/storyboarding/control"/>
+  </ds:schemaRefs>
+</ds:datastoreItem>
+</file>
+
+<file path=customXml/itemProps27.xml><?xml version="1.0" encoding="utf-8"?>
+<ds:datastoreItem xmlns:ds="http://schemas.openxmlformats.org/officeDocument/2006/customXml" ds:itemID="{F7544449-F6AD-4286-B200-DD81591A7AC8}">
+  <ds:schemaRefs>
+    <ds:schemaRef ds:uri="http://schemas.microsoft.com/VisualStudio/2011/storyboarding/control"/>
+  </ds:schemaRefs>
+</ds:datastoreItem>
+</file>
+
+<file path=customXml/itemProps28.xml><?xml version="1.0" encoding="utf-8"?>
+<ds:datastoreItem xmlns:ds="http://schemas.openxmlformats.org/officeDocument/2006/customXml" ds:itemID="{27A1EB69-445A-4024-985D-54EE302BE6B7}">
+  <ds:schemaRefs>
+    <ds:schemaRef ds:uri="http://schemas.microsoft.com/VisualStudio/2011/storyboarding/control"/>
+  </ds:schemaRefs>
+</ds:datastoreItem>
+</file>
+
+<file path=customXml/itemProps29.xml><?xml version="1.0" encoding="utf-8"?>
+<ds:datastoreItem xmlns:ds="http://schemas.openxmlformats.org/officeDocument/2006/customXml" ds:itemID="{D82C3887-DD54-44E1-99AA-9DB9D3FFD544}">
+  <ds:schemaRefs>
+    <ds:schemaRef ds:uri="http://schemas.microsoft.com/VisualStudio/2011/storyboarding/control"/>
+  </ds:schemaRefs>
+</ds:datastoreItem>
+</file>
+
+<file path=customXml/itemProps3.xml><?xml version="1.0" encoding="utf-8"?>
+<ds:datastoreItem xmlns:ds="http://schemas.openxmlformats.org/officeDocument/2006/customXml" ds:itemID="{1DE7A267-FE68-40EA-AD18-3D91B476DC28}">
+  <ds:schemaRefs>
+    <ds:schemaRef ds:uri="http://schemas.microsoft.com/VisualStudio/2011/storyboarding/control"/>
+  </ds:schemaRefs>
+</ds:datastoreItem>
+</file>
+
+<file path=customXml/itemProps30.xml><?xml version="1.0" encoding="utf-8"?>
+<ds:datastoreItem xmlns:ds="http://schemas.openxmlformats.org/officeDocument/2006/customXml" ds:itemID="{1BD1864F-9ACD-4C5F-A332-FFFC27786AEC}">
+  <ds:schemaRefs>
+    <ds:schemaRef ds:uri="http://schemas.microsoft.com/VisualStudio/2011/storyboarding/control"/>
+  </ds:schemaRefs>
+</ds:datastoreItem>
+</file>
+
+<file path=customXml/itemProps31.xml><?xml version="1.0" encoding="utf-8"?>
+<ds:datastoreItem xmlns:ds="http://schemas.openxmlformats.org/officeDocument/2006/customXml" ds:itemID="{FA5737C0-AFCE-4CDC-B65A-7C5F0C8F99D4}">
+  <ds:schemaRefs>
+    <ds:schemaRef ds:uri="http://schemas.microsoft.com/VisualStudio/2011/storyboarding/control"/>
+  </ds:schemaRefs>
+</ds:datastoreItem>
+</file>
+
+<file path=customXml/itemProps32.xml><?xml version="1.0" encoding="utf-8"?>
+<ds:datastoreItem xmlns:ds="http://schemas.openxmlformats.org/officeDocument/2006/customXml" ds:itemID="{D0E56850-78FB-47E4-80AF-E8678BFFF5A1}">
+  <ds:schemaRefs>
+    <ds:schemaRef ds:uri="http://schemas.microsoft.com/VisualStudio/2011/storyboarding/control"/>
+  </ds:schemaRefs>
+</ds:datastoreItem>
+</file>
+
+<file path=customXml/itemProps33.xml><?xml version="1.0" encoding="utf-8"?>
+<ds:datastoreItem xmlns:ds="http://schemas.openxmlformats.org/officeDocument/2006/customXml" ds:itemID="{7BEBCBCF-64E6-46C1-A483-1DEEC2868F7C}">
+  <ds:schemaRefs>
+    <ds:schemaRef ds:uri="http://schemas.microsoft.com/VisualStudio/2011/storyboarding/control"/>
+  </ds:schemaRefs>
+</ds:datastoreItem>
+</file>
+
+<file path=customXml/itemProps34.xml><?xml version="1.0" encoding="utf-8"?>
+<ds:datastoreItem xmlns:ds="http://schemas.openxmlformats.org/officeDocument/2006/customXml" ds:itemID="{8A61EC23-9433-46E0-8895-7450DE4BBE66}">
+  <ds:schemaRefs>
+    <ds:schemaRef ds:uri="http://schemas.microsoft.com/VisualStudio/2011/storyboarding/control"/>
+  </ds:schemaRefs>
+</ds:datastoreItem>
+</file>
+
+<file path=customXml/itemProps35.xml><?xml version="1.0" encoding="utf-8"?>
+<ds:datastoreItem xmlns:ds="http://schemas.openxmlformats.org/officeDocument/2006/customXml" ds:itemID="{C8CC8F3E-7A7F-4C43-AA38-D0F10DA3F07D}">
+  <ds:schemaRefs>
+    <ds:schemaRef ds:uri="http://schemas.microsoft.com/VisualStudio/2011/storyboarding/control"/>
+  </ds:schemaRefs>
+</ds:datastoreItem>
+</file>
+
+<file path=customXml/itemProps36.xml><?xml version="1.0" encoding="utf-8"?>
+<ds:datastoreItem xmlns:ds="http://schemas.openxmlformats.org/officeDocument/2006/customXml" ds:itemID="{52A6B78B-D5BB-4E4E-8419-1FC0CE3D8ADD}">
+  <ds:schemaRefs>
+    <ds:schemaRef ds:uri="http://schemas.microsoft.com/VisualStudio/2011/storyboarding/control"/>
+  </ds:schemaRefs>
+</ds:datastoreItem>
+</file>
+
+<file path=customXml/itemProps37.xml><?xml version="1.0" encoding="utf-8"?>
+<ds:datastoreItem xmlns:ds="http://schemas.openxmlformats.org/officeDocument/2006/customXml" ds:itemID="{9FAA36B2-B85C-442C-B0E2-85BFC0CA6AEF}">
+  <ds:schemaRefs>
+    <ds:schemaRef ds:uri="http://schemas.microsoft.com/VisualStudio/2011/storyboarding/control"/>
+  </ds:schemaRefs>
+</ds:datastoreItem>
+</file>
+
+<file path=customXml/itemProps38.xml><?xml version="1.0" encoding="utf-8"?>
+<ds:datastoreItem xmlns:ds="http://schemas.openxmlformats.org/officeDocument/2006/customXml" ds:itemID="{57FB8291-94A3-40C2-BA0B-B1AE655A1FCE}">
+  <ds:schemaRefs>
+    <ds:schemaRef ds:uri="http://schemas.microsoft.com/VisualStudio/2011/storyboarding/control"/>
+  </ds:schemaRefs>
+</ds:datastoreItem>
+</file>
+
+<file path=customXml/itemProps39.xml><?xml version="1.0" encoding="utf-8"?>
+<ds:datastoreItem xmlns:ds="http://schemas.openxmlformats.org/officeDocument/2006/customXml" ds:itemID="{DC0FBCF2-49EC-4C85-A676-39EBD004CFE1}">
+  <ds:schemaRefs>
+    <ds:schemaRef ds:uri="http://schemas.microsoft.com/VisualStudio/2011/storyboarding/control"/>
+  </ds:schemaRefs>
+</ds:datastoreItem>
+</file>
+
+<file path=customXml/itemProps4.xml><?xml version="1.0" encoding="utf-8"?>
+<ds:datastoreItem xmlns:ds="http://schemas.openxmlformats.org/officeDocument/2006/customXml" ds:itemID="{0ED54E3F-8414-42CB-9207-14AACC0592E1}">
+  <ds:schemaRefs>
+    <ds:schemaRef ds:uri="http://schemas.microsoft.com/VisualStudio/2011/storyboarding/control"/>
+  </ds:schemaRefs>
+</ds:datastoreItem>
+</file>
+
+<file path=customXml/itemProps40.xml><?xml version="1.0" encoding="utf-8"?>
+<ds:datastoreItem xmlns:ds="http://schemas.openxmlformats.org/officeDocument/2006/customXml" ds:itemID="{220FBEE6-E44F-4E70-A0AE-702F72BC74E2}">
+  <ds:schemaRefs>
+    <ds:schemaRef ds:uri="http://schemas.microsoft.com/VisualStudio/2011/storyboarding/control"/>
+  </ds:schemaRefs>
+</ds:datastoreItem>
+</file>
+
+<file path=customXml/itemProps41.xml><?xml version="1.0" encoding="utf-8"?>
+<ds:datastoreItem xmlns:ds="http://schemas.openxmlformats.org/officeDocument/2006/customXml" ds:itemID="{241647FF-CD33-4752-8101-8303D55C8549}">
+  <ds:schemaRefs>
+    <ds:schemaRef ds:uri="http://schemas.microsoft.com/VisualStudio/2011/storyboarding/control"/>
+  </ds:schemaRefs>
+</ds:datastoreItem>
+</file>
+
+<file path=customXml/itemProps42.xml><?xml version="1.0" encoding="utf-8"?>
+<ds:datastoreItem xmlns:ds="http://schemas.openxmlformats.org/officeDocument/2006/customXml" ds:itemID="{7BB2ADCD-A977-4971-AF76-72DF82176001}">
+  <ds:schemaRefs>
+    <ds:schemaRef ds:uri="http://schemas.microsoft.com/VisualStudio/2011/storyboarding/control"/>
+  </ds:schemaRefs>
+</ds:datastoreItem>
+</file>
+
+<file path=customXml/itemProps43.xml><?xml version="1.0" encoding="utf-8"?>
+<ds:datastoreItem xmlns:ds="http://schemas.openxmlformats.org/officeDocument/2006/customXml" ds:itemID="{C66D9D6C-2641-4CD6-85C0-39ED42084838}">
+  <ds:schemaRefs>
+    <ds:schemaRef ds:uri="http://schemas.microsoft.com/VisualStudio/2011/storyboarding/control"/>
+  </ds:schemaRefs>
+</ds:datastoreItem>
+</file>
+
+<file path=customXml/itemProps44.xml><?xml version="1.0" encoding="utf-8"?>
+<ds:datastoreItem xmlns:ds="http://schemas.openxmlformats.org/officeDocument/2006/customXml" ds:itemID="{332CC537-27D6-441A-880E-EE9A8B2B028C}">
+  <ds:schemaRefs>
+    <ds:schemaRef ds:uri="http://schemas.microsoft.com/VisualStudio/2011/storyboarding/control"/>
+  </ds:schemaRefs>
+</ds:datastoreItem>
+</file>
+
+<file path=customXml/itemProps45.xml><?xml version="1.0" encoding="utf-8"?>
+<ds:datastoreItem xmlns:ds="http://schemas.openxmlformats.org/officeDocument/2006/customXml" ds:itemID="{085909DF-A38F-4AFC-B672-491B624DDBA5}">
+  <ds:schemaRefs>
+    <ds:schemaRef ds:uri="http://schemas.microsoft.com/VisualStudio/2011/storyboarding/control"/>
+  </ds:schemaRefs>
+</ds:datastoreItem>
+</file>
+
+<file path=customXml/itemProps46.xml><?xml version="1.0" encoding="utf-8"?>
+<ds:datastoreItem xmlns:ds="http://schemas.openxmlformats.org/officeDocument/2006/customXml" ds:itemID="{49F24717-98E7-4111-8DB8-64B4C9CFD0CB}">
+  <ds:schemaRefs>
+    <ds:schemaRef ds:uri="http://schemas.microsoft.com/VisualStudio/2011/storyboarding/control"/>
+  </ds:schemaRefs>
+</ds:datastoreItem>
+</file>
+
+<file path=customXml/itemProps47.xml><?xml version="1.0" encoding="utf-8"?>
+<ds:datastoreItem xmlns:ds="http://schemas.openxmlformats.org/officeDocument/2006/customXml" ds:itemID="{A08C4EF9-B721-474A-8DC6-5433A60DAEA4}">
+  <ds:schemaRefs>
+    <ds:schemaRef ds:uri="http://schemas.microsoft.com/VisualStudio/2011/storyboarding/control"/>
+  </ds:schemaRefs>
+</ds:datastoreItem>
+</file>
+
+<file path=customXml/itemProps48.xml><?xml version="1.0" encoding="utf-8"?>
+<ds:datastoreItem xmlns:ds="http://schemas.openxmlformats.org/officeDocument/2006/customXml" ds:itemID="{E4C78399-1141-4DE4-A0F7-EA0BED20CBB7}">
+  <ds:schemaRefs>
+    <ds:schemaRef ds:uri="http://schemas.microsoft.com/VisualStudio/2011/storyboarding/control"/>
+  </ds:schemaRefs>
+</ds:datastoreItem>
+</file>
+
+<file path=customXml/itemProps49.xml><?xml version="1.0" encoding="utf-8"?>
+<ds:datastoreItem xmlns:ds="http://schemas.openxmlformats.org/officeDocument/2006/customXml" ds:itemID="{CB955AF8-CFA3-4E81-A07C-637A8EF2BB5A}">
+  <ds:schemaRefs>
+    <ds:schemaRef ds:uri="http://schemas.microsoft.com/VisualStudio/2011/storyboarding/control"/>
+  </ds:schemaRefs>
+</ds:datastoreItem>
+</file>
+
+<file path=customXml/itemProps5.xml><?xml version="1.0" encoding="utf-8"?>
+<ds:datastoreItem xmlns:ds="http://schemas.openxmlformats.org/officeDocument/2006/customXml" ds:itemID="{5994508D-3B31-42DC-B919-BFD90538BA2A}">
+  <ds:schemaRefs>
+    <ds:schemaRef ds:uri="http://schemas.microsoft.com/VisualStudio/2011/storyboarding/control"/>
+  </ds:schemaRefs>
+</ds:datastoreItem>
+</file>
+
+<file path=customXml/itemProps50.xml><?xml version="1.0" encoding="utf-8"?>
+<ds:datastoreItem xmlns:ds="http://schemas.openxmlformats.org/officeDocument/2006/customXml" ds:itemID="{F0427285-802D-478A-8192-2EA534BA9535}">
+  <ds:schemaRefs>
+    <ds:schemaRef ds:uri="http://schemas.microsoft.com/VisualStudio/2011/storyboarding/control"/>
+  </ds:schemaRefs>
+</ds:datastoreItem>
+</file>
+
+<file path=customXml/itemProps51.xml><?xml version="1.0" encoding="utf-8"?>
+<ds:datastoreItem xmlns:ds="http://schemas.openxmlformats.org/officeDocument/2006/customXml" ds:itemID="{1B5754E8-1BBA-4E0C-83F8-E6253FF144F8}">
+  <ds:schemaRefs>
+    <ds:schemaRef ds:uri="http://schemas.microsoft.com/VisualStudio/2011/storyboarding/control"/>
+  </ds:schemaRefs>
+</ds:datastoreItem>
+</file>
+
+<file path=customXml/itemProps52.xml><?xml version="1.0" encoding="utf-8"?>
+<ds:datastoreItem xmlns:ds="http://schemas.openxmlformats.org/officeDocument/2006/customXml" ds:itemID="{EDF69710-0D47-4989-87C7-0AD83C64EB18}">
+  <ds:schemaRefs>
+    <ds:schemaRef ds:uri="http://schemas.microsoft.com/VisualStudio/2011/storyboarding/control"/>
+  </ds:schemaRefs>
+</ds:datastoreItem>
+</file>
+
+<file path=customXml/itemProps53.xml><?xml version="1.0" encoding="utf-8"?>
+<ds:datastoreItem xmlns:ds="http://schemas.openxmlformats.org/officeDocument/2006/customXml" ds:itemID="{3B397A98-ACC4-4021-AC3A-0C1EC793B407}">
+  <ds:schemaRefs>
+    <ds:schemaRef ds:uri="http://schemas.microsoft.com/VisualStudio/2011/storyboarding/control"/>
+  </ds:schemaRefs>
+</ds:datastoreItem>
+</file>
+
+<file path=customXml/itemProps54.xml><?xml version="1.0" encoding="utf-8"?>
+<ds:datastoreItem xmlns:ds="http://schemas.openxmlformats.org/officeDocument/2006/customXml" ds:itemID="{59D6A2F8-3D94-4AD4-B102-B7CA40667176}">
+  <ds:schemaRefs>
+    <ds:schemaRef ds:uri="http://schemas.microsoft.com/VisualStudio/2011/storyboarding/control"/>
+  </ds:schemaRefs>
+</ds:datastoreItem>
+</file>
+
+<file path=customXml/itemProps55.xml><?xml version="1.0" encoding="utf-8"?>
+<ds:datastoreItem xmlns:ds="http://schemas.openxmlformats.org/officeDocument/2006/customXml" ds:itemID="{E642387D-5A9C-42B0-AE53-BB60D2ACDC51}">
+  <ds:schemaRefs>
+    <ds:schemaRef ds:uri="http://schemas.microsoft.com/VisualStudio/2011/storyboarding/control"/>
+  </ds:schemaRefs>
+</ds:datastoreItem>
+</file>
+
+<file path=customXml/itemProps56.xml><?xml version="1.0" encoding="utf-8"?>
+<ds:datastoreItem xmlns:ds="http://schemas.openxmlformats.org/officeDocument/2006/customXml" ds:itemID="{C1B72F51-754D-4AF8-9BBF-8E2709522109}">
+  <ds:schemaRefs>
+    <ds:schemaRef ds:uri="http://schemas.microsoft.com/VisualStudio/2011/storyboarding/control"/>
+  </ds:schemaRefs>
+</ds:datastoreItem>
+</file>
+
+<file path=customXml/itemProps57.xml><?xml version="1.0" encoding="utf-8"?>
+<ds:datastoreItem xmlns:ds="http://schemas.openxmlformats.org/officeDocument/2006/customXml" ds:itemID="{F449356B-5FBD-428B-95E4-7F68509C867E}">
+  <ds:schemaRefs>
+    <ds:schemaRef ds:uri="http://schemas.microsoft.com/VisualStudio/2011/storyboarding/control"/>
+  </ds:schemaRefs>
+</ds:datastoreItem>
+</file>
+
+<file path=customXml/itemProps58.xml><?xml version="1.0" encoding="utf-8"?>
+<ds:datastoreItem xmlns:ds="http://schemas.openxmlformats.org/officeDocument/2006/customXml" ds:itemID="{23C004C7-F0EC-4E5F-817C-3AD0EB694A00}">
+  <ds:schemaRefs>
+    <ds:schemaRef ds:uri="http://schemas.microsoft.com/VisualStudio/2011/storyboarding/control"/>
+  </ds:schemaRefs>
+</ds:datastoreItem>
+</file>
+
+<file path=customXml/itemProps59.xml><?xml version="1.0" encoding="utf-8"?>
+<ds:datastoreItem xmlns:ds="http://schemas.openxmlformats.org/officeDocument/2006/customXml" ds:itemID="{84F754A2-A88B-448D-8920-B13BCF8079FA}">
+  <ds:schemaRefs>
+    <ds:schemaRef ds:uri="http://schemas.microsoft.com/VisualStudio/2011/storyboarding/control"/>
+  </ds:schemaRefs>
+</ds:datastoreItem>
+</file>
+
+<file path=customXml/itemProps6.xml><?xml version="1.0" encoding="utf-8"?>
+<ds:datastoreItem xmlns:ds="http://schemas.openxmlformats.org/officeDocument/2006/customXml" ds:itemID="{52469F0B-98E9-4C2C-9EA9-3C266A667D5B}">
+  <ds:schemaRefs>
+    <ds:schemaRef ds:uri="http://schemas.microsoft.com/VisualStudio/2011/storyboarding/control"/>
+  </ds:schemaRefs>
+</ds:datastoreItem>
+</file>
+
+<file path=customXml/itemProps60.xml><?xml version="1.0" encoding="utf-8"?>
+<ds:datastoreItem xmlns:ds="http://schemas.openxmlformats.org/officeDocument/2006/customXml" ds:itemID="{FCF7D0F6-3A56-416B-9028-F9A19A998640}">
+  <ds:schemaRefs>
+    <ds:schemaRef ds:uri="http://schemas.microsoft.com/VisualStudio/2011/storyboarding/control"/>
+  </ds:schemaRefs>
+</ds:datastoreItem>
+</file>
+
+<file path=customXml/itemProps61.xml><?xml version="1.0" encoding="utf-8"?>
 <ds:datastoreItem xmlns:ds="http://schemas.openxmlformats.org/officeDocument/2006/customXml" ds:itemID="{497DD72E-12B1-49E8-B811-3A6995EAC59D}">
   <ds:schemaRefs>
     <ds:schemaRef ds:uri="http://schemas.microsoft.com/VisualStudio/2011/storyboarding/control"/>
@@ -57062,7 +57073,63 @@
 </ds:datastoreItem>
 </file>
 
-<file path=customXml/itemProps10.xml><?xml version="1.0" encoding="utf-8"?>
+<file path=customXml/itemProps62.xml><?xml version="1.0" encoding="utf-8"?>
+<ds:datastoreItem xmlns:ds="http://schemas.openxmlformats.org/officeDocument/2006/customXml" ds:itemID="{88F5C49D-2615-40C1-BE0C-5E516E77EA09}">
+  <ds:schemaRefs>
+    <ds:schemaRef ds:uri="http://schemas.microsoft.com/VisualStudio/2011/storyboarding/control"/>
+  </ds:schemaRefs>
+</ds:datastoreItem>
+</file>
+
+<file path=customXml/itemProps63.xml><?xml version="1.0" encoding="utf-8"?>
+<ds:datastoreItem xmlns:ds="http://schemas.openxmlformats.org/officeDocument/2006/customXml" ds:itemID="{A045B194-8D2B-4811-8A88-8FEF44EF6DF5}">
+  <ds:schemaRefs>
+    <ds:schemaRef ds:uri="http://schemas.microsoft.com/VisualStudio/2011/storyboarding/control"/>
+  </ds:schemaRefs>
+</ds:datastoreItem>
+</file>
+
+<file path=customXml/itemProps64.xml><?xml version="1.0" encoding="utf-8"?>
+<ds:datastoreItem xmlns:ds="http://schemas.openxmlformats.org/officeDocument/2006/customXml" ds:itemID="{3A3D044B-EF94-4546-9AF0-125955A7CF34}">
+  <ds:schemaRefs>
+    <ds:schemaRef ds:uri="http://schemas.microsoft.com/VisualStudio/2011/storyboarding/control"/>
+  </ds:schemaRefs>
+</ds:datastoreItem>
+</file>
+
+<file path=customXml/itemProps65.xml><?xml version="1.0" encoding="utf-8"?>
+<ds:datastoreItem xmlns:ds="http://schemas.openxmlformats.org/officeDocument/2006/customXml" ds:itemID="{39792CE7-5974-4EF0-AA30-CB89658C397C}">
+  <ds:schemaRefs>
+    <ds:schemaRef ds:uri="http://schemas.microsoft.com/VisualStudio/2011/storyboarding/control"/>
+  </ds:schemaRefs>
+</ds:datastoreItem>
+</file>
+
+<file path=customXml/itemProps66.xml><?xml version="1.0" encoding="utf-8"?>
+<ds:datastoreItem xmlns:ds="http://schemas.openxmlformats.org/officeDocument/2006/customXml" ds:itemID="{FE167245-5D6A-42EF-A6ED-C9F182C2873D}">
+  <ds:schemaRefs>
+    <ds:schemaRef ds:uri="http://schemas.microsoft.com/VisualStudio/2011/storyboarding/control"/>
+  </ds:schemaRefs>
+</ds:datastoreItem>
+</file>
+
+<file path=customXml/itemProps67.xml><?xml version="1.0" encoding="utf-8"?>
+<ds:datastoreItem xmlns:ds="http://schemas.openxmlformats.org/officeDocument/2006/customXml" ds:itemID="{43074D0A-3657-4398-9644-C5D12864ACB5}">
+  <ds:schemaRefs>
+    <ds:schemaRef ds:uri="http://schemas.microsoft.com/VisualStudio/2011/storyboarding/control"/>
+  </ds:schemaRefs>
+</ds:datastoreItem>
+</file>
+
+<file path=customXml/itemProps68.xml><?xml version="1.0" encoding="utf-8"?>
+<ds:datastoreItem xmlns:ds="http://schemas.openxmlformats.org/officeDocument/2006/customXml" ds:itemID="{7A255E18-8005-4540-AF6B-C52268905396}">
+  <ds:schemaRefs>
+    <ds:schemaRef ds:uri="http://schemas.microsoft.com/VisualStudio/2011/storyboarding/control"/>
+  </ds:schemaRefs>
+</ds:datastoreItem>
+</file>
+
+<file path=customXml/itemProps69.xml><?xml version="1.0" encoding="utf-8"?>
 <ds:datastoreItem xmlns:ds="http://schemas.openxmlformats.org/officeDocument/2006/customXml" ds:itemID="{B7107D59-48F9-4CF8-BE68-F08661A15329}">
   <ds:schemaRefs>
     <ds:schemaRef ds:uri="http://schemas.microsoft.com/VisualStudio/2011/storyboarding/control"/>
@@ -57070,15 +57137,111 @@
 </ds:datastoreItem>
 </file>
 
-<file path=customXml/itemProps100.xml><?xml version="1.0" encoding="utf-8"?>
-<ds:datastoreItem xmlns:ds="http://schemas.openxmlformats.org/officeDocument/2006/customXml" ds:itemID="{8A61EC23-9433-46E0-8895-7450DE4BBE66}">
+<file path=customXml/itemProps7.xml><?xml version="1.0" encoding="utf-8"?>
+<ds:datastoreItem xmlns:ds="http://schemas.openxmlformats.org/officeDocument/2006/customXml" ds:itemID="{0157611B-29CA-4FA6-9194-DEB87BAFD7C1}">
   <ds:schemaRefs>
     <ds:schemaRef ds:uri="http://schemas.microsoft.com/VisualStudio/2011/storyboarding/control"/>
   </ds:schemaRefs>
 </ds:datastoreItem>
 </file>
 
-<file path=customXml/itemProps101.xml><?xml version="1.0" encoding="utf-8"?>
+<file path=customXml/itemProps70.xml><?xml version="1.0" encoding="utf-8"?>
+<ds:datastoreItem xmlns:ds="http://schemas.openxmlformats.org/officeDocument/2006/customXml" ds:itemID="{6BDAC7C7-2A10-4B98-AF62-39B6C613F73C}">
+  <ds:schemaRefs>
+    <ds:schemaRef ds:uri="http://schemas.microsoft.com/VisualStudio/2011/storyboarding/control"/>
+  </ds:schemaRefs>
+</ds:datastoreItem>
+</file>
+
+<file path=customXml/itemProps71.xml><?xml version="1.0" encoding="utf-8"?>
+<ds:datastoreItem xmlns:ds="http://schemas.openxmlformats.org/officeDocument/2006/customXml" ds:itemID="{6F0C8409-0988-4021-9A6B-4ED5F8624D7E}">
+  <ds:schemaRefs>
+    <ds:schemaRef ds:uri="http://schemas.microsoft.com/VisualStudio/2011/storyboarding/control"/>
+  </ds:schemaRefs>
+</ds:datastoreItem>
+</file>
+
+<file path=customXml/itemProps72.xml><?xml version="1.0" encoding="utf-8"?>
+<ds:datastoreItem xmlns:ds="http://schemas.openxmlformats.org/officeDocument/2006/customXml" ds:itemID="{E7BF4E3B-2C32-4138-A26E-4FB5FD172B97}">
+  <ds:schemaRefs>
+    <ds:schemaRef ds:uri="http://schemas.microsoft.com/VisualStudio/2011/storyboarding/control"/>
+  </ds:schemaRefs>
+</ds:datastoreItem>
+</file>
+
+<file path=customXml/itemProps73.xml><?xml version="1.0" encoding="utf-8"?>
+<ds:datastoreItem xmlns:ds="http://schemas.openxmlformats.org/officeDocument/2006/customXml" ds:itemID="{EF33C40D-4DA0-4770-A012-CD8ABD9E79F7}">
+  <ds:schemaRefs>
+    <ds:schemaRef ds:uri="http://schemas.microsoft.com/VisualStudio/2011/storyboarding/control"/>
+  </ds:schemaRefs>
+</ds:datastoreItem>
+</file>
+
+<file path=customXml/itemProps74.xml><?xml version="1.0" encoding="utf-8"?>
+<ds:datastoreItem xmlns:ds="http://schemas.openxmlformats.org/officeDocument/2006/customXml" ds:itemID="{4BFA8902-6B8C-4198-972F-C484EE628954}">
+  <ds:schemaRefs>
+    <ds:schemaRef ds:uri="http://schemas.microsoft.com/VisualStudio/2011/storyboarding/control"/>
+  </ds:schemaRefs>
+</ds:datastoreItem>
+</file>
+
+<file path=customXml/itemProps75.xml><?xml version="1.0" encoding="utf-8"?>
+<ds:datastoreItem xmlns:ds="http://schemas.openxmlformats.org/officeDocument/2006/customXml" ds:itemID="{67F70B07-BDF2-42EE-A09E-A099CFFA9D16}">
+  <ds:schemaRefs>
+    <ds:schemaRef ds:uri="http://schemas.microsoft.com/VisualStudio/2011/storyboarding/control"/>
+  </ds:schemaRefs>
+</ds:datastoreItem>
+</file>
+
+<file path=customXml/itemProps76.xml><?xml version="1.0" encoding="utf-8"?>
+<ds:datastoreItem xmlns:ds="http://schemas.openxmlformats.org/officeDocument/2006/customXml" ds:itemID="{04A820AF-4680-4898-8A8B-7B95BF30C332}">
+  <ds:schemaRefs>
+    <ds:schemaRef ds:uri="http://schemas.microsoft.com/VisualStudio/2011/storyboarding/control"/>
+  </ds:schemaRefs>
+</ds:datastoreItem>
+</file>
+
+<file path=customXml/itemProps77.xml><?xml version="1.0" encoding="utf-8"?>
+<ds:datastoreItem xmlns:ds="http://schemas.openxmlformats.org/officeDocument/2006/customXml" ds:itemID="{18FFF095-42F0-4B57-AFB8-96702D3DFC32}">
+  <ds:schemaRefs>
+    <ds:schemaRef ds:uri="http://schemas.microsoft.com/VisualStudio/2011/storyboarding/control"/>
+  </ds:schemaRefs>
+</ds:datastoreItem>
+</file>
+
+<file path=customXml/itemProps78.xml><?xml version="1.0" encoding="utf-8"?>
+<ds:datastoreItem xmlns:ds="http://schemas.openxmlformats.org/officeDocument/2006/customXml" ds:itemID="{28114E52-9982-44AB-BE25-6CD6129FE58D}">
+  <ds:schemaRefs>
+    <ds:schemaRef ds:uri="http://schemas.microsoft.com/VisualStudio/2011/storyboarding/control"/>
+  </ds:schemaRefs>
+</ds:datastoreItem>
+</file>
+
+<file path=customXml/itemProps79.xml><?xml version="1.0" encoding="utf-8"?>
+<ds:datastoreItem xmlns:ds="http://schemas.openxmlformats.org/officeDocument/2006/customXml" ds:itemID="{550ECD15-053B-4781-8EBC-0491E8070FB4}">
+  <ds:schemaRefs>
+    <ds:schemaRef ds:uri="http://schemas.microsoft.com/VisualStudio/2011/storyboarding/control"/>
+  </ds:schemaRefs>
+</ds:datastoreItem>
+</file>
+
+<file path=customXml/itemProps8.xml><?xml version="1.0" encoding="utf-8"?>
+<ds:datastoreItem xmlns:ds="http://schemas.openxmlformats.org/officeDocument/2006/customXml" ds:itemID="{2A268AC4-CB4C-41D2-89A1-D3FD7620AE46}">
+  <ds:schemaRefs>
+    <ds:schemaRef ds:uri="http://schemas.microsoft.com/VisualStudio/2011/storyboarding/control"/>
+  </ds:schemaRefs>
+</ds:datastoreItem>
+</file>
+
+<file path=customXml/itemProps80.xml><?xml version="1.0" encoding="utf-8"?>
+<ds:datastoreItem xmlns:ds="http://schemas.openxmlformats.org/officeDocument/2006/customXml" ds:itemID="{5DC640DF-A2F3-4C6D-B7B0-79851601D3D6}">
+  <ds:schemaRefs>
+    <ds:schemaRef ds:uri="http://schemas.microsoft.com/VisualStudio/2011/storyboarding/control"/>
+  </ds:schemaRefs>
+</ds:datastoreItem>
+</file>
+
+<file path=customXml/itemProps81.xml><?xml version="1.0" encoding="utf-8"?>
 <ds:datastoreItem xmlns:ds="http://schemas.openxmlformats.org/officeDocument/2006/customXml" ds:itemID="{AABB054C-ED74-441C-8BA0-648E3DD83C07}">
   <ds:schemaRefs>
     <ds:schemaRef ds:uri="http://schemas.microsoft.com/VisualStudio/2011/storyboarding/control"/>
@@ -57086,15 +57249,71 @@
 </ds:datastoreItem>
 </file>
 
-<file path=customXml/itemProps102.xml><?xml version="1.0" encoding="utf-8"?>
-<ds:datastoreItem xmlns:ds="http://schemas.openxmlformats.org/officeDocument/2006/customXml" ds:itemID="{58F5313F-606B-4152-996D-D50C7DBBCD74}">
+<file path=customXml/itemProps82.xml><?xml version="1.0" encoding="utf-8"?>
+<ds:datastoreItem xmlns:ds="http://schemas.openxmlformats.org/officeDocument/2006/customXml" ds:itemID="{1C9ED7D9-A7C2-455C-A2C4-C0255584007B}">
   <ds:schemaRefs>
     <ds:schemaRef ds:uri="http://schemas.microsoft.com/VisualStudio/2011/storyboarding/control"/>
   </ds:schemaRefs>
 </ds:datastoreItem>
 </file>
 
-<file path=customXml/itemProps11.xml><?xml version="1.0" encoding="utf-8"?>
+<file path=customXml/itemProps83.xml><?xml version="1.0" encoding="utf-8"?>
+<ds:datastoreItem xmlns:ds="http://schemas.openxmlformats.org/officeDocument/2006/customXml" ds:itemID="{AEFE391D-6609-4CAD-83FC-E962309522C9}">
+  <ds:schemaRefs>
+    <ds:schemaRef ds:uri="http://schemas.microsoft.com/VisualStudio/2011/storyboarding/control"/>
+  </ds:schemaRefs>
+</ds:datastoreItem>
+</file>
+
+<file path=customXml/itemProps84.xml><?xml version="1.0" encoding="utf-8"?>
+<ds:datastoreItem xmlns:ds="http://schemas.openxmlformats.org/officeDocument/2006/customXml" ds:itemID="{5BF08CEE-D2FE-4E07-AFD9-56D804BE1BD5}">
+  <ds:schemaRefs>
+    <ds:schemaRef ds:uri="http://schemas.microsoft.com/VisualStudio/2011/storyboarding/control"/>
+  </ds:schemaRefs>
+</ds:datastoreItem>
+</file>
+
+<file path=customXml/itemProps85.xml><?xml version="1.0" encoding="utf-8"?>
+<ds:datastoreItem xmlns:ds="http://schemas.openxmlformats.org/officeDocument/2006/customXml" ds:itemID="{F45CF809-240B-48C4-B6CC-D2D11199564B}">
+  <ds:schemaRefs>
+    <ds:schemaRef ds:uri="http://schemas.microsoft.com/VisualStudio/2011/storyboarding/control"/>
+  </ds:schemaRefs>
+</ds:datastoreItem>
+</file>
+
+<file path=customXml/itemProps86.xml><?xml version="1.0" encoding="utf-8"?>
+<ds:datastoreItem xmlns:ds="http://schemas.openxmlformats.org/officeDocument/2006/customXml" ds:itemID="{47AFF6AB-8D55-4D16-A65C-963E1EA204E2}">
+  <ds:schemaRefs>
+    <ds:schemaRef ds:uri="http://schemas.microsoft.com/VisualStudio/2011/storyboarding/control"/>
+  </ds:schemaRefs>
+</ds:datastoreItem>
+</file>
+
+<file path=customXml/itemProps87.xml><?xml version="1.0" encoding="utf-8"?>
+<ds:datastoreItem xmlns:ds="http://schemas.openxmlformats.org/officeDocument/2006/customXml" ds:itemID="{8D71BB45-77E4-4137-9A4E-CE7F0EA997DC}">
+  <ds:schemaRefs>
+    <ds:schemaRef ds:uri="http://schemas.microsoft.com/VisualStudio/2011/storyboarding/control"/>
+  </ds:schemaRefs>
+</ds:datastoreItem>
+</file>
+
+<file path=customXml/itemProps88.xml><?xml version="1.0" encoding="utf-8"?>
+<ds:datastoreItem xmlns:ds="http://schemas.openxmlformats.org/officeDocument/2006/customXml" ds:itemID="{0704B3AE-AAE9-4650-BABC-88E01C7BD3B0}">
+  <ds:schemaRefs>
+    <ds:schemaRef ds:uri="http://schemas.microsoft.com/VisualStudio/2011/storyboarding/control"/>
+  </ds:schemaRefs>
+</ds:datastoreItem>
+</file>
+
+<file path=customXml/itemProps89.xml><?xml version="1.0" encoding="utf-8"?>
+<ds:datastoreItem xmlns:ds="http://schemas.openxmlformats.org/officeDocument/2006/customXml" ds:itemID="{C99250CB-41AD-4674-B392-C867EAFC00F7}">
+  <ds:schemaRefs>
+    <ds:schemaRef ds:uri="http://schemas.microsoft.com/VisualStudio/2011/storyboarding/control"/>
+  </ds:schemaRefs>
+</ds:datastoreItem>
+</file>
+
+<file path=customXml/itemProps9.xml><?xml version="1.0" encoding="utf-8"?>
 <ds:datastoreItem xmlns:ds="http://schemas.openxmlformats.org/officeDocument/2006/customXml" ds:itemID="{98C27164-50FE-4C81-A14D-DF0CA2592187}">
   <ds:schemaRefs>
     <ds:schemaRef ds:uri="http://schemas.microsoft.com/VisualStudio/2011/storyboarding/control"/>
@@ -57102,71 +57321,47 @@
 </ds:datastoreItem>
 </file>
 
-<file path=customXml/itemProps12.xml><?xml version="1.0" encoding="utf-8"?>
-<ds:datastoreItem xmlns:ds="http://schemas.openxmlformats.org/officeDocument/2006/customXml" ds:itemID="{C66D9D6C-2641-4CD6-85C0-39ED42084838}">
+<file path=customXml/itemProps90.xml><?xml version="1.0" encoding="utf-8"?>
+<ds:datastoreItem xmlns:ds="http://schemas.openxmlformats.org/officeDocument/2006/customXml" ds:itemID="{6580BA71-1754-4A06-8B96-16C9A6DB079A}">
   <ds:schemaRefs>
     <ds:schemaRef ds:uri="http://schemas.microsoft.com/VisualStudio/2011/storyboarding/control"/>
   </ds:schemaRefs>
 </ds:datastoreItem>
 </file>
 
-<file path=customXml/itemProps13.xml><?xml version="1.0" encoding="utf-8"?>
-<ds:datastoreItem xmlns:ds="http://schemas.openxmlformats.org/officeDocument/2006/customXml" ds:itemID="{5BF08CEE-D2FE-4E07-AFD9-56D804BE1BD5}">
+<file path=customXml/itemProps91.xml><?xml version="1.0" encoding="utf-8"?>
+<ds:datastoreItem xmlns:ds="http://schemas.openxmlformats.org/officeDocument/2006/customXml" ds:itemID="{190C52B0-4898-4622-A0DF-6EF3E078C949}">
   <ds:schemaRefs>
     <ds:schemaRef ds:uri="http://schemas.microsoft.com/VisualStudio/2011/storyboarding/control"/>
   </ds:schemaRefs>
 </ds:datastoreItem>
 </file>
 
-<file path=customXml/itemProps14.xml><?xml version="1.0" encoding="utf-8"?>
-<ds:datastoreItem xmlns:ds="http://schemas.openxmlformats.org/officeDocument/2006/customXml" ds:itemID="{3170B703-293D-46C9-817F-D00CEDB460E0}">
+<file path=customXml/itemProps92.xml><?xml version="1.0" encoding="utf-8"?>
+<ds:datastoreItem xmlns:ds="http://schemas.openxmlformats.org/officeDocument/2006/customXml" ds:itemID="{B057E94C-EA0A-41DB-AD9B-0300F5E13950}">
   <ds:schemaRefs>
     <ds:schemaRef ds:uri="http://schemas.microsoft.com/VisualStudio/2011/storyboarding/control"/>
   </ds:schemaRefs>
 </ds:datastoreItem>
 </file>
 
-<file path=customXml/itemProps15.xml><?xml version="1.0" encoding="utf-8"?>
-<ds:datastoreItem xmlns:ds="http://schemas.openxmlformats.org/officeDocument/2006/customXml" ds:itemID="{A045B194-8D2B-4811-8A88-8FEF44EF6DF5}">
+<file path=customXml/itemProps93.xml><?xml version="1.0" encoding="utf-8"?>
+<ds:datastoreItem xmlns:ds="http://schemas.openxmlformats.org/officeDocument/2006/customXml" ds:itemID="{AD253A7D-10F2-4E16-BD40-EB144A4BB100}">
   <ds:schemaRefs>
     <ds:schemaRef ds:uri="http://schemas.microsoft.com/VisualStudio/2011/storyboarding/control"/>
   </ds:schemaRefs>
 </ds:datastoreItem>
 </file>
 
-<file path=customXml/itemProps16.xml><?xml version="1.0" encoding="utf-8"?>
-<ds:datastoreItem xmlns:ds="http://schemas.openxmlformats.org/officeDocument/2006/customXml" ds:itemID="{2A268AC4-CB4C-41D2-89A1-D3FD7620AE46}">
+<file path=customXml/itemProps94.xml><?xml version="1.0" encoding="utf-8"?>
+<ds:datastoreItem xmlns:ds="http://schemas.openxmlformats.org/officeDocument/2006/customXml" ds:itemID="{1C0398C3-A437-479F-BA82-EA141FF05F86}">
   <ds:schemaRefs>
     <ds:schemaRef ds:uri="http://schemas.microsoft.com/VisualStudio/2011/storyboarding/control"/>
   </ds:schemaRefs>
 </ds:datastoreItem>
 </file>
 
-<file path=customXml/itemProps17.xml><?xml version="1.0" encoding="utf-8"?>
-<ds:datastoreItem xmlns:ds="http://schemas.openxmlformats.org/officeDocument/2006/customXml" ds:itemID="{332CC537-27D6-441A-880E-EE9A8B2B028C}">
-  <ds:schemaRefs>
-    <ds:schemaRef ds:uri="http://schemas.microsoft.com/VisualStudio/2011/storyboarding/control"/>
-  </ds:schemaRefs>
-</ds:datastoreItem>
-</file>
-
-<file path=customXml/itemProps18.xml><?xml version="1.0" encoding="utf-8"?>
-<ds:datastoreItem xmlns:ds="http://schemas.openxmlformats.org/officeDocument/2006/customXml" ds:itemID="{F45CF809-240B-48C4-B6CC-D2D11199564B}">
-  <ds:schemaRefs>
-    <ds:schemaRef ds:uri="http://schemas.microsoft.com/VisualStudio/2011/storyboarding/control"/>
-  </ds:schemaRefs>
-</ds:datastoreItem>
-</file>
-
-<file path=customXml/itemProps19.xml><?xml version="1.0" encoding="utf-8"?>
-<ds:datastoreItem xmlns:ds="http://schemas.openxmlformats.org/officeDocument/2006/customXml" ds:itemID="{AA35EE34-96D9-4024-A7F7-A787BF5DC8F2}">
-  <ds:schemaRefs>
-    <ds:schemaRef ds:uri="http://schemas.microsoft.com/VisualStudio/2011/storyboarding/control"/>
-  </ds:schemaRefs>
-</ds:datastoreItem>
-</file>
-
-<file path=customXml/itemProps2.xml><?xml version="1.0" encoding="utf-8"?>
+<file path=customXml/itemProps95.xml><?xml version="1.0" encoding="utf-8"?>
 <ds:datastoreItem xmlns:ds="http://schemas.openxmlformats.org/officeDocument/2006/customXml" ds:itemID="{A277A213-A9C2-4792-9E15-F302DDDF0697}">
   <ds:schemaRefs>
     <ds:schemaRef ds:uri="http://schemas.microsoft.com/VisualStudio/2011/storyboarding/control"/>
@@ -57174,39 +57369,15 @@
 </ds:datastoreItem>
 </file>
 
-<file path=customXml/itemProps20.xml><?xml version="1.0" encoding="utf-8"?>
-<ds:datastoreItem xmlns:ds="http://schemas.openxmlformats.org/officeDocument/2006/customXml" ds:itemID="{1B5754E8-1BBA-4E0C-83F8-E6253FF144F8}">
+<file path=customXml/itemProps96.xml><?xml version="1.0" encoding="utf-8"?>
+<ds:datastoreItem xmlns:ds="http://schemas.openxmlformats.org/officeDocument/2006/customXml" ds:itemID="{7401F6B4-1A2C-4331-8E18-90AE2F7B0C7B}">
   <ds:schemaRefs>
     <ds:schemaRef ds:uri="http://schemas.microsoft.com/VisualStudio/2011/storyboarding/control"/>
   </ds:schemaRefs>
 </ds:datastoreItem>
 </file>
 
-<file path=customXml/itemProps21.xml><?xml version="1.0" encoding="utf-8"?>
-<ds:datastoreItem xmlns:ds="http://schemas.openxmlformats.org/officeDocument/2006/customXml" ds:itemID="{9726E98B-49CF-4D47-BB08-34156C99E90C}">
-  <ds:schemaRefs>
-    <ds:schemaRef ds:uri="http://schemas.microsoft.com/VisualStudio/2011/storyboarding/control"/>
-  </ds:schemaRefs>
-</ds:datastoreItem>
-</file>
-
-<file path=customXml/itemProps22.xml><?xml version="1.0" encoding="utf-8"?>
-<ds:datastoreItem xmlns:ds="http://schemas.openxmlformats.org/officeDocument/2006/customXml" ds:itemID="{C1F8B112-F417-4C30-AE93-3501F6EA0636}">
-  <ds:schemaRefs>
-    <ds:schemaRef ds:uri="http://schemas.microsoft.com/VisualStudio/2011/storyboarding/control"/>
-  </ds:schemaRefs>
-</ds:datastoreItem>
-</file>
-
-<file path=customXml/itemProps23.xml><?xml version="1.0" encoding="utf-8"?>
-<ds:datastoreItem xmlns:ds="http://schemas.openxmlformats.org/officeDocument/2006/customXml" ds:itemID="{3A3D044B-EF94-4546-9AF0-125955A7CF34}">
-  <ds:schemaRefs>
-    <ds:schemaRef ds:uri="http://schemas.microsoft.com/VisualStudio/2011/storyboarding/control"/>
-  </ds:schemaRefs>
-</ds:datastoreItem>
-</file>
-
-<file path=customXml/itemProps24.xml><?xml version="1.0" encoding="utf-8"?>
+<file path=customXml/itemProps97.xml><?xml version="1.0" encoding="utf-8"?>
 <ds:datastoreItem xmlns:ds="http://schemas.openxmlformats.org/officeDocument/2006/customXml" ds:itemID="{2B1F7FA3-1F53-4ADC-902C-A6FCBB987AD3}">
   <ds:schemaRefs>
     <ds:schemaRef ds:uri="http://schemas.microsoft.com/VisualStudio/2011/storyboarding/control"/>
@@ -57214,143 +57385,7 @@
 </ds:datastoreItem>
 </file>
 
-<file path=customXml/itemProps25.xml><?xml version="1.0" encoding="utf-8"?>
-<ds:datastoreItem xmlns:ds="http://schemas.openxmlformats.org/officeDocument/2006/customXml" ds:itemID="{085909DF-A38F-4AFC-B672-491B624DDBA5}">
-  <ds:schemaRefs>
-    <ds:schemaRef ds:uri="http://schemas.microsoft.com/VisualStudio/2011/storyboarding/control"/>
-  </ds:schemaRefs>
-</ds:datastoreItem>
-</file>
-
-<file path=customXml/itemProps26.xml><?xml version="1.0" encoding="utf-8"?>
-<ds:datastoreItem xmlns:ds="http://schemas.openxmlformats.org/officeDocument/2006/customXml" ds:itemID="{FBA587A7-EADC-4E1B-B6D8-D3FA6C373069}">
-  <ds:schemaRefs>
-    <ds:schemaRef ds:uri="http://schemas.microsoft.com/VisualStudio/2011/storyboarding/control"/>
-  </ds:schemaRefs>
-</ds:datastoreItem>
-</file>
-
-<file path=customXml/itemProps27.xml><?xml version="1.0" encoding="utf-8"?>
-<ds:datastoreItem xmlns:ds="http://schemas.openxmlformats.org/officeDocument/2006/customXml" ds:itemID="{D4BA7353-13EF-49E0-8823-D22D5865EDFD}">
-  <ds:schemaRefs>
-    <ds:schemaRef ds:uri="http://schemas.microsoft.com/VisualStudio/2011/storyboarding/control"/>
-  </ds:schemaRefs>
-</ds:datastoreItem>
-</file>
-
-<file path=customXml/itemProps28.xml><?xml version="1.0" encoding="utf-8"?>
-<ds:datastoreItem xmlns:ds="http://schemas.openxmlformats.org/officeDocument/2006/customXml" ds:itemID="{39792CE7-5974-4EF0-AA30-CB89658C397C}">
-  <ds:schemaRefs>
-    <ds:schemaRef ds:uri="http://schemas.microsoft.com/VisualStudio/2011/storyboarding/control"/>
-  </ds:schemaRefs>
-</ds:datastoreItem>
-</file>
-
-<file path=customXml/itemProps29.xml><?xml version="1.0" encoding="utf-8"?>
-<ds:datastoreItem xmlns:ds="http://schemas.openxmlformats.org/officeDocument/2006/customXml" ds:itemID="{7401F6B4-1A2C-4331-8E18-90AE2F7B0C7B}">
-  <ds:schemaRefs>
-    <ds:schemaRef ds:uri="http://schemas.microsoft.com/VisualStudio/2011/storyboarding/control"/>
-  </ds:schemaRefs>
-</ds:datastoreItem>
-</file>
-
-<file path=customXml/itemProps3.xml><?xml version="1.0" encoding="utf-8"?>
-<ds:datastoreItem xmlns:ds="http://schemas.openxmlformats.org/officeDocument/2006/customXml" ds:itemID="{7BB2ADCD-A977-4971-AF76-72DF82176001}">
-  <ds:schemaRefs>
-    <ds:schemaRef ds:uri="http://schemas.microsoft.com/VisualStudio/2011/storyboarding/control"/>
-  </ds:schemaRefs>
-</ds:datastoreItem>
-</file>
-
-<file path=customXml/itemProps30.xml><?xml version="1.0" encoding="utf-8"?>
-<ds:datastoreItem xmlns:ds="http://schemas.openxmlformats.org/officeDocument/2006/customXml" ds:itemID="{BCE90BB7-F130-4FC8-97FD-0FF88C888C7C}">
-  <ds:schemaRefs>
-    <ds:schemaRef ds:uri="http://schemas.microsoft.com/VisualStudio/2011/storyboarding/control"/>
-  </ds:schemaRefs>
-</ds:datastoreItem>
-</file>
-
-<file path=customXml/itemProps31.xml><?xml version="1.0" encoding="utf-8"?>
-<ds:datastoreItem xmlns:ds="http://schemas.openxmlformats.org/officeDocument/2006/customXml" ds:itemID="{6BDAC7C7-2A10-4B98-AF62-39B6C613F73C}">
-  <ds:schemaRefs>
-    <ds:schemaRef ds:uri="http://schemas.microsoft.com/VisualStudio/2011/storyboarding/control"/>
-  </ds:schemaRefs>
-</ds:datastoreItem>
-</file>
-
-<file path=customXml/itemProps32.xml><?xml version="1.0" encoding="utf-8"?>
-<ds:datastoreItem xmlns:ds="http://schemas.openxmlformats.org/officeDocument/2006/customXml" ds:itemID="{AA61DB0E-24DB-4781-AD0E-AC6B1C4806A5}">
-  <ds:schemaRefs>
-    <ds:schemaRef ds:uri="http://schemas.microsoft.com/VisualStudio/2011/storyboarding/control"/>
-  </ds:schemaRefs>
-</ds:datastoreItem>
-</file>
-
-<file path=customXml/itemProps33.xml><?xml version="1.0" encoding="utf-8"?>
-<ds:datastoreItem xmlns:ds="http://schemas.openxmlformats.org/officeDocument/2006/customXml" ds:itemID="{49F24717-98E7-4111-8DB8-64B4C9CFD0CB}">
-  <ds:schemaRefs>
-    <ds:schemaRef ds:uri="http://schemas.microsoft.com/VisualStudio/2011/storyboarding/control"/>
-  </ds:schemaRefs>
-</ds:datastoreItem>
-</file>
-
-<file path=customXml/itemProps34.xml><?xml version="1.0" encoding="utf-8"?>
-<ds:datastoreItem xmlns:ds="http://schemas.openxmlformats.org/officeDocument/2006/customXml" ds:itemID="{8D71BB45-77E4-4137-9A4E-CE7F0EA997DC}">
-  <ds:schemaRefs>
-    <ds:schemaRef ds:uri="http://schemas.microsoft.com/VisualStudio/2011/storyboarding/control"/>
-  </ds:schemaRefs>
-</ds:datastoreItem>
-</file>
-
-<file path=customXml/itemProps35.xml><?xml version="1.0" encoding="utf-8"?>
-<ds:datastoreItem xmlns:ds="http://schemas.openxmlformats.org/officeDocument/2006/customXml" ds:itemID="{F7544449-F6AD-4286-B200-DD81591A7AC8}">
-  <ds:schemaRefs>
-    <ds:schemaRef ds:uri="http://schemas.microsoft.com/VisualStudio/2011/storyboarding/control"/>
-  </ds:schemaRefs>
-</ds:datastoreItem>
-</file>
-
-<file path=customXml/itemProps36.xml><?xml version="1.0" encoding="utf-8"?>
-<ds:datastoreItem xmlns:ds="http://schemas.openxmlformats.org/officeDocument/2006/customXml" ds:itemID="{FE167245-5D6A-42EF-A6ED-C9F182C2873D}">
-  <ds:schemaRefs>
-    <ds:schemaRef ds:uri="http://schemas.microsoft.com/VisualStudio/2011/storyboarding/control"/>
-  </ds:schemaRefs>
-</ds:datastoreItem>
-</file>
-
-<file path=customXml/itemProps37.xml><?xml version="1.0" encoding="utf-8"?>
-<ds:datastoreItem xmlns:ds="http://schemas.openxmlformats.org/officeDocument/2006/customXml" ds:itemID="{5A152910-E02F-4F71-9AAE-D37306DB32BF}">
-  <ds:schemaRefs>
-    <ds:schemaRef ds:uri="http://schemas.microsoft.com/VisualStudio/2011/storyboarding/control"/>
-  </ds:schemaRefs>
-</ds:datastoreItem>
-</file>
-
-<file path=customXml/itemProps38.xml><?xml version="1.0" encoding="utf-8"?>
-<ds:datastoreItem xmlns:ds="http://schemas.openxmlformats.org/officeDocument/2006/customXml" ds:itemID="{A08C4EF9-B721-474A-8DC6-5433A60DAEA4}">
-  <ds:schemaRefs>
-    <ds:schemaRef ds:uri="http://schemas.microsoft.com/VisualStudio/2011/storyboarding/control"/>
-  </ds:schemaRefs>
-</ds:datastoreItem>
-</file>
-
-<file path=customXml/itemProps39.xml><?xml version="1.0" encoding="utf-8"?>
-<ds:datastoreItem xmlns:ds="http://schemas.openxmlformats.org/officeDocument/2006/customXml" ds:itemID="{47AFF6AB-8D55-4D16-A65C-963E1EA204E2}">
-  <ds:schemaRefs>
-    <ds:schemaRef ds:uri="http://schemas.microsoft.com/VisualStudio/2011/storyboarding/control"/>
-  </ds:schemaRefs>
-</ds:datastoreItem>
-</file>
-
-<file path=customXml/itemProps4.xml><?xml version="1.0" encoding="utf-8"?>
-<ds:datastoreItem xmlns:ds="http://schemas.openxmlformats.org/officeDocument/2006/customXml" ds:itemID="{1C9ED7D9-A7C2-455C-A2C4-C0255584007B}">
-  <ds:schemaRefs>
-    <ds:schemaRef ds:uri="http://schemas.microsoft.com/VisualStudio/2011/storyboarding/control"/>
-  </ds:schemaRefs>
-</ds:datastoreItem>
-</file>
-
-<file path=customXml/itemProps40.xml><?xml version="1.0" encoding="utf-8"?>
+<file path=customXml/itemProps98.xml><?xml version="1.0" encoding="utf-8"?>
 <ds:datastoreItem xmlns:ds="http://schemas.openxmlformats.org/officeDocument/2006/customXml" ds:itemID="{FB251EC4-2AF1-4307-BBBD-6EB1F0FB9985}">
   <ds:schemaRefs>
     <ds:schemaRef ds:uri="http://schemas.microsoft.com/VisualStudio/2011/storyboarding/control"/>
@@ -57358,514 +57393,10 @@
 </ds:datastoreItem>
 </file>
 
-<file path=customXml/itemProps41.xml><?xml version="1.0" encoding="utf-8"?>
-<ds:datastoreItem xmlns:ds="http://schemas.openxmlformats.org/officeDocument/2006/customXml" ds:itemID="{EDF69710-0D47-4989-87C7-0AD83C64EB18}">
-  <ds:schemaRefs>
-    <ds:schemaRef ds:uri="http://schemas.microsoft.com/VisualStudio/2011/storyboarding/control"/>
-  </ds:schemaRefs>
-</ds:datastoreItem>
-</file>
-
-<file path=customXml/itemProps42.xml><?xml version="1.0" encoding="utf-8"?>
-<ds:datastoreItem xmlns:ds="http://schemas.openxmlformats.org/officeDocument/2006/customXml" ds:itemID="{F799EA92-8666-4EE3-81E2-090E468CA5EA}">
-  <ds:schemaRefs>
-    <ds:schemaRef ds:uri="http://schemas.microsoft.com/VisualStudio/2011/storyboarding/control"/>
-  </ds:schemaRefs>
-</ds:datastoreItem>
-</file>
-
-<file path=customXml/itemProps43.xml><?xml version="1.0" encoding="utf-8"?>
-<ds:datastoreItem xmlns:ds="http://schemas.openxmlformats.org/officeDocument/2006/customXml" ds:itemID="{27A1EB69-445A-4024-985D-54EE302BE6B7}">
-  <ds:schemaRefs>
-    <ds:schemaRef ds:uri="http://schemas.microsoft.com/VisualStudio/2011/storyboarding/control"/>
-  </ds:schemaRefs>
-</ds:datastoreItem>
-</file>
-
-<file path=customXml/itemProps44.xml><?xml version="1.0" encoding="utf-8"?>
-<ds:datastoreItem xmlns:ds="http://schemas.openxmlformats.org/officeDocument/2006/customXml" ds:itemID="{6F0C8409-0988-4021-9A6B-4ED5F8624D7E}">
-  <ds:schemaRefs>
-    <ds:schemaRef ds:uri="http://schemas.microsoft.com/VisualStudio/2011/storyboarding/control"/>
-  </ds:schemaRefs>
-</ds:datastoreItem>
-</file>
-
-<file path=customXml/itemProps45.xml><?xml version="1.0" encoding="utf-8"?>
+<file path=customXml/itemProps99.xml><?xml version="1.0" encoding="utf-8"?>
 <ds:datastoreItem xmlns:ds="http://schemas.openxmlformats.org/officeDocument/2006/customXml" ds:itemID="{80C0516E-FF30-443E-911E-96F177EF6648}">
   <ds:schemaRefs>
     <ds:schemaRef ds:uri="http://schemas.microsoft.com/VisualStudio/2011/storyboarding/control"/>
   </ds:schemaRefs>
 </ds:datastoreItem>
-</file>
-
-<file path=customXml/itemProps46.xml><?xml version="1.0" encoding="utf-8"?>
-<ds:datastoreItem xmlns:ds="http://schemas.openxmlformats.org/officeDocument/2006/customXml" ds:itemID="{E4C78399-1141-4DE4-A0F7-EA0BED20CBB7}">
-  <ds:schemaRefs>
-    <ds:schemaRef ds:uri="http://schemas.microsoft.com/VisualStudio/2011/storyboarding/control"/>
-  </ds:schemaRefs>
-</ds:datastoreItem>
-</file>
-
-<file path=customXml/itemProps47.xml><?xml version="1.0" encoding="utf-8"?>
-<ds:datastoreItem xmlns:ds="http://schemas.openxmlformats.org/officeDocument/2006/customXml" ds:itemID="{1DE7A267-FE68-40EA-AD18-3D91B476DC28}">
-  <ds:schemaRefs>
-    <ds:schemaRef ds:uri="http://schemas.microsoft.com/VisualStudio/2011/storyboarding/control"/>
-  </ds:schemaRefs>
-</ds:datastoreItem>
-</file>
-
-<file path=customXml/itemProps48.xml><?xml version="1.0" encoding="utf-8"?>
-<ds:datastoreItem xmlns:ds="http://schemas.openxmlformats.org/officeDocument/2006/customXml" ds:itemID="{D82C3887-DD54-44E1-99AA-9DB9D3FFD544}">
-  <ds:schemaRefs>
-    <ds:schemaRef ds:uri="http://schemas.microsoft.com/VisualStudio/2011/storyboarding/control"/>
-  </ds:schemaRefs>
-</ds:datastoreItem>
-</file>
-
-<file path=customXml/itemProps49.xml><?xml version="1.0" encoding="utf-8"?>
-<ds:datastoreItem xmlns:ds="http://schemas.openxmlformats.org/officeDocument/2006/customXml" ds:itemID="{43074D0A-3657-4398-9644-C5D12864ACB5}">
-  <ds:schemaRefs>
-    <ds:schemaRef ds:uri="http://schemas.microsoft.com/VisualStudio/2011/storyboarding/control"/>
-  </ds:schemaRefs>
-</ds:datastoreItem>
-</file>
-
-<file path=customXml/itemProps5.xml><?xml version="1.0" encoding="utf-8"?>
-<ds:datastoreItem xmlns:ds="http://schemas.openxmlformats.org/officeDocument/2006/customXml" ds:itemID="{F3E21E30-D471-4562-BD42-8016DE5AA705}">
-  <ds:schemaRefs>
-    <ds:schemaRef ds:uri="http://schemas.microsoft.com/VisualStudio/2011/storyboarding/control"/>
-  </ds:schemaRefs>
-</ds:datastoreItem>
-</file>
-
-<file path=customXml/itemProps50.xml><?xml version="1.0" encoding="utf-8"?>
-<ds:datastoreItem xmlns:ds="http://schemas.openxmlformats.org/officeDocument/2006/customXml" ds:itemID="{0704B3AE-AAE9-4650-BABC-88E01C7BD3B0}">
-  <ds:schemaRefs>
-    <ds:schemaRef ds:uri="http://schemas.microsoft.com/VisualStudio/2011/storyboarding/control"/>
-  </ds:schemaRefs>
-</ds:datastoreItem>
-</file>
-
-<file path=customXml/itemProps51.xml><?xml version="1.0" encoding="utf-8"?>
-<ds:datastoreItem xmlns:ds="http://schemas.openxmlformats.org/officeDocument/2006/customXml" ds:itemID="{52A6B78B-D5BB-4E4E-8419-1FC0CE3D8ADD}">
-  <ds:schemaRefs>
-    <ds:schemaRef ds:uri="http://schemas.microsoft.com/VisualStudio/2011/storyboarding/control"/>
-  </ds:schemaRefs>
-</ds:datastoreItem>
-</file>
-
-<file path=customXml/itemProps52.xml><?xml version="1.0" encoding="utf-8"?>
-<ds:datastoreItem xmlns:ds="http://schemas.openxmlformats.org/officeDocument/2006/customXml" ds:itemID="{E7BF4E3B-2C32-4138-A26E-4FB5FD172B97}">
-  <ds:schemaRefs>
-    <ds:schemaRef ds:uri="http://schemas.microsoft.com/VisualStudio/2011/storyboarding/control"/>
-  </ds:schemaRefs>
-</ds:datastoreItem>
-</file>
-
-<file path=customXml/itemProps53.xml><?xml version="1.0" encoding="utf-8"?>
-<ds:datastoreItem xmlns:ds="http://schemas.openxmlformats.org/officeDocument/2006/customXml" ds:itemID="{B1317D35-54BD-4E9C-B6EA-99B047CC9016}">
-  <ds:schemaRefs>
-    <ds:schemaRef ds:uri="http://schemas.microsoft.com/VisualStudio/2011/storyboarding/control"/>
-  </ds:schemaRefs>
-</ds:datastoreItem>
-</file>
-
-<file path=customXml/itemProps54.xml><?xml version="1.0" encoding="utf-8"?>
-<ds:datastoreItem xmlns:ds="http://schemas.openxmlformats.org/officeDocument/2006/customXml" ds:itemID="{3B397A98-ACC4-4021-AC3A-0C1EC793B407}">
-  <ds:schemaRefs>
-    <ds:schemaRef ds:uri="http://schemas.microsoft.com/VisualStudio/2011/storyboarding/control"/>
-  </ds:schemaRefs>
-</ds:datastoreItem>
-</file>
-
-<file path=customXml/itemProps55.xml><?xml version="1.0" encoding="utf-8"?>
-<ds:datastoreItem xmlns:ds="http://schemas.openxmlformats.org/officeDocument/2006/customXml" ds:itemID="{C99250CB-41AD-4674-B392-C867EAFC00F7}">
-  <ds:schemaRefs>
-    <ds:schemaRef ds:uri="http://schemas.microsoft.com/VisualStudio/2011/storyboarding/control"/>
-  </ds:schemaRefs>
-</ds:datastoreItem>
-</file>
-
-<file path=customXml/itemProps56.xml><?xml version="1.0" encoding="utf-8"?>
-<ds:datastoreItem xmlns:ds="http://schemas.openxmlformats.org/officeDocument/2006/customXml" ds:itemID="{1BD1864F-9ACD-4C5F-A332-FFFC27786AEC}">
-  <ds:schemaRefs>
-    <ds:schemaRef ds:uri="http://schemas.microsoft.com/VisualStudio/2011/storyboarding/control"/>
-  </ds:schemaRefs>
-</ds:datastoreItem>
-</file>
-
-<file path=customXml/itemProps57.xml><?xml version="1.0" encoding="utf-8"?>
-<ds:datastoreItem xmlns:ds="http://schemas.openxmlformats.org/officeDocument/2006/customXml" ds:itemID="{7A255E18-8005-4540-AF6B-C52268905396}">
-  <ds:schemaRefs>
-    <ds:schemaRef ds:uri="http://schemas.microsoft.com/VisualStudio/2011/storyboarding/control"/>
-  </ds:schemaRefs>
-</ds:datastoreItem>
-</file>
-
-<file path=customXml/itemProps58.xml><?xml version="1.0" encoding="utf-8"?>
-<ds:datastoreItem xmlns:ds="http://schemas.openxmlformats.org/officeDocument/2006/customXml" ds:itemID="{4835A781-F87C-4723-AC25-998F0A37D9F1}">
-  <ds:schemaRefs>
-    <ds:schemaRef ds:uri="http://schemas.microsoft.com/VisualStudio/2011/storyboarding/control"/>
-  </ds:schemaRefs>
-</ds:datastoreItem>
-</file>
-
-<file path=customXml/itemProps59.xml><?xml version="1.0" encoding="utf-8"?>
-<ds:datastoreItem xmlns:ds="http://schemas.openxmlformats.org/officeDocument/2006/customXml" ds:itemID="{CB955AF8-CFA3-4E81-A07C-637A8EF2BB5A}">
-  <ds:schemaRefs>
-    <ds:schemaRef ds:uri="http://schemas.microsoft.com/VisualStudio/2011/storyboarding/control"/>
-  </ds:schemaRefs>
-</ds:datastoreItem>
-</file>
-
-<file path=customXml/itemProps6.xml><?xml version="1.0" encoding="utf-8"?>
-<ds:datastoreItem xmlns:ds="http://schemas.openxmlformats.org/officeDocument/2006/customXml" ds:itemID="{88F5C49D-2615-40C1-BE0C-5E516E77EA09}">
-  <ds:schemaRefs>
-    <ds:schemaRef ds:uri="http://schemas.microsoft.com/VisualStudio/2011/storyboarding/control"/>
-  </ds:schemaRefs>
-</ds:datastoreItem>
-</file>
-
-<file path=customXml/itemProps60.xml><?xml version="1.0" encoding="utf-8"?>
-<ds:datastoreItem xmlns:ds="http://schemas.openxmlformats.org/officeDocument/2006/customXml" ds:itemID="{EF33C40D-4DA0-4770-A012-CD8ABD9E79F7}">
-  <ds:schemaRefs>
-    <ds:schemaRef ds:uri="http://schemas.microsoft.com/VisualStudio/2011/storyboarding/control"/>
-  </ds:schemaRefs>
-</ds:datastoreItem>
-</file>
-
-<file path=customXml/itemProps61.xml><?xml version="1.0" encoding="utf-8"?>
-<ds:datastoreItem xmlns:ds="http://schemas.openxmlformats.org/officeDocument/2006/customXml" ds:itemID="{4743D833-2A91-461D-A302-D8184281B831}">
-  <ds:schemaRefs>
-    <ds:schemaRef ds:uri="http://schemas.microsoft.com/VisualStudio/2011/storyboarding/control"/>
-  </ds:schemaRefs>
-</ds:datastoreItem>
-</file>
-
-<file path=customXml/itemProps62.xml><?xml version="1.0" encoding="utf-8"?>
-<ds:datastoreItem xmlns:ds="http://schemas.openxmlformats.org/officeDocument/2006/customXml" ds:itemID="{59D6A2F8-3D94-4AD4-B102-B7CA40667176}">
-  <ds:schemaRefs>
-    <ds:schemaRef ds:uri="http://schemas.microsoft.com/VisualStudio/2011/storyboarding/control"/>
-  </ds:schemaRefs>
-</ds:datastoreItem>
-</file>
-
-<file path=customXml/itemProps63.xml><?xml version="1.0" encoding="utf-8"?>
-<ds:datastoreItem xmlns:ds="http://schemas.openxmlformats.org/officeDocument/2006/customXml" ds:itemID="{0ED54E3F-8414-42CB-9207-14AACC0592E1}">
-  <ds:schemaRefs>
-    <ds:schemaRef ds:uri="http://schemas.microsoft.com/VisualStudio/2011/storyboarding/control"/>
-  </ds:schemaRefs>
-</ds:datastoreItem>
-</file>
-
-<file path=customXml/itemProps64.xml><?xml version="1.0" encoding="utf-8"?>
-<ds:datastoreItem xmlns:ds="http://schemas.openxmlformats.org/officeDocument/2006/customXml" ds:itemID="{FA5737C0-AFCE-4CDC-B65A-7C5F0C8F99D4}">
-  <ds:schemaRefs>
-    <ds:schemaRef ds:uri="http://schemas.microsoft.com/VisualStudio/2011/storyboarding/control"/>
-  </ds:schemaRefs>
-</ds:datastoreItem>
-</file>
-
-<file path=customXml/itemProps65.xml><?xml version="1.0" encoding="utf-8"?>
-<ds:datastoreItem xmlns:ds="http://schemas.openxmlformats.org/officeDocument/2006/customXml" ds:itemID="{4BFA8902-6B8C-4198-972F-C484EE628954}">
-  <ds:schemaRefs>
-    <ds:schemaRef ds:uri="http://schemas.microsoft.com/VisualStudio/2011/storyboarding/control"/>
-  </ds:schemaRefs>
-</ds:datastoreItem>
-</file>
-
-<file path=customXml/itemProps66.xml><?xml version="1.0" encoding="utf-8"?>
-<ds:datastoreItem xmlns:ds="http://schemas.openxmlformats.org/officeDocument/2006/customXml" ds:itemID="{066A5DFC-7FA2-4A2D-A24A-F8A9ADC2D44A}">
-  <ds:schemaRefs>
-    <ds:schemaRef ds:uri="http://schemas.microsoft.com/VisualStudio/2011/storyboarding/control"/>
-  </ds:schemaRefs>
-</ds:datastoreItem>
-</file>
-
-<file path=customXml/itemProps67.xml><?xml version="1.0" encoding="utf-8"?>
-<ds:datastoreItem xmlns:ds="http://schemas.openxmlformats.org/officeDocument/2006/customXml" ds:itemID="{F0427285-802D-478A-8192-2EA534BA9535}">
-  <ds:schemaRefs>
-    <ds:schemaRef ds:uri="http://schemas.microsoft.com/VisualStudio/2011/storyboarding/control"/>
-  </ds:schemaRefs>
-</ds:datastoreItem>
-</file>
-
-<file path=customXml/itemProps68.xml><?xml version="1.0" encoding="utf-8"?>
-<ds:datastoreItem xmlns:ds="http://schemas.openxmlformats.org/officeDocument/2006/customXml" ds:itemID="{5994508D-3B31-42DC-B919-BFD90538BA2A}">
-  <ds:schemaRefs>
-    <ds:schemaRef ds:uri="http://schemas.microsoft.com/VisualStudio/2011/storyboarding/control"/>
-  </ds:schemaRefs>
-</ds:datastoreItem>
-</file>
-
-<file path=customXml/itemProps69.xml><?xml version="1.0" encoding="utf-8"?>
-<ds:datastoreItem xmlns:ds="http://schemas.openxmlformats.org/officeDocument/2006/customXml" ds:itemID="{D0E56850-78FB-47E4-80AF-E8678BFFF5A1}">
-  <ds:schemaRefs>
-    <ds:schemaRef ds:uri="http://schemas.microsoft.com/VisualStudio/2011/storyboarding/control"/>
-  </ds:schemaRefs>
-</ds:datastoreItem>
-</file>
-
-<file path=customXml/itemProps7.xml><?xml version="1.0" encoding="utf-8"?>
-<ds:datastoreItem xmlns:ds="http://schemas.openxmlformats.org/officeDocument/2006/customXml" ds:itemID="{B057E94C-EA0A-41DB-AD9B-0300F5E13950}">
-  <ds:schemaRefs>
-    <ds:schemaRef ds:uri="http://schemas.microsoft.com/VisualStudio/2011/storyboarding/control"/>
-  </ds:schemaRefs>
-</ds:datastoreItem>
-</file>
-
-<file path=customXml/itemProps70.xml><?xml version="1.0" encoding="utf-8"?>
-<ds:datastoreItem xmlns:ds="http://schemas.openxmlformats.org/officeDocument/2006/customXml" ds:itemID="{E642387D-5A9C-42B0-AE53-BB60D2ACDC51}">
-  <ds:schemaRefs>
-    <ds:schemaRef ds:uri="http://schemas.microsoft.com/VisualStudio/2011/storyboarding/control"/>
-  </ds:schemaRefs>
-</ds:datastoreItem>
-</file>
-
-<file path=customXml/itemProps71.xml><?xml version="1.0" encoding="utf-8"?>
-<ds:datastoreItem xmlns:ds="http://schemas.openxmlformats.org/officeDocument/2006/customXml" ds:itemID="{AD253A7D-10F2-4E16-BD40-EB144A4BB100}">
-  <ds:schemaRefs>
-    <ds:schemaRef ds:uri="http://schemas.microsoft.com/VisualStudio/2011/storyboarding/control"/>
-  </ds:schemaRefs>
-</ds:datastoreItem>
-</file>
-
-<file path=customXml/itemProps72.xml><?xml version="1.0" encoding="utf-8"?>
-<ds:datastoreItem xmlns:ds="http://schemas.openxmlformats.org/officeDocument/2006/customXml" ds:itemID="{9FAA36B2-B85C-442C-B0E2-85BFC0CA6AEF}">
-  <ds:schemaRefs>
-    <ds:schemaRef ds:uri="http://schemas.microsoft.com/VisualStudio/2011/storyboarding/control"/>
-  </ds:schemaRefs>
-</ds:datastoreItem>
-</file>
-
-<file path=customXml/itemProps73.xml><?xml version="1.0" encoding="utf-8"?>
-<ds:datastoreItem xmlns:ds="http://schemas.openxmlformats.org/officeDocument/2006/customXml" ds:itemID="{67F70B07-BDF2-42EE-A09E-A099CFFA9D16}">
-  <ds:schemaRefs>
-    <ds:schemaRef ds:uri="http://schemas.microsoft.com/VisualStudio/2011/storyboarding/control"/>
-  </ds:schemaRefs>
-</ds:datastoreItem>
-</file>
-
-<file path=customXml/itemProps74.xml><?xml version="1.0" encoding="utf-8"?>
-<ds:datastoreItem xmlns:ds="http://schemas.openxmlformats.org/officeDocument/2006/customXml" ds:itemID="{968A9BB2-E5BA-4DFA-9019-FC925D9A3AF5}">
-  <ds:schemaRefs>
-    <ds:schemaRef ds:uri="http://schemas.microsoft.com/VisualStudio/2011/storyboarding/control"/>
-  </ds:schemaRefs>
-</ds:datastoreItem>
-</file>
-
-<file path=customXml/itemProps75.xml><?xml version="1.0" encoding="utf-8"?>
-<ds:datastoreItem xmlns:ds="http://schemas.openxmlformats.org/officeDocument/2006/customXml" ds:itemID="{C1B72F51-754D-4AF8-9BBF-8E2709522109}">
-  <ds:schemaRefs>
-    <ds:schemaRef ds:uri="http://schemas.microsoft.com/VisualStudio/2011/storyboarding/control"/>
-  </ds:schemaRefs>
-</ds:datastoreItem>
-</file>
-
-<file path=customXml/itemProps76.xml><?xml version="1.0" encoding="utf-8"?>
-<ds:datastoreItem xmlns:ds="http://schemas.openxmlformats.org/officeDocument/2006/customXml" ds:itemID="{6580BA71-1754-4A06-8B96-16C9A6DB079A}">
-  <ds:schemaRefs>
-    <ds:schemaRef ds:uri="http://schemas.microsoft.com/VisualStudio/2011/storyboarding/control"/>
-  </ds:schemaRefs>
-</ds:datastoreItem>
-</file>
-
-<file path=customXml/itemProps77.xml><?xml version="1.0" encoding="utf-8"?>
-<ds:datastoreItem xmlns:ds="http://schemas.openxmlformats.org/officeDocument/2006/customXml" ds:itemID="{7BEBCBCF-64E6-46C1-A483-1DEEC2868F7C}">
-  <ds:schemaRefs>
-    <ds:schemaRef ds:uri="http://schemas.microsoft.com/VisualStudio/2011/storyboarding/control"/>
-  </ds:schemaRefs>
-</ds:datastoreItem>
-</file>
-
-<file path=customXml/itemProps78.xml><?xml version="1.0" encoding="utf-8"?>
-<ds:datastoreItem xmlns:ds="http://schemas.openxmlformats.org/officeDocument/2006/customXml" ds:itemID="{04A820AF-4680-4898-8A8B-7B95BF30C332}">
-  <ds:schemaRefs>
-    <ds:schemaRef ds:uri="http://schemas.microsoft.com/VisualStudio/2011/storyboarding/control"/>
-  </ds:schemaRefs>
-</ds:datastoreItem>
-</file>
-
-<file path=customXml/itemProps79.xml><?xml version="1.0" encoding="utf-8"?>
-<ds:datastoreItem xmlns:ds="http://schemas.openxmlformats.org/officeDocument/2006/customXml" ds:itemID="{4BABCC82-0C23-41ED-AD8D-47049FB15092}">
-  <ds:schemaRefs>
-    <ds:schemaRef ds:uri="http://schemas.microsoft.com/VisualStudio/2011/storyboarding/control"/>
-  </ds:schemaRefs>
-</ds:datastoreItem>
-</file>
-
-<file path=customXml/itemProps8.xml><?xml version="1.0" encoding="utf-8"?>
-<ds:datastoreItem xmlns:ds="http://schemas.openxmlformats.org/officeDocument/2006/customXml" ds:itemID="{C8CC8F3E-7A7F-4C43-AA38-D0F10DA3F07D}">
-  <ds:schemaRefs>
-    <ds:schemaRef ds:uri="http://schemas.microsoft.com/VisualStudio/2011/storyboarding/control"/>
-  </ds:schemaRefs>
-</ds:datastoreItem>
-</file>
-
-<file path=customXml/itemProps80.xml><?xml version="1.0" encoding="utf-8"?>
-<ds:datastoreItem xmlns:ds="http://schemas.openxmlformats.org/officeDocument/2006/customXml" ds:itemID="{57FB8291-94A3-40C2-BA0B-B1AE655A1FCE}">
-  <ds:schemaRefs>
-    <ds:schemaRef ds:uri="http://schemas.microsoft.com/VisualStudio/2011/storyboarding/control"/>
-  </ds:schemaRefs>
-</ds:datastoreItem>
-</file>
-
-<file path=customXml/itemProps81.xml><?xml version="1.0" encoding="utf-8"?>
-<ds:datastoreItem xmlns:ds="http://schemas.openxmlformats.org/officeDocument/2006/customXml" ds:itemID="{18FFF095-42F0-4B57-AFB8-96702D3DFC32}">
-  <ds:schemaRefs>
-    <ds:schemaRef ds:uri="http://schemas.microsoft.com/VisualStudio/2011/storyboarding/control"/>
-  </ds:schemaRefs>
-</ds:datastoreItem>
-</file>
-
-<file path=customXml/itemProps82.xml><?xml version="1.0" encoding="utf-8"?>
-<ds:datastoreItem xmlns:ds="http://schemas.openxmlformats.org/officeDocument/2006/customXml" ds:itemID="{CC757A85-696F-45D9-9E2E-2C5AD9DABDB9}">
-  <ds:schemaRefs>
-    <ds:schemaRef ds:uri="http://schemas.microsoft.com/VisualStudio/2011/storyboarding/control"/>
-  </ds:schemaRefs>
-</ds:datastoreItem>
-</file>
-
-<file path=customXml/itemProps83.xml><?xml version="1.0" encoding="utf-8"?>
-<ds:datastoreItem xmlns:ds="http://schemas.openxmlformats.org/officeDocument/2006/customXml" ds:itemID="{F449356B-5FBD-428B-95E4-7F68509C867E}">
-  <ds:schemaRefs>
-    <ds:schemaRef ds:uri="http://schemas.microsoft.com/VisualStudio/2011/storyboarding/control"/>
-  </ds:schemaRefs>
-</ds:datastoreItem>
-</file>
-
-<file path=customXml/itemProps84.xml><?xml version="1.0" encoding="utf-8"?>
-<ds:datastoreItem xmlns:ds="http://schemas.openxmlformats.org/officeDocument/2006/customXml" ds:itemID="{52469F0B-98E9-4C2C-9EA9-3C266A667D5B}">
-  <ds:schemaRefs>
-    <ds:schemaRef ds:uri="http://schemas.microsoft.com/VisualStudio/2011/storyboarding/control"/>
-  </ds:schemaRefs>
-</ds:datastoreItem>
-</file>
-
-<file path=customXml/itemProps85.xml><?xml version="1.0" encoding="utf-8"?>
-<ds:datastoreItem xmlns:ds="http://schemas.openxmlformats.org/officeDocument/2006/customXml" ds:itemID="{DC0FBCF2-49EC-4C85-A676-39EBD004CFE1}">
-  <ds:schemaRefs>
-    <ds:schemaRef ds:uri="http://schemas.microsoft.com/VisualStudio/2011/storyboarding/control"/>
-  </ds:schemaRefs>
-</ds:datastoreItem>
-</file>
-
-<file path=customXml/itemProps86.xml><?xml version="1.0" encoding="utf-8"?>
-<ds:datastoreItem xmlns:ds="http://schemas.openxmlformats.org/officeDocument/2006/customXml" ds:itemID="{28114E52-9982-44AB-BE25-6CD6129FE58D}">
-  <ds:schemaRefs>
-    <ds:schemaRef ds:uri="http://schemas.microsoft.com/VisualStudio/2011/storyboarding/control"/>
-  </ds:schemaRefs>
-</ds:datastoreItem>
-</file>
-
-<file path=customXml/itemProps87.xml><?xml version="1.0" encoding="utf-8"?>
-<ds:datastoreItem xmlns:ds="http://schemas.openxmlformats.org/officeDocument/2006/customXml" ds:itemID="{3928C134-FE87-4BC6-B476-5EBDC72BBDA5}">
-  <ds:schemaRefs>
-    <ds:schemaRef ds:uri="http://schemas.microsoft.com/VisualStudio/2011/storyboarding/control"/>
-  </ds:schemaRefs>
-</ds:datastoreItem>
-</file>
-
-<file path=customXml/itemProps88.xml><?xml version="1.0" encoding="utf-8"?>
-<ds:datastoreItem xmlns:ds="http://schemas.openxmlformats.org/officeDocument/2006/customXml" ds:itemID="{23C004C7-F0EC-4E5F-817C-3AD0EB694A00}">
-  <ds:schemaRefs>
-    <ds:schemaRef ds:uri="http://schemas.microsoft.com/VisualStudio/2011/storyboarding/control"/>
-  </ds:schemaRefs>
-</ds:datastoreItem>
-</file>
-
-<file path=customXml/itemProps89.xml><?xml version="1.0" encoding="utf-8"?>
-<ds:datastoreItem xmlns:ds="http://schemas.openxmlformats.org/officeDocument/2006/customXml" ds:itemID="{0157611B-29CA-4FA6-9194-DEB87BAFD7C1}">
-  <ds:schemaRefs>
-    <ds:schemaRef ds:uri="http://schemas.microsoft.com/VisualStudio/2011/storyboarding/control"/>
-  </ds:schemaRefs>
-</ds:datastoreItem>
-</file>
-
-<file path=customXml/itemProps9.xml><?xml version="1.0" encoding="utf-8"?>
-<ds:datastoreItem xmlns:ds="http://schemas.openxmlformats.org/officeDocument/2006/customXml" ds:itemID="{AEFE391D-6609-4CAD-83FC-E962309522C9}">
-  <ds:schemaRefs>
-    <ds:schemaRef ds:uri="http://schemas.microsoft.com/VisualStudio/2011/storyboarding/control"/>
-  </ds:schemaRefs>
-</ds:datastoreItem>
-</file>
-
-<file path=customXml/itemProps90.xml><?xml version="1.0" encoding="utf-8"?>
-<ds:datastoreItem xmlns:ds="http://schemas.openxmlformats.org/officeDocument/2006/customXml" ds:itemID="{549308D7-648A-4B21-8B3D-E586290636F3}">
-  <ds:schemaRefs>
-    <ds:schemaRef ds:uri="http://schemas.microsoft.com/VisualStudio/2011/storyboarding/control"/>
-  </ds:schemaRefs>
-</ds:datastoreItem>
-</file>
-
-<file path=customXml/itemProps91.xml><?xml version="1.0" encoding="utf-8"?>
-<ds:datastoreItem xmlns:ds="http://schemas.openxmlformats.org/officeDocument/2006/customXml" ds:itemID="{84F754A2-A88B-448D-8920-B13BCF8079FA}">
-  <ds:schemaRefs>
-    <ds:schemaRef ds:uri="http://schemas.microsoft.com/VisualStudio/2011/storyboarding/control"/>
-  </ds:schemaRefs>
-</ds:datastoreItem>
-</file>
-
-<file path=customXml/itemProps92.xml><?xml version="1.0" encoding="utf-8"?>
-<ds:datastoreItem xmlns:ds="http://schemas.openxmlformats.org/officeDocument/2006/customXml" ds:itemID="{1C0398C3-A437-479F-BA82-EA141FF05F86}">
-  <ds:schemaRefs>
-    <ds:schemaRef ds:uri="http://schemas.microsoft.com/VisualStudio/2011/storyboarding/control"/>
-  </ds:schemaRefs>
-</ds:datastoreItem>
-</file>
-
-<file path=customXml/itemProps93.xml><?xml version="1.0" encoding="utf-8"?>
-<ds:datastoreItem xmlns:ds="http://schemas.openxmlformats.org/officeDocument/2006/customXml" ds:itemID="{220FBEE6-E44F-4E70-A0AE-702F72BC74E2}">
-  <ds:schemaRefs>
-    <ds:schemaRef ds:uri="http://schemas.microsoft.com/VisualStudio/2011/storyboarding/control"/>
-  </ds:schemaRefs>
-</ds:datastoreItem>
-</file>
-
-<file path=customXml/itemProps94.xml><?xml version="1.0" encoding="utf-8"?>
-<ds:datastoreItem xmlns:ds="http://schemas.openxmlformats.org/officeDocument/2006/customXml" ds:itemID="{550ECD15-053B-4781-8EBC-0491E8070FB4}">
-  <ds:schemaRefs>
-    <ds:schemaRef ds:uri="http://schemas.microsoft.com/VisualStudio/2011/storyboarding/control"/>
-  </ds:schemaRefs>
-</ds:datastoreItem>
-</file>
-
-<file path=customXml/itemProps95.xml><?xml version="1.0" encoding="utf-8"?>
-<ds:datastoreItem xmlns:ds="http://schemas.openxmlformats.org/officeDocument/2006/customXml" ds:itemID="{347DB3C5-617D-4B21-A7C9-013AD66AA9BD}">
-  <ds:schemaRefs>
-    <ds:schemaRef ds:uri="http://schemas.microsoft.com/VisualStudio/2011/storyboarding/control"/>
-  </ds:schemaRefs>
-</ds:datastoreItem>
-</file>
-
-<file path=customXml/itemProps96.xml><?xml version="1.0" encoding="utf-8"?>
-<ds:datastoreItem xmlns:ds="http://schemas.openxmlformats.org/officeDocument/2006/customXml" ds:itemID="{FCF7D0F6-3A56-416B-9028-F9A19A998640}">
-  <ds:schemaRefs>
-    <ds:schemaRef ds:uri="http://schemas.microsoft.com/VisualStudio/2011/storyboarding/control"/>
-  </ds:schemaRefs>
-</ds:datastoreItem>
-</file>
-
-<file path=customXml/itemProps97.xml><?xml version="1.0" encoding="utf-8"?>
-<ds:datastoreItem xmlns:ds="http://schemas.openxmlformats.org/officeDocument/2006/customXml" ds:itemID="{190C52B0-4898-4622-A0DF-6EF3E078C949}">
-  <ds:schemaRefs>
-    <ds:schemaRef ds:uri="http://schemas.microsoft.com/VisualStudio/2011/storyboarding/control"/>
-  </ds:schemaRefs>
-</ds:datastoreItem>
-</file>
-
-<file path=customXml/itemProps98.xml><?xml version="1.0" encoding="utf-8"?>
-<ds:datastoreItem xmlns:ds="http://schemas.openxmlformats.org/officeDocument/2006/customXml" ds:itemID="{241647FF-CD33-4752-8101-8303D55C8549}">
-  <ds:schemaRefs>
-    <ds:schemaRef ds:uri="http://schemas.microsoft.com/VisualStudio/2011/storyboarding/control"/>
-  </ds:schemaRefs>
-</ds:datastoreItem>
-</file>
-
-<file path=customXml/itemProps99.xml><?xml version="1.0" encoding="utf-8"?>
-<ds:datastoreItem xmlns:ds="http://schemas.openxmlformats.org/officeDocument/2006/customXml" ds:itemID="{5DC640DF-A2F3-4C6D-B7B0-79851601D3D6}">
-  <ds:schemaRefs>
-    <ds:schemaRef ds:uri="http://schemas.microsoft.com/VisualStudio/2011/storyboarding/control"/>
-  </ds:schemaRefs>
-</ds:datastoreItem>
 </file>
</xml_diff>